<commit_message>
Uppdaterad presentation, gammal presentation borttagen
</commit_message>
<xml_diff>
--- a/TDD-Presentation.pptx
+++ b/TDD-Presentation.pptx
@@ -10,16 +10,18 @@
     <p:sldId id="258" r:id="rId4"/>
     <p:sldId id="259" r:id="rId5"/>
     <p:sldId id="260" r:id="rId6"/>
-    <p:sldId id="261" r:id="rId7"/>
-    <p:sldId id="262" r:id="rId8"/>
-    <p:sldId id="263" r:id="rId9"/>
-    <p:sldId id="264" r:id="rId10"/>
-    <p:sldId id="266" r:id="rId11"/>
-    <p:sldId id="265" r:id="rId12"/>
-    <p:sldId id="267" r:id="rId13"/>
-    <p:sldId id="268" r:id="rId14"/>
-    <p:sldId id="269" r:id="rId15"/>
-    <p:sldId id="270" r:id="rId16"/>
+    <p:sldId id="262" r:id="rId7"/>
+    <p:sldId id="277" r:id="rId8"/>
+    <p:sldId id="271" r:id="rId9"/>
+    <p:sldId id="272" r:id="rId10"/>
+    <p:sldId id="273" r:id="rId11"/>
+    <p:sldId id="275" r:id="rId12"/>
+    <p:sldId id="276" r:id="rId13"/>
+    <p:sldId id="263" r:id="rId14"/>
+    <p:sldId id="278" r:id="rId15"/>
+    <p:sldId id="265" r:id="rId16"/>
+    <p:sldId id="267" r:id="rId17"/>
+    <p:sldId id="270" r:id="rId18"/>
   </p:sldIdLst>
   <p:sldSz cx="12192000" cy="6858000"/>
   <p:notesSz cx="6858000" cy="9144000"/>
@@ -118,6 +120,11 @@
       </a:defRPr>
     </a:lvl9pPr>
   </p:defaultTextStyle>
+  <p:extLst>
+    <p:ext uri="{EFAFB233-063F-42B5-8137-9DF3F51BA10A}">
+      <p15:sldGuideLst xmlns:p15="http://schemas.microsoft.com/office/powerpoint/2012/main"/>
+    </p:ext>
+  </p:extLst>
 </p:presentation>
 </file>
 
@@ -270,7 +277,7 @@
           <a:p>
             <a:fld id="{4103C207-1B24-E341-B490-8E9928603720}" type="datetimeFigureOut">
               <a:rPr lang="sv-SE" smtClean="0"/>
-              <a:t>2020-01-26</a:t>
+              <a:t>2020-01-27</a:t>
             </a:fld>
             <a:endParaRPr lang="sv-SE"/>
           </a:p>
@@ -470,7 +477,7 @@
           <a:p>
             <a:fld id="{4103C207-1B24-E341-B490-8E9928603720}" type="datetimeFigureOut">
               <a:rPr lang="sv-SE" smtClean="0"/>
-              <a:t>2020-01-26</a:t>
+              <a:t>2020-01-27</a:t>
             </a:fld>
             <a:endParaRPr lang="sv-SE"/>
           </a:p>
@@ -680,7 +687,7 @@
           <a:p>
             <a:fld id="{4103C207-1B24-E341-B490-8E9928603720}" type="datetimeFigureOut">
               <a:rPr lang="sv-SE" smtClean="0"/>
-              <a:t>2020-01-26</a:t>
+              <a:t>2020-01-27</a:t>
             </a:fld>
             <a:endParaRPr lang="sv-SE"/>
           </a:p>
@@ -880,7 +887,7 @@
           <a:p>
             <a:fld id="{4103C207-1B24-E341-B490-8E9928603720}" type="datetimeFigureOut">
               <a:rPr lang="sv-SE" smtClean="0"/>
-              <a:t>2020-01-26</a:t>
+              <a:t>2020-01-27</a:t>
             </a:fld>
             <a:endParaRPr lang="sv-SE"/>
           </a:p>
@@ -1156,7 +1163,7 @@
           <a:p>
             <a:fld id="{4103C207-1B24-E341-B490-8E9928603720}" type="datetimeFigureOut">
               <a:rPr lang="sv-SE" smtClean="0"/>
-              <a:t>2020-01-26</a:t>
+              <a:t>2020-01-27</a:t>
             </a:fld>
             <a:endParaRPr lang="sv-SE"/>
           </a:p>
@@ -1424,7 +1431,7 @@
           <a:p>
             <a:fld id="{4103C207-1B24-E341-B490-8E9928603720}" type="datetimeFigureOut">
               <a:rPr lang="sv-SE" smtClean="0"/>
-              <a:t>2020-01-26</a:t>
+              <a:t>2020-01-27</a:t>
             </a:fld>
             <a:endParaRPr lang="sv-SE"/>
           </a:p>
@@ -1839,7 +1846,7 @@
           <a:p>
             <a:fld id="{4103C207-1B24-E341-B490-8E9928603720}" type="datetimeFigureOut">
               <a:rPr lang="sv-SE" smtClean="0"/>
-              <a:t>2020-01-26</a:t>
+              <a:t>2020-01-27</a:t>
             </a:fld>
             <a:endParaRPr lang="sv-SE"/>
           </a:p>
@@ -1981,7 +1988,7 @@
           <a:p>
             <a:fld id="{4103C207-1B24-E341-B490-8E9928603720}" type="datetimeFigureOut">
               <a:rPr lang="sv-SE" smtClean="0"/>
-              <a:t>2020-01-26</a:t>
+              <a:t>2020-01-27</a:t>
             </a:fld>
             <a:endParaRPr lang="sv-SE"/>
           </a:p>
@@ -2094,7 +2101,7 @@
           <a:p>
             <a:fld id="{4103C207-1B24-E341-B490-8E9928603720}" type="datetimeFigureOut">
               <a:rPr lang="sv-SE" smtClean="0"/>
-              <a:t>2020-01-26</a:t>
+              <a:t>2020-01-27</a:t>
             </a:fld>
             <a:endParaRPr lang="sv-SE"/>
           </a:p>
@@ -2407,7 +2414,7 @@
           <a:p>
             <a:fld id="{4103C207-1B24-E341-B490-8E9928603720}" type="datetimeFigureOut">
               <a:rPr lang="sv-SE" smtClean="0"/>
-              <a:t>2020-01-26</a:t>
+              <a:t>2020-01-27</a:t>
             </a:fld>
             <a:endParaRPr lang="sv-SE"/>
           </a:p>
@@ -2696,7 +2703,7 @@
           <a:p>
             <a:fld id="{4103C207-1B24-E341-B490-8E9928603720}" type="datetimeFigureOut">
               <a:rPr lang="sv-SE" smtClean="0"/>
-              <a:t>2020-01-26</a:t>
+              <a:t>2020-01-27</a:t>
             </a:fld>
             <a:endParaRPr lang="sv-SE"/>
           </a:p>
@@ -2939,7 +2946,7 @@
           <a:p>
             <a:fld id="{4103C207-1B24-E341-B490-8E9928603720}" type="datetimeFigureOut">
               <a:rPr lang="sv-SE" smtClean="0"/>
-              <a:t>2020-01-26</a:t>
+              <a:t>2020-01-27</a:t>
             </a:fld>
             <a:endParaRPr lang="sv-SE"/>
           </a:p>
@@ -3386,8 +3393,19 @@
           <a:p>
             <a:r>
               <a:rPr lang="sv-SE" sz="3600" dirty="0"/>
-              <a:t>Test driven design</a:t>
-            </a:r>
+              <a:t>TDD 101</a:t>
+            </a:r>
+            <a:br>
+              <a:rPr lang="sv-SE" sz="3600" dirty="0"/>
+            </a:br>
+            <a:r>
+              <a:rPr lang="sv-SE" sz="2800" dirty="0"/>
+              <a:t>Testdriven utveckling</a:t>
+            </a:r>
+            <a:br>
+              <a:rPr lang="sv-SE" sz="3600" dirty="0"/>
+            </a:br>
+            <a:endParaRPr lang="sv-SE" sz="3600" dirty="0"/>
           </a:p>
         </p:txBody>
       </p:sp>
@@ -3479,7 +3497,7 @@
         <p:spPr>
           <a:xfrm>
             <a:off x="832022" y="603379"/>
-            <a:ext cx="2121385" cy="1614304"/>
+            <a:ext cx="4633357" cy="626331"/>
           </a:xfrm>
         </p:spPr>
         <p:txBody>
@@ -3488,14 +3506,16 @@
           </a:bodyPr>
           <a:lstStyle/>
           <a:p>
+            <a:pPr algn="l"/>
+            <a:r>
+              <a:rPr lang="sv-SE" sz="3600" b="1" dirty="0"/>
+              <a:t>Verktyg – </a:t>
+            </a:r>
             <a:r>
               <a:rPr lang="sv-SE" sz="3600" b="1" dirty="0" err="1"/>
-              <a:t>Mockito</a:t>
-            </a:r>
-            <a:r>
-              <a:rPr lang="sv-SE" sz="3600" b="1" dirty="0"/>
-              <a:t> exempel</a:t>
-            </a:r>
+              <a:t>Javascript</a:t>
+            </a:r>
+            <a:endParaRPr lang="sv-SE" sz="3600" b="1" dirty="0"/>
           </a:p>
         </p:txBody>
       </p:sp>
@@ -3517,8 +3537,8 @@
         </p:nvSpPr>
         <p:spPr>
           <a:xfrm>
-            <a:off x="3175687" y="603379"/>
-            <a:ext cx="8921719" cy="5976097"/>
+            <a:off x="3175688" y="2060027"/>
+            <a:ext cx="7492312" cy="3160043"/>
           </a:xfrm>
         </p:spPr>
         <p:txBody>
@@ -3527,454 +3547,56 @@
           </a:bodyPr>
           <a:lstStyle/>
           <a:p>
+            <a:pPr marL="342900" indent="-342900" algn="l">
+              <a:buFont typeface="Arial" panose="020B0604020202020204" pitchFamily="34" charset="0"/>
+              <a:buChar char="•"/>
+            </a:pPr>
+            <a:r>
+              <a:rPr lang="sv-SE" dirty="0" err="1"/>
+              <a:t>Testkörare</a:t>
+            </a:r>
+            <a:endParaRPr lang="sv-SE" dirty="0"/>
+          </a:p>
+          <a:p>
+            <a:pPr marL="800100" lvl="1" indent="-342900" algn="l">
+              <a:buFont typeface="Arial" panose="020B0604020202020204" pitchFamily="34" charset="0"/>
+              <a:buChar char="•"/>
+            </a:pPr>
+            <a:r>
+              <a:rPr lang="sv-SE" dirty="0" err="1"/>
+              <a:t>MochaJS</a:t>
+            </a:r>
+            <a:endParaRPr lang="sv-SE" dirty="0"/>
+          </a:p>
+          <a:p>
+            <a:pPr marL="800100" lvl="1" indent="-342900" algn="l">
+              <a:buFont typeface="Arial" panose="020B0604020202020204" pitchFamily="34" charset="0"/>
+              <a:buChar char="•"/>
+            </a:pPr>
+            <a:r>
+              <a:rPr lang="sv-SE" dirty="0"/>
+              <a:t>JEST</a:t>
+            </a:r>
+          </a:p>
+          <a:p>
+            <a:pPr marL="800100" lvl="1" indent="-342900" algn="l">
+              <a:buFont typeface="Arial" panose="020B0604020202020204" pitchFamily="34" charset="0"/>
+              <a:buChar char="•"/>
+            </a:pPr>
+            <a:r>
+              <a:rPr lang="sv-SE" dirty="0"/>
+              <a:t>Jasmine</a:t>
+            </a:r>
+          </a:p>
+          <a:p>
             <a:pPr algn="l"/>
-            <a:r>
-              <a:rPr lang="sv-SE" sz="1800" dirty="0"/>
-              <a:t>Typisk användning:</a:t>
-            </a:r>
-          </a:p>
-          <a:p>
-            <a:pPr algn="l"/>
-            <a:r>
-              <a:rPr lang="sv-SE" sz="1800" dirty="0" err="1">
-                <a:effectLst/>
-                <a:latin typeface="Consolas" panose="020B0609020204030204" pitchFamily="49" charset="0"/>
-                <a:cs typeface="Consolas" panose="020B0609020204030204" pitchFamily="49" charset="0"/>
-              </a:rPr>
-              <a:t>verify</a:t>
-            </a:r>
-            <a:r>
-              <a:rPr lang="sv-SE" sz="1800" dirty="0">
-                <a:effectLst/>
-                <a:latin typeface="Consolas" panose="020B0609020204030204" pitchFamily="49" charset="0"/>
-                <a:cs typeface="Consolas" panose="020B0609020204030204" pitchFamily="49" charset="0"/>
-              </a:rPr>
-              <a:t>(</a:t>
-            </a:r>
-            <a:r>
-              <a:rPr lang="sv-SE" sz="1800" dirty="0" err="1">
-                <a:effectLst/>
-                <a:latin typeface="Consolas" panose="020B0609020204030204" pitchFamily="49" charset="0"/>
-                <a:cs typeface="Consolas" panose="020B0609020204030204" pitchFamily="49" charset="0"/>
-              </a:rPr>
-              <a:t>mockedObject</a:t>
-            </a:r>
-            <a:r>
-              <a:rPr lang="sv-SE" sz="1800" dirty="0">
-                <a:effectLst/>
-                <a:latin typeface="Consolas" panose="020B0609020204030204" pitchFamily="49" charset="0"/>
-                <a:cs typeface="Consolas" panose="020B0609020204030204" pitchFamily="49" charset="0"/>
-              </a:rPr>
-              <a:t>).</a:t>
-            </a:r>
-            <a:r>
-              <a:rPr lang="sv-SE" sz="1800" dirty="0" err="1">
-                <a:effectLst/>
-                <a:latin typeface="Consolas" panose="020B0609020204030204" pitchFamily="49" charset="0"/>
-                <a:cs typeface="Consolas" panose="020B0609020204030204" pitchFamily="49" charset="0"/>
-              </a:rPr>
-              <a:t>someMethodYouExpectToBeCalled</a:t>
-            </a:r>
-            <a:r>
-              <a:rPr lang="sv-SE" sz="1800" dirty="0">
-                <a:effectLst/>
-                <a:latin typeface="Consolas" panose="020B0609020204030204" pitchFamily="49" charset="0"/>
-                <a:cs typeface="Consolas" panose="020B0609020204030204" pitchFamily="49" charset="0"/>
-              </a:rPr>
-              <a:t>(</a:t>
-            </a:r>
-            <a:r>
-              <a:rPr lang="sv-SE" sz="1800" dirty="0" err="1">
-                <a:effectLst/>
-                <a:latin typeface="Consolas" panose="020B0609020204030204" pitchFamily="49" charset="0"/>
-                <a:cs typeface="Consolas" panose="020B0609020204030204" pitchFamily="49" charset="0"/>
-              </a:rPr>
-              <a:t>expectedArguments</a:t>
-            </a:r>
-            <a:r>
-              <a:rPr lang="sv-SE" sz="1800" dirty="0">
-                <a:effectLst/>
-                <a:latin typeface="Consolas" panose="020B0609020204030204" pitchFamily="49" charset="0"/>
-                <a:cs typeface="Consolas" panose="020B0609020204030204" pitchFamily="49" charset="0"/>
-              </a:rPr>
-              <a:t>)</a:t>
-            </a:r>
-          </a:p>
-          <a:p>
-            <a:pPr algn="l"/>
-            <a:endParaRPr lang="sv-SE" sz="1800" dirty="0">
-              <a:effectLst/>
-              <a:latin typeface="Consolas" panose="020B0609020204030204" pitchFamily="49" charset="0"/>
-              <a:cs typeface="Consolas" panose="020B0609020204030204" pitchFamily="49" charset="0"/>
-            </a:endParaRPr>
-          </a:p>
-          <a:p>
-            <a:pPr algn="l"/>
-            <a:r>
-              <a:rPr lang="sv-SE" sz="1800" dirty="0"/>
-              <a:t>Skapa </a:t>
-            </a:r>
-            <a:r>
-              <a:rPr lang="sv-SE" sz="1800" dirty="0" err="1"/>
-              <a:t>mock</a:t>
-            </a:r>
-            <a:r>
-              <a:rPr lang="sv-SE" sz="1800" dirty="0"/>
-              <a:t>, alternativ 1:</a:t>
-            </a:r>
-          </a:p>
-          <a:p>
-            <a:pPr algn="l"/>
-            <a:r>
-              <a:rPr lang="sv-SE" sz="1800" dirty="0" err="1">
-                <a:effectLst/>
-                <a:latin typeface="Consolas" panose="020B0609020204030204" pitchFamily="49" charset="0"/>
-                <a:cs typeface="Consolas" panose="020B0609020204030204" pitchFamily="49" charset="0"/>
-              </a:rPr>
-              <a:t>Collaborator</a:t>
-            </a:r>
-            <a:r>
-              <a:rPr lang="sv-SE" sz="1800" dirty="0">
-                <a:effectLst/>
-                <a:latin typeface="Consolas" panose="020B0609020204030204" pitchFamily="49" charset="0"/>
-                <a:cs typeface="Consolas" panose="020B0609020204030204" pitchFamily="49" charset="0"/>
-              </a:rPr>
-              <a:t> </a:t>
-            </a:r>
-            <a:r>
-              <a:rPr lang="sv-SE" sz="1800" dirty="0" err="1">
-                <a:effectLst/>
-                <a:latin typeface="Consolas" panose="020B0609020204030204" pitchFamily="49" charset="0"/>
-                <a:cs typeface="Consolas" panose="020B0609020204030204" pitchFamily="49" charset="0"/>
-              </a:rPr>
-              <a:t>collaborator</a:t>
-            </a:r>
-            <a:r>
-              <a:rPr lang="sv-SE" sz="1800" dirty="0">
-                <a:effectLst/>
-                <a:latin typeface="Consolas" panose="020B0609020204030204" pitchFamily="49" charset="0"/>
-                <a:cs typeface="Consolas" panose="020B0609020204030204" pitchFamily="49" charset="0"/>
-              </a:rPr>
-              <a:t> = </a:t>
-            </a:r>
-            <a:r>
-              <a:rPr lang="sv-SE" sz="1800" dirty="0" err="1">
-                <a:effectLst/>
-                <a:latin typeface="Consolas" panose="020B0609020204030204" pitchFamily="49" charset="0"/>
-                <a:cs typeface="Consolas" panose="020B0609020204030204" pitchFamily="49" charset="0"/>
-              </a:rPr>
-              <a:t>mock</a:t>
-            </a:r>
-            <a:r>
-              <a:rPr lang="sv-SE" sz="1800" dirty="0">
-                <a:effectLst/>
-                <a:latin typeface="Consolas" panose="020B0609020204030204" pitchFamily="49" charset="0"/>
-                <a:cs typeface="Consolas" panose="020B0609020204030204" pitchFamily="49" charset="0"/>
-              </a:rPr>
-              <a:t>(</a:t>
-            </a:r>
-            <a:r>
-              <a:rPr lang="sv-SE" sz="1800" dirty="0" err="1">
-                <a:effectLst/>
-                <a:latin typeface="Consolas" panose="020B0609020204030204" pitchFamily="49" charset="0"/>
-                <a:cs typeface="Consolas" panose="020B0609020204030204" pitchFamily="49" charset="0"/>
-              </a:rPr>
-              <a:t>Collaborator.class</a:t>
-            </a:r>
-            <a:r>
-              <a:rPr lang="sv-SE" sz="1800" dirty="0">
-                <a:effectLst/>
-                <a:latin typeface="Consolas" panose="020B0609020204030204" pitchFamily="49" charset="0"/>
-                <a:cs typeface="Consolas" panose="020B0609020204030204" pitchFamily="49" charset="0"/>
-              </a:rPr>
-              <a:t>)</a:t>
-            </a:r>
-          </a:p>
-          <a:p>
-            <a:pPr algn="l"/>
-            <a:endParaRPr lang="sv-SE" sz="1800" dirty="0">
-              <a:effectLst/>
-              <a:latin typeface="Consolas" panose="020B0609020204030204" pitchFamily="49" charset="0"/>
-              <a:cs typeface="Consolas" panose="020B0609020204030204" pitchFamily="49" charset="0"/>
-            </a:endParaRPr>
-          </a:p>
-          <a:p>
-            <a:pPr algn="l"/>
-            <a:r>
-              <a:rPr lang="sv-SE" sz="1800" dirty="0"/>
-              <a:t>Skapa </a:t>
-            </a:r>
-            <a:r>
-              <a:rPr lang="sv-SE" sz="1800" dirty="0" err="1"/>
-              <a:t>mock</a:t>
-            </a:r>
-            <a:r>
-              <a:rPr lang="sv-SE" sz="1800" dirty="0"/>
-              <a:t>, alternativ 2:</a:t>
-            </a:r>
-          </a:p>
-          <a:p>
-            <a:pPr algn="l"/>
-            <a:r>
-              <a:rPr lang="sv-SE" sz="1800" dirty="0">
-                <a:effectLst/>
-                <a:latin typeface="Consolas" panose="020B0609020204030204" pitchFamily="49" charset="0"/>
-                <a:cs typeface="Consolas" panose="020B0609020204030204" pitchFamily="49" charset="0"/>
-              </a:rPr>
-              <a:t>@</a:t>
-            </a:r>
-            <a:r>
-              <a:rPr lang="sv-SE" sz="1800" dirty="0" err="1">
-                <a:effectLst/>
-                <a:latin typeface="Consolas" panose="020B0609020204030204" pitchFamily="49" charset="0"/>
-                <a:cs typeface="Consolas" panose="020B0609020204030204" pitchFamily="49" charset="0"/>
-              </a:rPr>
-              <a:t>RunWith</a:t>
-            </a:r>
-            <a:r>
-              <a:rPr lang="sv-SE" sz="1800" dirty="0">
-                <a:effectLst/>
-                <a:latin typeface="Consolas" panose="020B0609020204030204" pitchFamily="49" charset="0"/>
-                <a:cs typeface="Consolas" panose="020B0609020204030204" pitchFamily="49" charset="0"/>
-              </a:rPr>
-              <a:t>(</a:t>
-            </a:r>
-            <a:r>
-              <a:rPr lang="sv-SE" sz="1800" dirty="0" err="1">
-                <a:effectLst/>
-                <a:latin typeface="Consolas" panose="020B0609020204030204" pitchFamily="49" charset="0"/>
-                <a:cs typeface="Consolas" panose="020B0609020204030204" pitchFamily="49" charset="0"/>
-              </a:rPr>
-              <a:t>MockitoJUnitRunner.class</a:t>
-            </a:r>
-            <a:r>
-              <a:rPr lang="sv-SE" sz="1800" dirty="0">
-                <a:effectLst/>
-                <a:latin typeface="Consolas" panose="020B0609020204030204" pitchFamily="49" charset="0"/>
-                <a:cs typeface="Consolas" panose="020B0609020204030204" pitchFamily="49" charset="0"/>
-              </a:rPr>
-              <a:t>)</a:t>
-            </a:r>
-          </a:p>
-          <a:p>
-            <a:pPr algn="l"/>
-            <a:r>
-              <a:rPr lang="sv-SE" sz="1800" dirty="0">
-                <a:effectLst/>
-                <a:latin typeface="Consolas" panose="020B0609020204030204" pitchFamily="49" charset="0"/>
-                <a:cs typeface="Consolas" panose="020B0609020204030204" pitchFamily="49" charset="0"/>
-              </a:rPr>
-              <a:t>public </a:t>
-            </a:r>
-            <a:r>
-              <a:rPr lang="sv-SE" sz="1800" dirty="0" err="1">
-                <a:effectLst/>
-                <a:latin typeface="Consolas" panose="020B0609020204030204" pitchFamily="49" charset="0"/>
-                <a:cs typeface="Consolas" panose="020B0609020204030204" pitchFamily="49" charset="0"/>
-              </a:rPr>
-              <a:t>class</a:t>
-            </a:r>
-            <a:r>
-              <a:rPr lang="sv-SE" sz="1800" dirty="0">
-                <a:effectLst/>
-                <a:latin typeface="Consolas" panose="020B0609020204030204" pitchFamily="49" charset="0"/>
-                <a:cs typeface="Consolas" panose="020B0609020204030204" pitchFamily="49" charset="0"/>
-              </a:rPr>
-              <a:t> </a:t>
-            </a:r>
-            <a:r>
-              <a:rPr lang="sv-SE" sz="1800" dirty="0" err="1">
-                <a:effectLst/>
-                <a:latin typeface="Consolas" panose="020B0609020204030204" pitchFamily="49" charset="0"/>
-                <a:cs typeface="Consolas" panose="020B0609020204030204" pitchFamily="49" charset="0"/>
-              </a:rPr>
-              <a:t>MyClassTest</a:t>
-            </a:r>
-            <a:r>
-              <a:rPr lang="sv-SE" sz="1800" dirty="0">
-                <a:effectLst/>
-                <a:latin typeface="Consolas" panose="020B0609020204030204" pitchFamily="49" charset="0"/>
-                <a:cs typeface="Consolas" panose="020B0609020204030204" pitchFamily="49" charset="0"/>
-              </a:rPr>
-              <a:t> {</a:t>
-            </a:r>
-          </a:p>
-          <a:p>
-            <a:pPr algn="l"/>
-            <a:r>
-              <a:rPr lang="sv-SE" sz="1800" dirty="0">
-                <a:effectLst/>
-                <a:latin typeface="Consolas" panose="020B0609020204030204" pitchFamily="49" charset="0"/>
-                <a:cs typeface="Consolas" panose="020B0609020204030204" pitchFamily="49" charset="0"/>
-              </a:rPr>
-              <a:t>	@</a:t>
-            </a:r>
-            <a:r>
-              <a:rPr lang="sv-SE" sz="1800" dirty="0" err="1">
-                <a:effectLst/>
-                <a:latin typeface="Consolas" panose="020B0609020204030204" pitchFamily="49" charset="0"/>
-                <a:cs typeface="Consolas" panose="020B0609020204030204" pitchFamily="49" charset="0"/>
-              </a:rPr>
-              <a:t>Mock</a:t>
-            </a:r>
-            <a:endParaRPr lang="sv-SE" sz="1800" dirty="0">
-              <a:effectLst/>
-              <a:latin typeface="Consolas" panose="020B0609020204030204" pitchFamily="49" charset="0"/>
-              <a:cs typeface="Consolas" panose="020B0609020204030204" pitchFamily="49" charset="0"/>
-            </a:endParaRPr>
-          </a:p>
-          <a:p>
-            <a:pPr algn="l"/>
-            <a:r>
-              <a:rPr lang="sv-SE" sz="1800" dirty="0">
-                <a:effectLst/>
-                <a:latin typeface="Consolas" panose="020B0609020204030204" pitchFamily="49" charset="0"/>
-                <a:cs typeface="Consolas" panose="020B0609020204030204" pitchFamily="49" charset="0"/>
-              </a:rPr>
-              <a:t>	private </a:t>
-            </a:r>
-            <a:r>
-              <a:rPr lang="sv-SE" sz="1800" dirty="0" err="1">
-                <a:effectLst/>
-                <a:latin typeface="Consolas" panose="020B0609020204030204" pitchFamily="49" charset="0"/>
-                <a:cs typeface="Consolas" panose="020B0609020204030204" pitchFamily="49" charset="0"/>
-              </a:rPr>
-              <a:t>Collaborator</a:t>
-            </a:r>
-            <a:r>
-              <a:rPr lang="sv-SE" sz="1800" dirty="0">
-                <a:effectLst/>
-                <a:latin typeface="Consolas" panose="020B0609020204030204" pitchFamily="49" charset="0"/>
-                <a:cs typeface="Consolas" panose="020B0609020204030204" pitchFamily="49" charset="0"/>
-              </a:rPr>
-              <a:t> </a:t>
-            </a:r>
-            <a:r>
-              <a:rPr lang="sv-SE" sz="1800" dirty="0" err="1">
-                <a:effectLst/>
-                <a:latin typeface="Consolas" panose="020B0609020204030204" pitchFamily="49" charset="0"/>
-                <a:cs typeface="Consolas" panose="020B0609020204030204" pitchFamily="49" charset="0"/>
-              </a:rPr>
-              <a:t>collaborator</a:t>
-            </a:r>
-            <a:r>
-              <a:rPr lang="sv-SE" sz="1800" dirty="0">
-                <a:effectLst/>
-                <a:latin typeface="Consolas" panose="020B0609020204030204" pitchFamily="49" charset="0"/>
-                <a:cs typeface="Consolas" panose="020B0609020204030204" pitchFamily="49" charset="0"/>
-              </a:rPr>
-              <a:t>;</a:t>
-            </a:r>
-          </a:p>
-          <a:p>
-            <a:pPr algn="l"/>
-            <a:r>
-              <a:rPr lang="sv-SE" sz="1800" dirty="0">
-                <a:effectLst/>
-                <a:latin typeface="Consolas" panose="020B0609020204030204" pitchFamily="49" charset="0"/>
-                <a:cs typeface="Consolas" panose="020B0609020204030204" pitchFamily="49" charset="0"/>
-              </a:rPr>
-              <a:t>}</a:t>
-            </a:r>
-          </a:p>
-          <a:p>
-            <a:pPr algn="l"/>
-            <a:endParaRPr lang="sv-SE" sz="1800" dirty="0">
-              <a:effectLst/>
-              <a:latin typeface="Consolas" panose="020B0609020204030204" pitchFamily="49" charset="0"/>
-              <a:cs typeface="Consolas" panose="020B0609020204030204" pitchFamily="49" charset="0"/>
-            </a:endParaRPr>
-          </a:p>
-          <a:p>
-            <a:pPr algn="l"/>
-            <a:r>
-              <a:rPr lang="sv-SE" sz="1800" dirty="0"/>
-              <a:t>Sätta upp beteende:</a:t>
-            </a:r>
-          </a:p>
-          <a:p>
-            <a:pPr algn="l"/>
-            <a:r>
-              <a:rPr lang="sv-SE" sz="1800" dirty="0" err="1">
-                <a:effectLst/>
-                <a:latin typeface="Consolas" panose="020B0609020204030204" pitchFamily="49" charset="0"/>
-                <a:cs typeface="Consolas" panose="020B0609020204030204" pitchFamily="49" charset="0"/>
-              </a:rPr>
-              <a:t>when</a:t>
-            </a:r>
-            <a:r>
-              <a:rPr lang="sv-SE" sz="1800" dirty="0">
-                <a:effectLst/>
-                <a:latin typeface="Consolas" panose="020B0609020204030204" pitchFamily="49" charset="0"/>
-                <a:cs typeface="Consolas" panose="020B0609020204030204" pitchFamily="49" charset="0"/>
-              </a:rPr>
-              <a:t>(</a:t>
-            </a:r>
-            <a:r>
-              <a:rPr lang="sv-SE" sz="1800" dirty="0" err="1">
-                <a:effectLst/>
-                <a:latin typeface="Consolas" panose="020B0609020204030204" pitchFamily="49" charset="0"/>
-                <a:cs typeface="Consolas" panose="020B0609020204030204" pitchFamily="49" charset="0"/>
-              </a:rPr>
-              <a:t>collaborator.uppercase</a:t>
-            </a:r>
-            <a:r>
-              <a:rPr lang="sv-SE" sz="1800" dirty="0">
-                <a:effectLst/>
-                <a:latin typeface="Consolas" panose="020B0609020204030204" pitchFamily="49" charset="0"/>
-                <a:cs typeface="Consolas" panose="020B0609020204030204" pitchFamily="49" charset="0"/>
-              </a:rPr>
-              <a:t>("</a:t>
-            </a:r>
-            <a:r>
-              <a:rPr lang="sv-SE" sz="1800" dirty="0" err="1">
-                <a:effectLst/>
-                <a:latin typeface="Consolas" panose="020B0609020204030204" pitchFamily="49" charset="0"/>
-                <a:cs typeface="Consolas" panose="020B0609020204030204" pitchFamily="49" charset="0"/>
-              </a:rPr>
-              <a:t>abcd</a:t>
-            </a:r>
-            <a:r>
-              <a:rPr lang="sv-SE" sz="1800" dirty="0">
-                <a:effectLst/>
-                <a:latin typeface="Consolas" panose="020B0609020204030204" pitchFamily="49" charset="0"/>
-                <a:cs typeface="Consolas" panose="020B0609020204030204" pitchFamily="49" charset="0"/>
-              </a:rPr>
-              <a:t>")).</a:t>
-            </a:r>
-            <a:r>
-              <a:rPr lang="sv-SE" sz="1800" dirty="0" err="1">
-                <a:effectLst/>
-                <a:latin typeface="Consolas" panose="020B0609020204030204" pitchFamily="49" charset="0"/>
-                <a:cs typeface="Consolas" panose="020B0609020204030204" pitchFamily="49" charset="0"/>
-              </a:rPr>
-              <a:t>thenReturn</a:t>
-            </a:r>
-            <a:r>
-              <a:rPr lang="sv-SE" sz="1800" dirty="0">
-                <a:effectLst/>
-                <a:latin typeface="Consolas" panose="020B0609020204030204" pitchFamily="49" charset="0"/>
-                <a:cs typeface="Consolas" panose="020B0609020204030204" pitchFamily="49" charset="0"/>
-              </a:rPr>
-              <a:t>("ABCD");</a:t>
-            </a:r>
-          </a:p>
-          <a:p>
-            <a:pPr algn="l"/>
-            <a:r>
-              <a:rPr lang="sv-SE" sz="1800" dirty="0"/>
-              <a:t>Lathund: </a:t>
-            </a:r>
-            <a:r>
-              <a:rPr lang="sv-SE" sz="1800" dirty="0">
-                <a:hlinkClick r:id="rId2"/>
-              </a:rPr>
-              <a:t>https://dzone.com/refcardz/mockito</a:t>
-            </a:r>
-            <a:endParaRPr lang="sv-SE" sz="1800" dirty="0"/>
-          </a:p>
-          <a:p>
-            <a:pPr algn="l"/>
+            <a:endParaRPr lang="sv-SE" dirty="0"/>
+          </a:p>
+          <a:p>
+            <a:pPr marL="342900" indent="-342900" algn="l">
+              <a:buFont typeface="Arial" panose="020B0604020202020204" pitchFamily="34" charset="0"/>
+              <a:buChar char="•"/>
+            </a:pPr>
             <a:endParaRPr lang="sv-SE" dirty="0"/>
           </a:p>
         </p:txBody>
@@ -3982,7 +3604,7 @@
     </p:spTree>
     <p:extLst>
       <p:ext uri="{BB962C8B-B14F-4D97-AF65-F5344CB8AC3E}">
-        <p14:creationId xmlns:p14="http://schemas.microsoft.com/office/powerpoint/2010/main" val="2634523073"/>
+        <p14:creationId xmlns:p14="http://schemas.microsoft.com/office/powerpoint/2010/main" val="1957325092"/>
       </p:ext>
     </p:extLst>
   </p:cSld>
@@ -4027,19 +3649,20 @@
         </p:nvSpPr>
         <p:spPr>
           <a:xfrm>
-            <a:off x="620110" y="603379"/>
-            <a:ext cx="2333297" cy="1614304"/>
+            <a:off x="832021" y="603379"/>
+            <a:ext cx="6731753" cy="626331"/>
           </a:xfrm>
         </p:spPr>
         <p:txBody>
           <a:bodyPr anchor="ctr">
-            <a:normAutofit/>
+            <a:noAutofit/>
           </a:bodyPr>
           <a:lstStyle/>
           <a:p>
+            <a:pPr algn="l"/>
             <a:r>
               <a:rPr lang="sv-SE" sz="3600" b="1" dirty="0"/>
-              <a:t>Egenskaper</a:t>
+              <a:t>Demo: Test med externt beroende</a:t>
             </a:r>
           </a:p>
         </p:txBody>
@@ -4062,8 +3685,8 @@
         </p:nvSpPr>
         <p:spPr>
           <a:xfrm>
-            <a:off x="3175687" y="603379"/>
-            <a:ext cx="8921719" cy="5976097"/>
+            <a:off x="3175688" y="2060027"/>
+            <a:ext cx="7492312" cy="3160043"/>
           </a:xfrm>
         </p:spPr>
         <p:txBody>
@@ -4078,7 +3701,7 @@
             </a:pPr>
             <a:r>
               <a:rPr lang="sv-SE" dirty="0"/>
-              <a:t>Exekveringstid</a:t>
+              <a:t>Trolla bort besvärliga beroenden</a:t>
             </a:r>
           </a:p>
           <a:p>
@@ -4087,8 +3710,12 @@
               <a:buChar char="•"/>
             </a:pPr>
             <a:r>
-              <a:rPr lang="sv-SE" dirty="0"/>
-              <a:t>Målgrupp</a:t>
+              <a:rPr lang="sv-SE" dirty="0" err="1"/>
+              <a:t>Mock</a:t>
+            </a:r>
+            <a:r>
+              <a:rPr lang="sv-SE" dirty="0"/>
+              <a:t> – attrapp. Egengjorda eller med befintliga verktyg</a:t>
             </a:r>
           </a:p>
           <a:p>
@@ -4097,8 +3724,20 @@
               <a:buChar char="•"/>
             </a:pPr>
             <a:r>
-              <a:rPr lang="sv-SE" dirty="0"/>
-              <a:t>Stabilitet</a:t>
+              <a:rPr lang="sv-SE" dirty="0" err="1"/>
+              <a:t>Dependency</a:t>
+            </a:r>
+            <a:r>
+              <a:rPr lang="sv-SE" dirty="0"/>
+              <a:t> </a:t>
+            </a:r>
+            <a:r>
+              <a:rPr lang="sv-SE" dirty="0" err="1"/>
+              <a:t>injection</a:t>
+            </a:r>
+            <a:r>
+              <a:rPr lang="sv-SE" dirty="0"/>
+              <a:t> – beroendehantering</a:t>
             </a:r>
           </a:p>
           <a:p>
@@ -4108,7 +3747,23 @@
             </a:pPr>
             <a:r>
               <a:rPr lang="sv-SE" dirty="0"/>
-              <a:t>Beroenden</a:t>
+              <a:t>Separation </a:t>
+            </a:r>
+            <a:r>
+              <a:rPr lang="sv-SE" dirty="0" err="1"/>
+              <a:t>of</a:t>
+            </a:r>
+            <a:r>
+              <a:rPr lang="sv-SE" dirty="0"/>
+              <a:t> </a:t>
+            </a:r>
+            <a:r>
+              <a:rPr lang="sv-SE" dirty="0" err="1"/>
+              <a:t>concern</a:t>
+            </a:r>
+            <a:r>
+              <a:rPr lang="sv-SE" dirty="0"/>
+              <a:t> - ansvarsseparering</a:t>
             </a:r>
           </a:p>
           <a:p>
@@ -4116,7 +3771,10 @@
             <a:endParaRPr lang="sv-SE" dirty="0"/>
           </a:p>
           <a:p>
-            <a:pPr algn="l"/>
+            <a:pPr marL="342900" indent="-342900" algn="l">
+              <a:buFont typeface="Arial" panose="020B0604020202020204" pitchFamily="34" charset="0"/>
+              <a:buChar char="•"/>
+            </a:pPr>
             <a:endParaRPr lang="sv-SE" dirty="0"/>
           </a:p>
         </p:txBody>
@@ -4124,7 +3782,7 @@
     </p:spTree>
     <p:extLst>
       <p:ext uri="{BB962C8B-B14F-4D97-AF65-F5344CB8AC3E}">
-        <p14:creationId xmlns:p14="http://schemas.microsoft.com/office/powerpoint/2010/main" val="1267284021"/>
+        <p14:creationId xmlns:p14="http://schemas.microsoft.com/office/powerpoint/2010/main" val="4103962270"/>
       </p:ext>
     </p:extLst>
   </p:cSld>
@@ -4169,19 +3827,24 @@
         </p:nvSpPr>
         <p:spPr>
           <a:xfrm>
-            <a:off x="620110" y="603379"/>
-            <a:ext cx="2333297" cy="1614304"/>
+            <a:off x="832022" y="603379"/>
+            <a:ext cx="6163582" cy="626331"/>
           </a:xfrm>
         </p:spPr>
         <p:txBody>
           <a:bodyPr anchor="ctr">
-            <a:normAutofit/>
+            <a:noAutofit/>
           </a:bodyPr>
           <a:lstStyle/>
           <a:p>
-            <a:r>
-              <a:rPr lang="sv-SE" sz="3200" b="1" dirty="0"/>
-              <a:t>Andra metoder och sätt</a:t>
+            <a:pPr algn="l"/>
+            <a:r>
+              <a:rPr lang="sv-SE" sz="3600" b="1" dirty="0" err="1"/>
+              <a:t>Mockito</a:t>
+            </a:r>
+            <a:r>
+              <a:rPr lang="sv-SE" sz="3600" b="1" dirty="0"/>
+              <a:t> exempel</a:t>
             </a:r>
           </a:p>
         </p:txBody>
@@ -4204,8 +3867,8 @@
         </p:nvSpPr>
         <p:spPr>
           <a:xfrm>
-            <a:off x="3175687" y="603379"/>
-            <a:ext cx="8921719" cy="5976097"/>
+            <a:off x="3175688" y="2060027"/>
+            <a:ext cx="7492312" cy="3160043"/>
           </a:xfrm>
         </p:spPr>
         <p:txBody>
@@ -4220,21 +3883,68 @@
             </a:pPr>
             <a:r>
               <a:rPr lang="sv-SE" dirty="0"/>
-              <a:t>BDD: </a:t>
+              <a:t>Skapa </a:t>
             </a:r>
             <a:r>
               <a:rPr lang="sv-SE" dirty="0" err="1"/>
-              <a:t>Behaviour</a:t>
-            </a:r>
-            <a:r>
-              <a:rPr lang="sv-SE" dirty="0"/>
-              <a:t>-Driven </a:t>
-            </a:r>
-            <a:r>
-              <a:rPr lang="sv-SE" dirty="0" err="1"/>
-              <a:t>Development</a:t>
-            </a:r>
-            <a:endParaRPr lang="sv-SE" dirty="0"/>
+              <a:t>mock</a:t>
+            </a:r>
+            <a:r>
+              <a:rPr lang="sv-SE" sz="1600" dirty="0"/>
+              <a:t>:</a:t>
+            </a:r>
+            <a:br>
+              <a:rPr lang="sv-SE" sz="1600" dirty="0"/>
+            </a:br>
+            <a:r>
+              <a:rPr lang="sv-SE" sz="1600" dirty="0" err="1">
+                <a:latin typeface="Consolas" panose="020B0609020204030204" pitchFamily="49" charset="0"/>
+              </a:rPr>
+              <a:t>HttpClient</a:t>
+            </a:r>
+            <a:r>
+              <a:rPr lang="sv-SE" sz="1600" dirty="0">
+                <a:latin typeface="Consolas" panose="020B0609020204030204" pitchFamily="49" charset="0"/>
+              </a:rPr>
+              <a:t> </a:t>
+            </a:r>
+            <a:r>
+              <a:rPr lang="sv-SE" sz="1600" dirty="0" err="1">
+                <a:latin typeface="Consolas" panose="020B0609020204030204" pitchFamily="49" charset="0"/>
+              </a:rPr>
+              <a:t>httpClient</a:t>
+            </a:r>
+            <a:r>
+              <a:rPr lang="sv-SE" sz="1600" dirty="0">
+                <a:latin typeface="Consolas" panose="020B0609020204030204" pitchFamily="49" charset="0"/>
+              </a:rPr>
+              <a:t> = </a:t>
+            </a:r>
+            <a:r>
+              <a:rPr lang="sv-SE" sz="1600" dirty="0" err="1">
+                <a:latin typeface="Consolas" panose="020B0609020204030204" pitchFamily="49" charset="0"/>
+              </a:rPr>
+              <a:t>Mockito.mock</a:t>
+            </a:r>
+            <a:r>
+              <a:rPr lang="sv-SE" sz="1600" dirty="0">
+                <a:latin typeface="Consolas" panose="020B0609020204030204" pitchFamily="49" charset="0"/>
+              </a:rPr>
+              <a:t>(</a:t>
+            </a:r>
+            <a:r>
+              <a:rPr lang="sv-SE" sz="1600" dirty="0" err="1">
+                <a:latin typeface="Consolas" panose="020B0609020204030204" pitchFamily="49" charset="0"/>
+              </a:rPr>
+              <a:t>HttpClient.class</a:t>
+            </a:r>
+            <a:r>
+              <a:rPr lang="sv-SE" sz="1600" dirty="0">
+                <a:latin typeface="Consolas" panose="020B0609020204030204" pitchFamily="49" charset="0"/>
+              </a:rPr>
+              <a:t>);</a:t>
+            </a:r>
+            <a:endParaRPr lang="sv-SE" sz="1600" dirty="0"/>
           </a:p>
           <a:p>
             <a:pPr marL="342900" indent="-342900" algn="l">
@@ -4243,21 +3953,60 @@
             </a:pPr>
             <a:r>
               <a:rPr lang="sv-SE" dirty="0"/>
-              <a:t>ATDD: </a:t>
-            </a:r>
-            <a:r>
-              <a:rPr lang="sv-SE" dirty="0" err="1"/>
-              <a:t>Acceptance</a:t>
-            </a:r>
-            <a:r>
-              <a:rPr lang="sv-SE" dirty="0"/>
-              <a:t> Test Driven </a:t>
-            </a:r>
-            <a:r>
-              <a:rPr lang="sv-SE" dirty="0" err="1"/>
-              <a:t>Development</a:t>
-            </a:r>
-            <a:endParaRPr lang="sv-SE" dirty="0"/>
+              <a:t>Sätta upp beteende:</a:t>
+            </a:r>
+            <a:br>
+              <a:rPr lang="sv-SE" dirty="0"/>
+            </a:br>
+            <a:r>
+              <a:rPr lang="sv-SE" sz="1600" dirty="0" err="1">
+                <a:latin typeface="Consolas" panose="020B0609020204030204" pitchFamily="49" charset="0"/>
+              </a:rPr>
+              <a:t>Mockito.when</a:t>
+            </a:r>
+            <a:r>
+              <a:rPr lang="sv-SE" sz="1600" dirty="0">
+                <a:latin typeface="Consolas" panose="020B0609020204030204" pitchFamily="49" charset="0"/>
+              </a:rPr>
+              <a:t>(</a:t>
+            </a:r>
+            <a:r>
+              <a:rPr lang="sv-SE" sz="1600" dirty="0" err="1">
+                <a:latin typeface="Consolas" panose="020B0609020204030204" pitchFamily="49" charset="0"/>
+              </a:rPr>
+              <a:t>httpClient.get</a:t>
+            </a:r>
+            <a:r>
+              <a:rPr lang="sv-SE" sz="1600" dirty="0">
+                <a:latin typeface="Consolas" panose="020B0609020204030204" pitchFamily="49" charset="0"/>
+              </a:rPr>
+              <a:t>(</a:t>
+            </a:r>
+            <a:r>
+              <a:rPr lang="sv-SE" sz="1600" dirty="0" err="1">
+                <a:latin typeface="Consolas" panose="020B0609020204030204" pitchFamily="49" charset="0"/>
+              </a:rPr>
+              <a:t>Mockito.any</a:t>
+            </a:r>
+            <a:r>
+              <a:rPr lang="sv-SE" sz="1600" dirty="0">
+                <a:latin typeface="Consolas" panose="020B0609020204030204" pitchFamily="49" charset="0"/>
+              </a:rPr>
+              <a:t>())).</a:t>
+            </a:r>
+            <a:r>
+              <a:rPr lang="sv-SE" sz="1600" dirty="0" err="1">
+                <a:latin typeface="Consolas" panose="020B0609020204030204" pitchFamily="49" charset="0"/>
+              </a:rPr>
+              <a:t>thenReturn</a:t>
+            </a:r>
+            <a:r>
+              <a:rPr lang="sv-SE" sz="1600" dirty="0">
+                <a:latin typeface="Consolas" panose="020B0609020204030204" pitchFamily="49" charset="0"/>
+              </a:rPr>
+              <a:t>("OK");</a:t>
+            </a:r>
+            <a:endParaRPr lang="sv-SE" sz="1600" dirty="0"/>
           </a:p>
           <a:p>
             <a:pPr marL="342900" indent="-342900" algn="l">
@@ -4266,54 +4015,74 @@
             </a:pPr>
             <a:r>
               <a:rPr lang="sv-SE" dirty="0"/>
-              <a:t>Property </a:t>
+              <a:t>Verifiera </a:t>
             </a:r>
             <a:r>
               <a:rPr lang="sv-SE" dirty="0" err="1"/>
-              <a:t>based</a:t>
-            </a:r>
-            <a:r>
-              <a:rPr lang="sv-SE" dirty="0"/>
-              <a:t> </a:t>
-            </a:r>
-            <a:r>
-              <a:rPr lang="sv-SE" dirty="0" err="1"/>
-              <a:t>testing</a:t>
-            </a:r>
-            <a:endParaRPr lang="sv-SE" dirty="0"/>
+              <a:t>mock</a:t>
+            </a:r>
+            <a:r>
+              <a:rPr lang="sv-SE" dirty="0"/>
+              <a:t>:</a:t>
+            </a:r>
+            <a:br>
+              <a:rPr lang="sv-SE" dirty="0"/>
+            </a:br>
+            <a:r>
+              <a:rPr lang="sv-SE" sz="1600" dirty="0" err="1">
+                <a:latin typeface="Consolas" panose="020B0609020204030204" pitchFamily="49" charset="0"/>
+              </a:rPr>
+              <a:t>Mockito.verify</a:t>
+            </a:r>
+            <a:r>
+              <a:rPr lang="sv-SE" sz="1600" dirty="0">
+                <a:latin typeface="Consolas" panose="020B0609020204030204" pitchFamily="49" charset="0"/>
+              </a:rPr>
+              <a:t>(</a:t>
+            </a:r>
+            <a:r>
+              <a:rPr lang="sv-SE" sz="1600" dirty="0" err="1">
+                <a:latin typeface="Consolas" panose="020B0609020204030204" pitchFamily="49" charset="0"/>
+              </a:rPr>
+              <a:t>httpClient</a:t>
+            </a:r>
+            <a:r>
+              <a:rPr lang="sv-SE" sz="1600" dirty="0">
+                <a:latin typeface="Consolas" panose="020B0609020204030204" pitchFamily="49" charset="0"/>
+              </a:rPr>
+              <a:t>).get(</a:t>
+            </a:r>
+            <a:r>
+              <a:rPr lang="sv-SE" sz="1600" dirty="0" err="1">
+                <a:latin typeface="Consolas" panose="020B0609020204030204" pitchFamily="49" charset="0"/>
+              </a:rPr>
+              <a:t>URI.create</a:t>
+            </a:r>
+            <a:r>
+              <a:rPr lang="sv-SE" sz="1600" dirty="0">
+                <a:latin typeface="Consolas" panose="020B0609020204030204" pitchFamily="49" charset="0"/>
+              </a:rPr>
+              <a:t>("/</a:t>
+            </a:r>
+            <a:r>
+              <a:rPr lang="sv-SE" sz="1600" dirty="0" err="1">
+                <a:latin typeface="Consolas" panose="020B0609020204030204" pitchFamily="49" charset="0"/>
+              </a:rPr>
+              <a:t>healthcheck</a:t>
+            </a:r>
+            <a:r>
+              <a:rPr lang="sv-SE" sz="1600" dirty="0">
+                <a:latin typeface="Consolas" panose="020B0609020204030204" pitchFamily="49" charset="0"/>
+              </a:rPr>
+              <a:t>"));</a:t>
+            </a:r>
+            <a:endParaRPr lang="sv-SE" sz="1600" dirty="0"/>
           </a:p>
           <a:p>
             <a:pPr marL="342900" indent="-342900" algn="l">
               <a:buFont typeface="Arial" panose="020B0604020202020204" pitchFamily="34" charset="0"/>
               <a:buChar char="•"/>
             </a:pPr>
-            <a:r>
-              <a:rPr lang="sv-SE" dirty="0"/>
-              <a:t>Mutation </a:t>
-            </a:r>
-            <a:r>
-              <a:rPr lang="sv-SE" dirty="0" err="1"/>
-              <a:t>testing</a:t>
-            </a:r>
-            <a:endParaRPr lang="sv-SE" dirty="0"/>
-          </a:p>
-          <a:p>
-            <a:pPr algn="l"/>
-            <a:endParaRPr lang="sv-SE" dirty="0"/>
-          </a:p>
-          <a:p>
-            <a:pPr marL="342900" indent="-342900" algn="l">
-              <a:buFont typeface="Arial" panose="020B0604020202020204" pitchFamily="34" charset="0"/>
-              <a:buChar char="•"/>
-            </a:pPr>
-            <a:endParaRPr lang="sv-SE" dirty="0"/>
-          </a:p>
-          <a:p>
-            <a:pPr algn="l"/>
-            <a:endParaRPr lang="sv-SE" dirty="0"/>
-          </a:p>
-          <a:p>
-            <a:pPr algn="l"/>
             <a:endParaRPr lang="sv-SE" dirty="0"/>
           </a:p>
         </p:txBody>
@@ -4321,7 +4090,7 @@
     </p:spTree>
     <p:extLst>
       <p:ext uri="{BB962C8B-B14F-4D97-AF65-F5344CB8AC3E}">
-        <p14:creationId xmlns:p14="http://schemas.microsoft.com/office/powerpoint/2010/main" val="3132497319"/>
+        <p14:creationId xmlns:p14="http://schemas.microsoft.com/office/powerpoint/2010/main" val="1825566262"/>
       </p:ext>
     </p:extLst>
   </p:cSld>
@@ -4366,8 +4135,8 @@
         </p:nvSpPr>
         <p:spPr>
           <a:xfrm>
-            <a:off x="620110" y="603379"/>
-            <a:ext cx="2333297" cy="1614304"/>
+            <a:off x="832022" y="603379"/>
+            <a:ext cx="4633357" cy="626331"/>
           </a:xfrm>
         </p:spPr>
         <p:txBody>
@@ -4377,8 +4146,8 @@
           <a:lstStyle/>
           <a:p>
             <a:r>
-              <a:rPr lang="sv-SE" sz="3200" b="1" dirty="0"/>
-              <a:t>Verktyg</a:t>
+              <a:rPr lang="sv-SE" sz="3600" b="1" dirty="0"/>
+              <a:t>Mobbprogrammering</a:t>
             </a:r>
           </a:p>
         </p:txBody>
@@ -4401,25 +4170,29 @@
         </p:nvSpPr>
         <p:spPr>
           <a:xfrm>
-            <a:off x="3175687" y="603379"/>
-            <a:ext cx="8921719" cy="5976097"/>
+            <a:off x="3175688" y="2060028"/>
+            <a:ext cx="7492312" cy="3197772"/>
           </a:xfrm>
         </p:spPr>
         <p:txBody>
-          <a:bodyPr>
-            <a:normAutofit/>
-          </a:bodyPr>
-          <a:lstStyle/>
+          <a:bodyPr/>
+          <a:lstStyle/>
+          <a:p>
+            <a:pPr algn="l"/>
+            <a:r>
+              <a:rPr lang="sv-SE" dirty="0"/>
+              <a:t>Ändrade krav: Vi vill slå upp priserna istället för att ha dessa i koden.</a:t>
+            </a:r>
+          </a:p>
           <a:p>
             <a:pPr marL="342900" indent="-342900" algn="l">
               <a:buFont typeface="Arial" panose="020B0604020202020204" pitchFamily="34" charset="0"/>
               <a:buChar char="•"/>
             </a:pPr>
             <a:r>
-              <a:rPr lang="sv-SE" dirty="0" err="1"/>
-              <a:t>Testkörare</a:t>
-            </a:r>
-            <a:endParaRPr lang="sv-SE" dirty="0"/>
+              <a:rPr lang="sv-SE" dirty="0"/>
+              <a:t>Inför ansvarsseparering</a:t>
+            </a:r>
           </a:p>
           <a:p>
             <a:pPr marL="342900" indent="-342900" algn="l">
@@ -4428,17 +4201,23 @@
             </a:pPr>
             <a:r>
               <a:rPr lang="sv-SE" dirty="0"/>
-              <a:t>Förväntningar</a:t>
-            </a:r>
-          </a:p>
-          <a:p>
-            <a:pPr marL="800100" lvl="1" indent="-342900" algn="l">
-              <a:buFont typeface="Arial" panose="020B0604020202020204" pitchFamily="34" charset="0"/>
-              <a:buChar char="•"/>
-            </a:pPr>
-            <a:r>
-              <a:rPr lang="sv-SE" dirty="0"/>
-              <a:t>Matchningar</a:t>
+              <a:t>Beroendehantering (</a:t>
+            </a:r>
+            <a:r>
+              <a:rPr lang="sv-SE" dirty="0" err="1"/>
+              <a:t>dependency</a:t>
+            </a:r>
+            <a:r>
+              <a:rPr lang="sv-SE" dirty="0"/>
+              <a:t> </a:t>
+            </a:r>
+            <a:r>
+              <a:rPr lang="sv-SE" dirty="0" err="1"/>
+              <a:t>injection</a:t>
+            </a:r>
+            <a:r>
+              <a:rPr lang="sv-SE" dirty="0"/>
+              <a:t>)</a:t>
             </a:r>
           </a:p>
           <a:p>
@@ -4447,41 +4226,17 @@
               <a:buChar char="•"/>
             </a:pPr>
             <a:r>
-              <a:rPr lang="sv-SE" dirty="0"/>
-              <a:t>Dubbelgångare</a:t>
-            </a:r>
-          </a:p>
-          <a:p>
-            <a:pPr marL="800100" lvl="1" indent="-342900" algn="l">
-              <a:buFont typeface="Arial" panose="020B0604020202020204" pitchFamily="34" charset="0"/>
-              <a:buChar char="•"/>
-            </a:pPr>
-            <a:r>
-              <a:rPr lang="sv-SE" dirty="0"/>
-              <a:t>Mer om det senare...</a:t>
-            </a:r>
-          </a:p>
-          <a:p>
-            <a:pPr lvl="1" algn="l"/>
-            <a:endParaRPr lang="sv-SE" dirty="0"/>
-          </a:p>
-          <a:p>
-            <a:pPr algn="l"/>
-            <a:endParaRPr lang="sv-SE" dirty="0"/>
-          </a:p>
-          <a:p>
-            <a:pPr marL="342900" indent="-342900" algn="l">
-              <a:buFont typeface="Arial" panose="020B0604020202020204" pitchFamily="34" charset="0"/>
-              <a:buChar char="•"/>
-            </a:pPr>
-            <a:endParaRPr lang="sv-SE" dirty="0"/>
-          </a:p>
-          <a:p>
-            <a:pPr algn="l"/>
-            <a:endParaRPr lang="sv-SE" dirty="0"/>
-          </a:p>
-          <a:p>
-            <a:pPr algn="l"/>
+              <a:rPr lang="sv-SE" dirty="0" err="1"/>
+              <a:t>Mock</a:t>
+            </a:r>
+            <a:r>
+              <a:rPr lang="sv-SE" dirty="0"/>
+              <a:t>: Jobba med </a:t>
+            </a:r>
+            <a:r>
+              <a:rPr lang="sv-SE" dirty="0" err="1"/>
+              <a:t>Mockito</a:t>
+            </a:r>
             <a:endParaRPr lang="sv-SE" dirty="0"/>
           </a:p>
         </p:txBody>
@@ -4489,7 +4244,7 @@
     </p:spTree>
     <p:extLst>
       <p:ext uri="{BB962C8B-B14F-4D97-AF65-F5344CB8AC3E}">
-        <p14:creationId xmlns:p14="http://schemas.microsoft.com/office/powerpoint/2010/main" val="2238187615"/>
+        <p14:creationId xmlns:p14="http://schemas.microsoft.com/office/powerpoint/2010/main" val="4253517235"/>
       </p:ext>
     </p:extLst>
   </p:cSld>
@@ -4534,8 +4289,8 @@
         </p:nvSpPr>
         <p:spPr>
           <a:xfrm>
-            <a:off x="620110" y="603379"/>
-            <a:ext cx="2333297" cy="1614304"/>
+            <a:off x="832022" y="603379"/>
+            <a:ext cx="4633357" cy="626331"/>
           </a:xfrm>
         </p:spPr>
         <p:txBody>
@@ -4544,9 +4299,10 @@
           </a:bodyPr>
           <a:lstStyle/>
           <a:p>
-            <a:r>
-              <a:rPr lang="sv-SE" sz="3200" b="1" dirty="0"/>
-              <a:t>Verktyg för JVM</a:t>
+            <a:pPr algn="l"/>
+            <a:r>
+              <a:rPr lang="sv-SE" sz="3600" b="1" dirty="0"/>
+              <a:t>Del 3</a:t>
             </a:r>
           </a:p>
         </p:txBody>
@@ -4569,213 +4325,26 @@
         </p:nvSpPr>
         <p:spPr>
           <a:xfrm>
-            <a:off x="3175687" y="603379"/>
-            <a:ext cx="8921719" cy="5976097"/>
+            <a:off x="3175688" y="2060028"/>
+            <a:ext cx="7492312" cy="3197772"/>
           </a:xfrm>
         </p:spPr>
         <p:txBody>
-          <a:bodyPr>
-            <a:normAutofit/>
-          </a:bodyPr>
-          <a:lstStyle/>
-          <a:p>
-            <a:pPr marL="342900" indent="-342900" algn="l">
-              <a:buFont typeface="Arial" panose="020B0604020202020204" pitchFamily="34" charset="0"/>
-              <a:buChar char="•"/>
-            </a:pPr>
-            <a:r>
-              <a:rPr lang="sv-SE" dirty="0" err="1"/>
-              <a:t>Testkörare</a:t>
-            </a:r>
-            <a:r>
-              <a:rPr lang="sv-SE" dirty="0"/>
-              <a:t>: </a:t>
-            </a:r>
-            <a:r>
-              <a:rPr lang="sv-SE" b="1" dirty="0" err="1"/>
-              <a:t>Junit</a:t>
-            </a:r>
-            <a:endParaRPr lang="sv-SE" dirty="0"/>
-          </a:p>
-          <a:p>
-            <a:pPr marL="800100" lvl="1" indent="-342900" algn="l">
-              <a:buFont typeface="Arial" panose="020B0604020202020204" pitchFamily="34" charset="0"/>
-              <a:buChar char="•"/>
-            </a:pPr>
-            <a:r>
-              <a:rPr lang="sv-SE" dirty="0" err="1"/>
-              <a:t>TestNG</a:t>
-            </a:r>
-            <a:endParaRPr lang="sv-SE" dirty="0"/>
-          </a:p>
-          <a:p>
-            <a:pPr marL="800100" lvl="1" indent="-342900" algn="l">
-              <a:buFont typeface="Arial" panose="020B0604020202020204" pitchFamily="34" charset="0"/>
-              <a:buChar char="•"/>
-            </a:pPr>
-            <a:r>
-              <a:rPr lang="sv-SE" dirty="0" err="1"/>
-              <a:t>Spek</a:t>
-            </a:r>
-            <a:r>
-              <a:rPr lang="sv-SE" dirty="0"/>
-              <a:t> (</a:t>
-            </a:r>
-            <a:r>
-              <a:rPr lang="sv-SE" dirty="0" err="1"/>
-              <a:t>Kotlin</a:t>
-            </a:r>
-            <a:r>
-              <a:rPr lang="sv-SE" dirty="0"/>
-              <a:t>)</a:t>
-            </a:r>
-          </a:p>
-          <a:p>
-            <a:pPr marL="800100" lvl="1" indent="-342900" algn="l">
-              <a:buFont typeface="Arial" panose="020B0604020202020204" pitchFamily="34" charset="0"/>
-              <a:buChar char="•"/>
-            </a:pPr>
-            <a:r>
-              <a:rPr lang="sv-SE" dirty="0"/>
-              <a:t>Spock (</a:t>
-            </a:r>
-            <a:r>
-              <a:rPr lang="sv-SE" dirty="0" err="1"/>
-              <a:t>groovy</a:t>
-            </a:r>
-            <a:r>
-              <a:rPr lang="sv-SE" dirty="0"/>
-              <a:t>)</a:t>
-            </a:r>
-          </a:p>
-          <a:p>
-            <a:pPr marL="800100" lvl="1" indent="-342900" algn="l">
-              <a:buFont typeface="Arial" panose="020B0604020202020204" pitchFamily="34" charset="0"/>
-              <a:buChar char="•"/>
-            </a:pPr>
-            <a:r>
-              <a:rPr lang="sv-SE" dirty="0" err="1"/>
-              <a:t>Cucumber</a:t>
-            </a:r>
-            <a:endParaRPr lang="sv-SE" dirty="0"/>
-          </a:p>
-          <a:p>
-            <a:pPr marL="800100" lvl="1" indent="-342900" algn="l">
-              <a:buFont typeface="Arial" panose="020B0604020202020204" pitchFamily="34" charset="0"/>
-              <a:buChar char="•"/>
-            </a:pPr>
-            <a:r>
-              <a:rPr lang="sv-SE" dirty="0"/>
-              <a:t>Scalatest (Scala)</a:t>
-            </a:r>
-          </a:p>
-          <a:p>
-            <a:pPr marL="342900" indent="-342900" algn="l">
-              <a:buFont typeface="Arial" panose="020B0604020202020204" pitchFamily="34" charset="0"/>
-              <a:buChar char="•"/>
-            </a:pPr>
-            <a:r>
-              <a:rPr lang="sv-SE" dirty="0" err="1"/>
-              <a:t>Assertions</a:t>
-            </a:r>
-            <a:r>
-              <a:rPr lang="sv-SE" dirty="0"/>
-              <a:t>: </a:t>
-            </a:r>
-            <a:r>
-              <a:rPr lang="sv-SE" b="1" dirty="0" err="1"/>
-              <a:t>AssertJ</a:t>
-            </a:r>
-            <a:endParaRPr lang="sv-SE" dirty="0"/>
-          </a:p>
-          <a:p>
-            <a:pPr marL="800100" lvl="1" indent="-342900" algn="l">
-              <a:buFont typeface="Arial" panose="020B0604020202020204" pitchFamily="34" charset="0"/>
-              <a:buChar char="•"/>
-            </a:pPr>
-            <a:r>
-              <a:rPr lang="sv-SE" dirty="0" err="1"/>
-              <a:t>Hamcrest</a:t>
-            </a:r>
-            <a:endParaRPr lang="sv-SE" dirty="0"/>
-          </a:p>
-          <a:p>
-            <a:pPr marL="800100" lvl="1" indent="-342900" algn="l">
-              <a:buFont typeface="Arial" panose="020B0604020202020204" pitchFamily="34" charset="0"/>
-              <a:buChar char="•"/>
-            </a:pPr>
-            <a:r>
-              <a:rPr lang="sv-SE" dirty="0" err="1"/>
-              <a:t>Junit</a:t>
-            </a:r>
-            <a:endParaRPr lang="sv-SE" dirty="0"/>
-          </a:p>
-          <a:p>
-            <a:pPr marL="342900" indent="-342900" algn="l">
-              <a:buFont typeface="Arial" panose="020B0604020202020204" pitchFamily="34" charset="0"/>
-              <a:buChar char="•"/>
-            </a:pPr>
-            <a:r>
-              <a:rPr lang="sv-SE" dirty="0"/>
-              <a:t>Dubbelgångare: </a:t>
-            </a:r>
-            <a:r>
-              <a:rPr lang="sv-SE" b="1" dirty="0" err="1"/>
-              <a:t>Mockito</a:t>
-            </a:r>
-            <a:endParaRPr lang="sv-SE" dirty="0"/>
-          </a:p>
-          <a:p>
-            <a:pPr marL="800100" lvl="1" indent="-342900" algn="l">
-              <a:buFont typeface="Arial" panose="020B0604020202020204" pitchFamily="34" charset="0"/>
-              <a:buChar char="•"/>
-            </a:pPr>
-            <a:r>
-              <a:rPr lang="sv-SE" dirty="0" err="1"/>
-              <a:t>Easymock</a:t>
-            </a:r>
-            <a:endParaRPr lang="sv-SE" dirty="0"/>
-          </a:p>
-          <a:p>
-            <a:pPr marL="800100" lvl="1" indent="-342900" algn="l">
-              <a:buFont typeface="Arial" panose="020B0604020202020204" pitchFamily="34" charset="0"/>
-              <a:buChar char="•"/>
-            </a:pPr>
-            <a:r>
-              <a:rPr lang="sv-SE" dirty="0" err="1"/>
-              <a:t>Powermock</a:t>
-            </a:r>
-            <a:endParaRPr lang="sv-SE" dirty="0"/>
-          </a:p>
-          <a:p>
-            <a:pPr lvl="1" algn="l"/>
-            <a:endParaRPr lang="sv-SE" dirty="0"/>
-          </a:p>
+          <a:bodyPr/>
+          <a:lstStyle/>
           <a:p>
             <a:pPr algn="l"/>
-            <a:endParaRPr lang="sv-SE" dirty="0"/>
-          </a:p>
-          <a:p>
-            <a:pPr marL="342900" indent="-342900" algn="l">
-              <a:buFont typeface="Arial" panose="020B0604020202020204" pitchFamily="34" charset="0"/>
-              <a:buChar char="•"/>
-            </a:pPr>
-            <a:endParaRPr lang="sv-SE" dirty="0"/>
-          </a:p>
-          <a:p>
-            <a:pPr algn="l"/>
-            <a:endParaRPr lang="sv-SE" dirty="0"/>
-          </a:p>
-          <a:p>
-            <a:pPr algn="l"/>
-            <a:endParaRPr lang="sv-SE" dirty="0"/>
+            <a:r>
+              <a:rPr lang="sv-SE" dirty="0"/>
+              <a:t>Generellt om testning och testmetoder</a:t>
+            </a:r>
           </a:p>
         </p:txBody>
       </p:sp>
     </p:spTree>
     <p:extLst>
       <p:ext uri="{BB962C8B-B14F-4D97-AF65-F5344CB8AC3E}">
-        <p14:creationId xmlns:p14="http://schemas.microsoft.com/office/powerpoint/2010/main" val="802617698"/>
+        <p14:creationId xmlns:p14="http://schemas.microsoft.com/office/powerpoint/2010/main" val="758694239"/>
       </p:ext>
     </p:extLst>
   </p:cSld>
@@ -4786,6 +4355,345 @@
 </file>
 
 <file path=ppt/slides/slide15.xml><?xml version="1.0" encoding="utf-8"?>
+<p:sld xmlns:a="http://schemas.openxmlformats.org/drawingml/2006/main" xmlns:r="http://schemas.openxmlformats.org/officeDocument/2006/relationships" xmlns:p="http://schemas.openxmlformats.org/presentationml/2006/main">
+  <p:cSld>
+    <p:spTree>
+      <p:nvGrpSpPr>
+        <p:cNvPr id="1" name=""/>
+        <p:cNvGrpSpPr/>
+        <p:nvPr/>
+      </p:nvGrpSpPr>
+      <p:grpSpPr>
+        <a:xfrm>
+          <a:off x="0" y="0"/>
+          <a:ext cx="0" cy="0"/>
+          <a:chOff x="0" y="0"/>
+          <a:chExt cx="0" cy="0"/>
+        </a:xfrm>
+      </p:grpSpPr>
+      <p:sp>
+        <p:nvSpPr>
+          <p:cNvPr id="2" name="Title 1">
+            <a:extLst>
+              <a:ext uri="{FF2B5EF4-FFF2-40B4-BE49-F238E27FC236}">
+                <a16:creationId xmlns:a16="http://schemas.microsoft.com/office/drawing/2014/main" id="{C81699F1-5A5E-704C-9085-8117DAAEE2BF}"/>
+              </a:ext>
+            </a:extLst>
+          </p:cNvPr>
+          <p:cNvSpPr>
+            <a:spLocks noGrp="1"/>
+          </p:cNvSpPr>
+          <p:nvPr>
+            <p:ph type="ctrTitle"/>
+          </p:nvPr>
+        </p:nvSpPr>
+        <p:spPr>
+          <a:xfrm>
+            <a:off x="620110" y="603379"/>
+            <a:ext cx="2333297" cy="1614304"/>
+          </a:xfrm>
+        </p:spPr>
+        <p:txBody>
+          <a:bodyPr anchor="ctr">
+            <a:normAutofit/>
+          </a:bodyPr>
+          <a:lstStyle/>
+          <a:p>
+            <a:r>
+              <a:rPr lang="sv-SE" sz="3600" b="1" dirty="0"/>
+              <a:t>Egenskaper</a:t>
+            </a:r>
+          </a:p>
+        </p:txBody>
+      </p:sp>
+      <p:sp>
+        <p:nvSpPr>
+          <p:cNvPr id="3" name="Subtitle 2">
+            <a:extLst>
+              <a:ext uri="{FF2B5EF4-FFF2-40B4-BE49-F238E27FC236}">
+                <a16:creationId xmlns:a16="http://schemas.microsoft.com/office/drawing/2014/main" id="{556D9DB8-FEA7-1543-85E3-64536A063D0D}"/>
+              </a:ext>
+            </a:extLst>
+          </p:cNvPr>
+          <p:cNvSpPr>
+            <a:spLocks noGrp="1"/>
+          </p:cNvSpPr>
+          <p:nvPr>
+            <p:ph type="subTitle" idx="1"/>
+          </p:nvPr>
+        </p:nvSpPr>
+        <p:spPr>
+          <a:xfrm>
+            <a:off x="3175687" y="603379"/>
+            <a:ext cx="8921719" cy="5976097"/>
+          </a:xfrm>
+        </p:spPr>
+        <p:txBody>
+          <a:bodyPr>
+            <a:normAutofit/>
+          </a:bodyPr>
+          <a:lstStyle/>
+          <a:p>
+            <a:pPr marL="342900" indent="-342900" algn="l">
+              <a:buFont typeface="Arial" panose="020B0604020202020204" pitchFamily="34" charset="0"/>
+              <a:buChar char="•"/>
+            </a:pPr>
+            <a:r>
+              <a:rPr lang="sv-SE" dirty="0"/>
+              <a:t>Exekveringstid</a:t>
+            </a:r>
+          </a:p>
+          <a:p>
+            <a:pPr marL="342900" indent="-342900" algn="l">
+              <a:buFont typeface="Arial" panose="020B0604020202020204" pitchFamily="34" charset="0"/>
+              <a:buChar char="•"/>
+            </a:pPr>
+            <a:r>
+              <a:rPr lang="sv-SE" dirty="0"/>
+              <a:t>Målgrupp</a:t>
+            </a:r>
+          </a:p>
+          <a:p>
+            <a:pPr marL="342900" indent="-342900" algn="l">
+              <a:buFont typeface="Arial" panose="020B0604020202020204" pitchFamily="34" charset="0"/>
+              <a:buChar char="•"/>
+            </a:pPr>
+            <a:r>
+              <a:rPr lang="sv-SE" dirty="0"/>
+              <a:t>Stabilitet</a:t>
+            </a:r>
+          </a:p>
+          <a:p>
+            <a:pPr marL="342900" indent="-342900" algn="l">
+              <a:buFont typeface="Arial" panose="020B0604020202020204" pitchFamily="34" charset="0"/>
+              <a:buChar char="•"/>
+            </a:pPr>
+            <a:r>
+              <a:rPr lang="sv-SE" dirty="0"/>
+              <a:t>Beroenden</a:t>
+            </a:r>
+          </a:p>
+          <a:p>
+            <a:pPr algn="l"/>
+            <a:endParaRPr lang="sv-SE" dirty="0"/>
+          </a:p>
+          <a:p>
+            <a:pPr algn="l"/>
+            <a:endParaRPr lang="sv-SE" dirty="0"/>
+          </a:p>
+        </p:txBody>
+      </p:sp>
+    </p:spTree>
+    <p:extLst>
+      <p:ext uri="{BB962C8B-B14F-4D97-AF65-F5344CB8AC3E}">
+        <p14:creationId xmlns:p14="http://schemas.microsoft.com/office/powerpoint/2010/main" val="1267284021"/>
+      </p:ext>
+    </p:extLst>
+  </p:cSld>
+  <p:clrMapOvr>
+    <a:masterClrMapping/>
+  </p:clrMapOvr>
+</p:sld>
+</file>
+
+<file path=ppt/slides/slide16.xml><?xml version="1.0" encoding="utf-8"?>
+<p:sld xmlns:a="http://schemas.openxmlformats.org/drawingml/2006/main" xmlns:r="http://schemas.openxmlformats.org/officeDocument/2006/relationships" xmlns:p="http://schemas.openxmlformats.org/presentationml/2006/main">
+  <p:cSld>
+    <p:spTree>
+      <p:nvGrpSpPr>
+        <p:cNvPr id="1" name=""/>
+        <p:cNvGrpSpPr/>
+        <p:nvPr/>
+      </p:nvGrpSpPr>
+      <p:grpSpPr>
+        <a:xfrm>
+          <a:off x="0" y="0"/>
+          <a:ext cx="0" cy="0"/>
+          <a:chOff x="0" y="0"/>
+          <a:chExt cx="0" cy="0"/>
+        </a:xfrm>
+      </p:grpSpPr>
+      <p:sp>
+        <p:nvSpPr>
+          <p:cNvPr id="2" name="Title 1">
+            <a:extLst>
+              <a:ext uri="{FF2B5EF4-FFF2-40B4-BE49-F238E27FC236}">
+                <a16:creationId xmlns:a16="http://schemas.microsoft.com/office/drawing/2014/main" id="{C81699F1-5A5E-704C-9085-8117DAAEE2BF}"/>
+              </a:ext>
+            </a:extLst>
+          </p:cNvPr>
+          <p:cNvSpPr>
+            <a:spLocks noGrp="1"/>
+          </p:cNvSpPr>
+          <p:nvPr>
+            <p:ph type="ctrTitle"/>
+          </p:nvPr>
+        </p:nvSpPr>
+        <p:spPr>
+          <a:xfrm>
+            <a:off x="620110" y="603379"/>
+            <a:ext cx="2333297" cy="1614304"/>
+          </a:xfrm>
+        </p:spPr>
+        <p:txBody>
+          <a:bodyPr anchor="ctr">
+            <a:normAutofit/>
+          </a:bodyPr>
+          <a:lstStyle/>
+          <a:p>
+            <a:r>
+              <a:rPr lang="sv-SE" sz="3200" b="1" dirty="0"/>
+              <a:t>Andra metoder och sätt</a:t>
+            </a:r>
+          </a:p>
+        </p:txBody>
+      </p:sp>
+      <p:sp>
+        <p:nvSpPr>
+          <p:cNvPr id="3" name="Subtitle 2">
+            <a:extLst>
+              <a:ext uri="{FF2B5EF4-FFF2-40B4-BE49-F238E27FC236}">
+                <a16:creationId xmlns:a16="http://schemas.microsoft.com/office/drawing/2014/main" id="{556D9DB8-FEA7-1543-85E3-64536A063D0D}"/>
+              </a:ext>
+            </a:extLst>
+          </p:cNvPr>
+          <p:cNvSpPr>
+            <a:spLocks noGrp="1"/>
+          </p:cNvSpPr>
+          <p:nvPr>
+            <p:ph type="subTitle" idx="1"/>
+          </p:nvPr>
+        </p:nvSpPr>
+        <p:spPr>
+          <a:xfrm>
+            <a:off x="3175687" y="603379"/>
+            <a:ext cx="8921719" cy="5976097"/>
+          </a:xfrm>
+        </p:spPr>
+        <p:txBody>
+          <a:bodyPr>
+            <a:normAutofit/>
+          </a:bodyPr>
+          <a:lstStyle/>
+          <a:p>
+            <a:pPr marL="342900" indent="-342900" algn="l">
+              <a:buFont typeface="Arial" panose="020B0604020202020204" pitchFamily="34" charset="0"/>
+              <a:buChar char="•"/>
+            </a:pPr>
+            <a:r>
+              <a:rPr lang="sv-SE" dirty="0"/>
+              <a:t>BDD: </a:t>
+            </a:r>
+            <a:r>
+              <a:rPr lang="sv-SE" dirty="0" err="1"/>
+              <a:t>Behaviour</a:t>
+            </a:r>
+            <a:r>
+              <a:rPr lang="sv-SE" dirty="0"/>
+              <a:t>-Driven </a:t>
+            </a:r>
+            <a:r>
+              <a:rPr lang="sv-SE" dirty="0" err="1"/>
+              <a:t>Development</a:t>
+            </a:r>
+            <a:endParaRPr lang="sv-SE" dirty="0"/>
+          </a:p>
+          <a:p>
+            <a:pPr marL="342900" indent="-342900" algn="l">
+              <a:buFont typeface="Arial" panose="020B0604020202020204" pitchFamily="34" charset="0"/>
+              <a:buChar char="•"/>
+            </a:pPr>
+            <a:r>
+              <a:rPr lang="sv-SE" dirty="0"/>
+              <a:t>ATDD: </a:t>
+            </a:r>
+            <a:r>
+              <a:rPr lang="sv-SE" dirty="0" err="1"/>
+              <a:t>Acceptance</a:t>
+            </a:r>
+            <a:r>
+              <a:rPr lang="sv-SE" dirty="0"/>
+              <a:t> Test Driven </a:t>
+            </a:r>
+            <a:r>
+              <a:rPr lang="sv-SE" dirty="0" err="1"/>
+              <a:t>Development</a:t>
+            </a:r>
+            <a:endParaRPr lang="sv-SE" dirty="0"/>
+          </a:p>
+          <a:p>
+            <a:pPr marL="342900" indent="-342900" algn="l">
+              <a:buFont typeface="Arial" panose="020B0604020202020204" pitchFamily="34" charset="0"/>
+              <a:buChar char="•"/>
+            </a:pPr>
+            <a:r>
+              <a:rPr lang="sv-SE" dirty="0"/>
+              <a:t>Property </a:t>
+            </a:r>
+            <a:r>
+              <a:rPr lang="sv-SE" dirty="0" err="1"/>
+              <a:t>based</a:t>
+            </a:r>
+            <a:r>
+              <a:rPr lang="sv-SE" dirty="0"/>
+              <a:t> </a:t>
+            </a:r>
+            <a:r>
+              <a:rPr lang="sv-SE" dirty="0" err="1"/>
+              <a:t>testing</a:t>
+            </a:r>
+            <a:endParaRPr lang="sv-SE" dirty="0"/>
+          </a:p>
+          <a:p>
+            <a:pPr marL="342900" indent="-342900" algn="l">
+              <a:buFont typeface="Arial" panose="020B0604020202020204" pitchFamily="34" charset="0"/>
+              <a:buChar char="•"/>
+            </a:pPr>
+            <a:r>
+              <a:rPr lang="sv-SE" dirty="0"/>
+              <a:t>Mutation </a:t>
+            </a:r>
+            <a:r>
+              <a:rPr lang="sv-SE" dirty="0" err="1"/>
+              <a:t>testing</a:t>
+            </a:r>
+            <a:endParaRPr lang="sv-SE" dirty="0"/>
+          </a:p>
+          <a:p>
+            <a:pPr algn="l"/>
+            <a:endParaRPr lang="sv-SE" dirty="0"/>
+          </a:p>
+          <a:p>
+            <a:pPr marL="342900" indent="-342900" algn="l">
+              <a:buFont typeface="Arial" panose="020B0604020202020204" pitchFamily="34" charset="0"/>
+              <a:buChar char="•"/>
+            </a:pPr>
+            <a:endParaRPr lang="sv-SE" dirty="0"/>
+          </a:p>
+          <a:p>
+            <a:pPr algn="l"/>
+            <a:endParaRPr lang="sv-SE" dirty="0"/>
+          </a:p>
+          <a:p>
+            <a:pPr algn="l"/>
+            <a:endParaRPr lang="sv-SE" dirty="0"/>
+          </a:p>
+        </p:txBody>
+      </p:sp>
+    </p:spTree>
+    <p:extLst>
+      <p:ext uri="{BB962C8B-B14F-4D97-AF65-F5344CB8AC3E}">
+        <p14:creationId xmlns:p14="http://schemas.microsoft.com/office/powerpoint/2010/main" val="3132497319"/>
+      </p:ext>
+    </p:extLst>
+  </p:cSld>
+  <p:clrMapOvr>
+    <a:masterClrMapping/>
+  </p:clrMapOvr>
+</p:sld>
+</file>
+
+<file path=ppt/slides/slide17.xml><?xml version="1.0" encoding="utf-8"?>
 <p:sld xmlns:a="http://schemas.openxmlformats.org/drawingml/2006/main" xmlns:r="http://schemas.openxmlformats.org/officeDocument/2006/relationships" xmlns:p="http://schemas.openxmlformats.org/presentationml/2006/main">
   <p:cSld>
     <p:spTree>
@@ -5687,65 +5595,18 @@
           <a:bodyPr/>
           <a:lstStyle/>
           <a:p>
-            <a:pPr marL="342900" indent="-342900" algn="l">
-              <a:buFont typeface="Arial" panose="020B0604020202020204" pitchFamily="34" charset="0"/>
-              <a:buChar char="•"/>
-            </a:pPr>
-            <a:r>
-              <a:rPr lang="sv-SE" dirty="0"/>
-              <a:t>1 förare och många navigatörer</a:t>
-            </a:r>
-          </a:p>
-          <a:p>
-            <a:pPr marL="342900" indent="-342900" algn="l">
-              <a:buFont typeface="Arial" panose="020B0604020202020204" pitchFamily="34" charset="0"/>
-              <a:buChar char="•"/>
-            </a:pPr>
-            <a:r>
-              <a:rPr lang="sv-SE" dirty="0"/>
-              <a:t>Växlar förare ~10 minuter</a:t>
-            </a:r>
-          </a:p>
-          <a:p>
-            <a:pPr marL="342900" indent="-342900" algn="l">
-              <a:buFont typeface="Arial" panose="020B0604020202020204" pitchFamily="34" charset="0"/>
-              <a:buChar char="•"/>
-            </a:pPr>
-            <a:r>
-              <a:rPr lang="sv-SE" dirty="0"/>
-              <a:t>Man får säga pass</a:t>
-            </a:r>
-          </a:p>
-          <a:p>
-            <a:pPr marL="342900" indent="-342900" algn="l">
-              <a:buFont typeface="Arial" panose="020B0604020202020204" pitchFamily="34" charset="0"/>
-              <a:buChar char="•"/>
-            </a:pPr>
-            <a:r>
-              <a:rPr lang="sv-SE" dirty="0"/>
-              <a:t>Man får gå ut och ta pass</a:t>
-            </a:r>
-          </a:p>
-          <a:p>
-            <a:pPr marL="342900" indent="-342900" algn="l">
-              <a:buFont typeface="Arial" panose="020B0604020202020204" pitchFamily="34" charset="0"/>
-              <a:buChar char="•"/>
-            </a:pPr>
-            <a:r>
-              <a:rPr lang="sv-SE" dirty="0"/>
-              <a:t>Kom ihåg turtagande och paus</a:t>
-            </a:r>
-          </a:p>
-          <a:p>
             <a:pPr algn="l"/>
-            <a:endParaRPr lang="sv-SE" dirty="0"/>
+            <a:r>
+              <a:rPr lang="sv-SE" dirty="0"/>
+              <a:t>Så låt oss prova…</a:t>
+            </a:r>
           </a:p>
         </p:txBody>
       </p:sp>
     </p:spTree>
     <p:extLst>
       <p:ext uri="{BB962C8B-B14F-4D97-AF65-F5344CB8AC3E}">
-        <p14:creationId xmlns:p14="http://schemas.microsoft.com/office/powerpoint/2010/main" val="143073713"/>
+        <p14:creationId xmlns:p14="http://schemas.microsoft.com/office/powerpoint/2010/main" val="938975316"/>
       </p:ext>
     </p:extLst>
   </p:cSld>
@@ -5800,9 +5661,10 @@
           </a:bodyPr>
           <a:lstStyle/>
           <a:p>
+            <a:pPr algn="l"/>
             <a:r>
               <a:rPr lang="sv-SE" sz="3600" b="1" dirty="0"/>
-              <a:t>Mobbprogrammering</a:t>
+              <a:t>Del 2</a:t>
             </a:r>
           </a:p>
         </p:txBody>
@@ -5836,7 +5698,7 @@
             <a:pPr algn="l"/>
             <a:r>
               <a:rPr lang="sv-SE" dirty="0"/>
-              <a:t>Så låt oss prova…</a:t>
+              <a:t>Verktyg och principer för att underlätta testning</a:t>
             </a:r>
           </a:p>
         </p:txBody>
@@ -5844,7 +5706,7 @@
     </p:spTree>
     <p:extLst>
       <p:ext uri="{BB962C8B-B14F-4D97-AF65-F5344CB8AC3E}">
-        <p14:creationId xmlns:p14="http://schemas.microsoft.com/office/powerpoint/2010/main" val="938975316"/>
+        <p14:creationId xmlns:p14="http://schemas.microsoft.com/office/powerpoint/2010/main" val="2113114059"/>
       </p:ext>
     </p:extLst>
   </p:cSld>
@@ -5899,9 +5761,10 @@
           </a:bodyPr>
           <a:lstStyle/>
           <a:p>
+            <a:pPr algn="l"/>
             <a:r>
               <a:rPr lang="sv-SE" sz="3600" b="1" dirty="0"/>
-              <a:t>Mobbprogrammering</a:t>
+              <a:t>Verktyg</a:t>
             </a:r>
           </a:p>
         </p:txBody>
@@ -5932,29 +5795,59 @@
           <a:bodyPr/>
           <a:lstStyle/>
           <a:p>
-            <a:pPr algn="l"/>
-            <a:r>
-              <a:rPr lang="sv-SE" dirty="0"/>
-              <a:t>Ändrade krav: Vi vill slå upp priserna istället för att ha dessa i koden.</a:t>
-            </a:r>
-          </a:p>
-          <a:p>
-            <a:pPr algn="l"/>
+            <a:pPr marL="342900" indent="-342900" algn="l">
+              <a:buFont typeface="Arial" panose="020B0604020202020204" pitchFamily="34" charset="0"/>
+              <a:buChar char="•"/>
+            </a:pPr>
+            <a:r>
+              <a:rPr lang="sv-SE" dirty="0" err="1"/>
+              <a:t>Testkörare</a:t>
+            </a:r>
             <a:endParaRPr lang="sv-SE" dirty="0"/>
           </a:p>
           <a:p>
-            <a:pPr algn="l"/>
-            <a:r>
-              <a:rPr lang="sv-SE" dirty="0"/>
-              <a:t>Vad händer?</a:t>
-            </a:r>
+            <a:pPr marL="342900" indent="-342900" algn="l">
+              <a:buFont typeface="Arial" panose="020B0604020202020204" pitchFamily="34" charset="0"/>
+              <a:buChar char="•"/>
+            </a:pPr>
+            <a:r>
+              <a:rPr lang="sv-SE" dirty="0"/>
+              <a:t>Förväntningar/matchningar – </a:t>
+            </a:r>
+            <a:r>
+              <a:rPr lang="sv-SE" dirty="0" err="1"/>
+              <a:t>Assertions</a:t>
+            </a:r>
+            <a:endParaRPr lang="sv-SE" dirty="0"/>
+          </a:p>
+          <a:p>
+            <a:pPr marL="342900" indent="-342900" algn="l">
+              <a:buFont typeface="Arial" panose="020B0604020202020204" pitchFamily="34" charset="0"/>
+              <a:buChar char="•"/>
+            </a:pPr>
+            <a:r>
+              <a:rPr lang="sv-SE" dirty="0"/>
+              <a:t>Dubbelgångare, attrapper - </a:t>
+            </a:r>
+            <a:r>
+              <a:rPr lang="sv-SE" dirty="0" err="1"/>
+              <a:t>Mock</a:t>
+            </a:r>
+            <a:endParaRPr lang="sv-SE" dirty="0"/>
+          </a:p>
+          <a:p>
+            <a:pPr marL="342900" indent="-342900" algn="l">
+              <a:buFont typeface="Arial" panose="020B0604020202020204" pitchFamily="34" charset="0"/>
+              <a:buChar char="•"/>
+            </a:pPr>
+            <a:endParaRPr lang="sv-SE" dirty="0"/>
           </a:p>
         </p:txBody>
       </p:sp>
     </p:spTree>
     <p:extLst>
       <p:ext uri="{BB962C8B-B14F-4D97-AF65-F5344CB8AC3E}">
-        <p14:creationId xmlns:p14="http://schemas.microsoft.com/office/powerpoint/2010/main" val="4253517235"/>
+        <p14:creationId xmlns:p14="http://schemas.microsoft.com/office/powerpoint/2010/main" val="1835554135"/>
       </p:ext>
     </p:extLst>
   </p:cSld>
@@ -6009,9 +5902,10 @@
           </a:bodyPr>
           <a:lstStyle/>
           <a:p>
+            <a:pPr algn="l"/>
             <a:r>
               <a:rPr lang="sv-SE" sz="3600" b="1" dirty="0"/>
-              <a:t>Dubbelgångare</a:t>
+              <a:t>Verktyg – Java</a:t>
             </a:r>
           </a:p>
         </p:txBody>
@@ -6034,12 +5928,14 @@
         </p:nvSpPr>
         <p:spPr>
           <a:xfrm>
-            <a:off x="3175688" y="2060028"/>
-            <a:ext cx="7492312" cy="3197772"/>
+            <a:off x="3175688" y="2060027"/>
+            <a:ext cx="7492312" cy="4194594"/>
           </a:xfrm>
         </p:spPr>
         <p:txBody>
-          <a:bodyPr/>
+          <a:bodyPr>
+            <a:normAutofit fontScale="85000" lnSpcReduction="20000"/>
+          </a:bodyPr>
           <a:lstStyle/>
           <a:p>
             <a:pPr marL="342900" indent="-342900" algn="l">
@@ -6047,8 +5943,92 @@
               <a:buChar char="•"/>
             </a:pPr>
             <a:r>
-              <a:rPr lang="sv-SE" dirty="0"/>
-              <a:t>Varför är det bra att ha dubbelgångare?</a:t>
+              <a:rPr lang="sv-SE" dirty="0" err="1"/>
+              <a:t>Testkörare</a:t>
+            </a:r>
+            <a:endParaRPr lang="sv-SE" dirty="0"/>
+          </a:p>
+          <a:p>
+            <a:pPr marL="800100" lvl="1" indent="-342900" algn="l">
+              <a:buFont typeface="Arial" panose="020B0604020202020204" pitchFamily="34" charset="0"/>
+              <a:buChar char="•"/>
+            </a:pPr>
+            <a:r>
+              <a:rPr lang="sv-SE" dirty="0" err="1"/>
+              <a:t>Junit</a:t>
+            </a:r>
+            <a:endParaRPr lang="sv-SE" dirty="0"/>
+          </a:p>
+          <a:p>
+            <a:pPr marL="800100" lvl="1" indent="-342900" algn="l">
+              <a:buFont typeface="Arial" panose="020B0604020202020204" pitchFamily="34" charset="0"/>
+              <a:buChar char="•"/>
+            </a:pPr>
+            <a:r>
+              <a:rPr lang="sv-SE" dirty="0" err="1"/>
+              <a:t>TestNG</a:t>
+            </a:r>
+            <a:endParaRPr lang="sv-SE" dirty="0"/>
+          </a:p>
+          <a:p>
+            <a:pPr marL="800100" lvl="1" indent="-342900" algn="l">
+              <a:buFont typeface="Arial" panose="020B0604020202020204" pitchFamily="34" charset="0"/>
+              <a:buChar char="•"/>
+            </a:pPr>
+            <a:r>
+              <a:rPr lang="sv-SE" dirty="0" err="1"/>
+              <a:t>Spek</a:t>
+            </a:r>
+            <a:r>
+              <a:rPr lang="sv-SE" dirty="0"/>
+              <a:t> (</a:t>
+            </a:r>
+            <a:r>
+              <a:rPr lang="sv-SE" dirty="0" err="1"/>
+              <a:t>Kotlin</a:t>
+            </a:r>
+            <a:r>
+              <a:rPr lang="sv-SE" dirty="0"/>
+              <a:t>)</a:t>
+            </a:r>
+          </a:p>
+          <a:p>
+            <a:pPr marL="800100" lvl="1" indent="-342900" algn="l">
+              <a:buFont typeface="Arial" panose="020B0604020202020204" pitchFamily="34" charset="0"/>
+              <a:buChar char="•"/>
+            </a:pPr>
+            <a:r>
+              <a:rPr lang="sv-SE" dirty="0"/>
+              <a:t>Spock (</a:t>
+            </a:r>
+            <a:r>
+              <a:rPr lang="sv-SE" dirty="0" err="1"/>
+              <a:t>Groovy</a:t>
+            </a:r>
+            <a:r>
+              <a:rPr lang="sv-SE" dirty="0"/>
+              <a:t>)</a:t>
+            </a:r>
+          </a:p>
+          <a:p>
+            <a:pPr marL="800100" lvl="1" indent="-342900" algn="l">
+              <a:buFont typeface="Arial" panose="020B0604020202020204" pitchFamily="34" charset="0"/>
+              <a:buChar char="•"/>
+            </a:pPr>
+            <a:r>
+              <a:rPr lang="sv-SE" dirty="0" err="1"/>
+              <a:t>Cucumber</a:t>
+            </a:r>
+            <a:endParaRPr lang="sv-SE" dirty="0"/>
+          </a:p>
+          <a:p>
+            <a:pPr marL="800100" lvl="1" indent="-342900" algn="l">
+              <a:buFont typeface="Arial" panose="020B0604020202020204" pitchFamily="34" charset="0"/>
+              <a:buChar char="•"/>
+            </a:pPr>
+            <a:r>
+              <a:rPr lang="sv-SE" dirty="0"/>
+              <a:t>Scalatest (Scala)</a:t>
             </a:r>
           </a:p>
           <a:p>
@@ -6057,9 +6037,10 @@
               <a:buChar char="•"/>
             </a:pPr>
             <a:r>
-              <a:rPr lang="sv-SE" dirty="0"/>
-              <a:t>Olika typer av dubbelgångare</a:t>
-            </a:r>
+              <a:rPr lang="sv-SE" dirty="0" err="1"/>
+              <a:t>Assertions</a:t>
+            </a:r>
+            <a:endParaRPr lang="sv-SE" dirty="0"/>
           </a:p>
           <a:p>
             <a:pPr marL="800100" lvl="1" indent="-342900" algn="l">
@@ -6068,7 +6049,7 @@
             </a:pPr>
             <a:r>
               <a:rPr lang="sv-SE" dirty="0" err="1"/>
-              <a:t>Hemmagjorde</a:t>
+              <a:t>AssertJ</a:t>
             </a:r>
             <a:endParaRPr lang="sv-SE" dirty="0"/>
           </a:p>
@@ -6079,7 +6060,7 @@
             </a:pPr>
             <a:r>
               <a:rPr lang="sv-SE" dirty="0" err="1"/>
-              <a:t>Mock</a:t>
+              <a:t>Hamcrest</a:t>
             </a:r>
             <a:endParaRPr lang="sv-SE" dirty="0"/>
           </a:p>
@@ -6089,19 +6070,71 @@
               <a:buChar char="•"/>
             </a:pPr>
             <a:r>
-              <a:rPr lang="sv-SE" dirty="0"/>
-              <a:t>Spy</a:t>
-            </a:r>
+              <a:rPr lang="sv-SE" dirty="0" err="1"/>
+              <a:t>JUnit</a:t>
+            </a:r>
+            <a:endParaRPr lang="sv-SE" dirty="0"/>
+          </a:p>
+          <a:p>
+            <a:pPr marL="342900" indent="-342900" algn="l">
+              <a:buFont typeface="Arial" panose="020B0604020202020204" pitchFamily="34" charset="0"/>
+              <a:buChar char="•"/>
+            </a:pPr>
+            <a:r>
+              <a:rPr lang="sv-SE" dirty="0" err="1"/>
+              <a:t>Mock</a:t>
+            </a:r>
+            <a:endParaRPr lang="sv-SE" dirty="0"/>
           </a:p>
           <a:p>
             <a:pPr marL="800100" lvl="1" indent="-342900" algn="l">
               <a:buFont typeface="Arial" panose="020B0604020202020204" pitchFamily="34" charset="0"/>
               <a:buChar char="•"/>
             </a:pPr>
+            <a:r>
+              <a:rPr lang="sv-SE" dirty="0" err="1"/>
+              <a:t>Mockito</a:t>
+            </a:r>
             <a:endParaRPr lang="sv-SE" dirty="0"/>
           </a:p>
           <a:p>
-            <a:pPr lvl="1" algn="l"/>
+            <a:pPr marL="800100" lvl="1" indent="-342900" algn="l">
+              <a:buFont typeface="Arial" panose="020B0604020202020204" pitchFamily="34" charset="0"/>
+              <a:buChar char="•"/>
+            </a:pPr>
+            <a:r>
+              <a:rPr lang="sv-SE" dirty="0" err="1"/>
+              <a:t>Easymock</a:t>
+            </a:r>
+            <a:endParaRPr lang="sv-SE" dirty="0"/>
+          </a:p>
+          <a:p>
+            <a:pPr marL="800100" lvl="1" indent="-342900" algn="l">
+              <a:buFont typeface="Arial" panose="020B0604020202020204" pitchFamily="34" charset="0"/>
+              <a:buChar char="•"/>
+            </a:pPr>
+            <a:r>
+              <a:rPr lang="sv-SE" dirty="0" err="1"/>
+              <a:t>Powermock</a:t>
+            </a:r>
+            <a:endParaRPr lang="sv-SE" dirty="0"/>
+          </a:p>
+          <a:p>
+            <a:pPr marL="800100" lvl="1" indent="-342900" algn="l">
+              <a:buFont typeface="Arial" panose="020B0604020202020204" pitchFamily="34" charset="0"/>
+              <a:buChar char="•"/>
+            </a:pPr>
+            <a:endParaRPr lang="sv-SE" dirty="0"/>
+          </a:p>
+          <a:p>
+            <a:pPr algn="l"/>
+            <a:endParaRPr lang="sv-SE" dirty="0"/>
+          </a:p>
+          <a:p>
+            <a:pPr marL="342900" indent="-342900" algn="l">
+              <a:buFont typeface="Arial" panose="020B0604020202020204" pitchFamily="34" charset="0"/>
+              <a:buChar char="•"/>
+            </a:pPr>
             <a:endParaRPr lang="sv-SE" dirty="0"/>
           </a:p>
         </p:txBody>
@@ -6109,7 +6142,7 @@
     </p:spTree>
     <p:extLst>
       <p:ext uri="{BB962C8B-B14F-4D97-AF65-F5344CB8AC3E}">
-        <p14:creationId xmlns:p14="http://schemas.microsoft.com/office/powerpoint/2010/main" val="918867730"/>
+        <p14:creationId xmlns:p14="http://schemas.microsoft.com/office/powerpoint/2010/main" val="295322603"/>
       </p:ext>
     </p:extLst>
   </p:cSld>

</xml_diff>

<commit_message>
La tillbaka sidan med testpyramiden
</commit_message>
<xml_diff>
--- a/TDD-Presentation.pptx
+++ b/TDD-Presentation.pptx
@@ -20,8 +20,9 @@
     <p:sldId id="263" r:id="rId14"/>
     <p:sldId id="278" r:id="rId15"/>
     <p:sldId id="265" r:id="rId16"/>
-    <p:sldId id="267" r:id="rId17"/>
-    <p:sldId id="270" r:id="rId18"/>
+    <p:sldId id="279" r:id="rId17"/>
+    <p:sldId id="267" r:id="rId18"/>
+    <p:sldId id="270" r:id="rId19"/>
   </p:sldIdLst>
   <p:sldSz cx="12192000" cy="6858000"/>
   <p:notesSz cx="6858000" cy="9144000"/>
@@ -4401,7 +4402,7 @@
           <a:p>
             <a:r>
               <a:rPr lang="sv-SE" sz="3600" b="1" dirty="0"/>
-              <a:t>Egenskaper</a:t>
+              <a:t>Kategorier</a:t>
             </a:r>
           </a:p>
         </p:txBody>
@@ -4434,13 +4435,20 @@
           </a:bodyPr>
           <a:lstStyle/>
           <a:p>
+            <a:pPr algn="l"/>
+            <a:r>
+              <a:rPr lang="sv-SE" dirty="0"/>
+              <a:t>Testpyramiden</a:t>
+            </a:r>
+          </a:p>
+          <a:p>
             <a:pPr marL="342900" indent="-342900" algn="l">
               <a:buFont typeface="Arial" panose="020B0604020202020204" pitchFamily="34" charset="0"/>
               <a:buChar char="•"/>
             </a:pPr>
             <a:r>
               <a:rPr lang="sv-SE" dirty="0"/>
-              <a:t>Exekveringstid</a:t>
+              <a:t>Enhet</a:t>
             </a:r>
           </a:p>
           <a:p>
@@ -4450,7 +4458,7 @@
             </a:pPr>
             <a:r>
               <a:rPr lang="sv-SE" dirty="0"/>
-              <a:t>Målgrupp</a:t>
+              <a:t>Integration</a:t>
             </a:r>
           </a:p>
           <a:p>
@@ -4460,7 +4468,7 @@
             </a:pPr>
             <a:r>
               <a:rPr lang="sv-SE" dirty="0"/>
-              <a:t>Stabilitet</a:t>
+              <a:t>Funktion</a:t>
             </a:r>
           </a:p>
           <a:p>
@@ -4470,7 +4478,37 @@
             </a:pPr>
             <a:r>
               <a:rPr lang="sv-SE" dirty="0"/>
-              <a:t>Beroenden</a:t>
+              <a:t>End to end (E2E)</a:t>
+            </a:r>
+          </a:p>
+          <a:p>
+            <a:pPr marL="342900" indent="-342900" algn="l">
+              <a:buFont typeface="Arial" panose="020B0604020202020204" pitchFamily="34" charset="0"/>
+              <a:buChar char="•"/>
+            </a:pPr>
+            <a:r>
+              <a:rPr lang="sv-SE" dirty="0"/>
+              <a:t>Acceptans</a:t>
+            </a:r>
+          </a:p>
+          <a:p>
+            <a:pPr marL="342900" indent="-342900" algn="l">
+              <a:buFont typeface="Arial" panose="020B0604020202020204" pitchFamily="34" charset="0"/>
+              <a:buChar char="•"/>
+            </a:pPr>
+            <a:r>
+              <a:rPr lang="sv-SE" dirty="0"/>
+              <a:t>System</a:t>
+            </a:r>
+          </a:p>
+          <a:p>
+            <a:pPr marL="342900" indent="-342900" algn="l">
+              <a:buFont typeface="Arial" panose="020B0604020202020204" pitchFamily="34" charset="0"/>
+              <a:buChar char="•"/>
+            </a:pPr>
+            <a:r>
+              <a:rPr lang="sv-SE" dirty="0"/>
+              <a:t>Prestanda</a:t>
             </a:r>
           </a:p>
           <a:p>
@@ -4542,6 +4580,148 @@
           <a:lstStyle/>
           <a:p>
             <a:r>
+              <a:rPr lang="sv-SE" sz="3600" b="1" dirty="0"/>
+              <a:t>Egenskaper</a:t>
+            </a:r>
+          </a:p>
+        </p:txBody>
+      </p:sp>
+      <p:sp>
+        <p:nvSpPr>
+          <p:cNvPr id="3" name="Subtitle 2">
+            <a:extLst>
+              <a:ext uri="{FF2B5EF4-FFF2-40B4-BE49-F238E27FC236}">
+                <a16:creationId xmlns:a16="http://schemas.microsoft.com/office/drawing/2014/main" id="{556D9DB8-FEA7-1543-85E3-64536A063D0D}"/>
+              </a:ext>
+            </a:extLst>
+          </p:cNvPr>
+          <p:cNvSpPr>
+            <a:spLocks noGrp="1"/>
+          </p:cNvSpPr>
+          <p:nvPr>
+            <p:ph type="subTitle" idx="1"/>
+          </p:nvPr>
+        </p:nvSpPr>
+        <p:spPr>
+          <a:xfrm>
+            <a:off x="3175687" y="603379"/>
+            <a:ext cx="8921719" cy="5976097"/>
+          </a:xfrm>
+        </p:spPr>
+        <p:txBody>
+          <a:bodyPr>
+            <a:normAutofit/>
+          </a:bodyPr>
+          <a:lstStyle/>
+          <a:p>
+            <a:pPr marL="342900" indent="-342900" algn="l">
+              <a:buFont typeface="Arial" panose="020B0604020202020204" pitchFamily="34" charset="0"/>
+              <a:buChar char="•"/>
+            </a:pPr>
+            <a:r>
+              <a:rPr lang="sv-SE" dirty="0"/>
+              <a:t>Exekveringstid</a:t>
+            </a:r>
+          </a:p>
+          <a:p>
+            <a:pPr marL="342900" indent="-342900" algn="l">
+              <a:buFont typeface="Arial" panose="020B0604020202020204" pitchFamily="34" charset="0"/>
+              <a:buChar char="•"/>
+            </a:pPr>
+            <a:r>
+              <a:rPr lang="sv-SE" dirty="0"/>
+              <a:t>Målgrupp</a:t>
+            </a:r>
+          </a:p>
+          <a:p>
+            <a:pPr marL="342900" indent="-342900" algn="l">
+              <a:buFont typeface="Arial" panose="020B0604020202020204" pitchFamily="34" charset="0"/>
+              <a:buChar char="•"/>
+            </a:pPr>
+            <a:r>
+              <a:rPr lang="sv-SE" dirty="0"/>
+              <a:t>Stabilitet</a:t>
+            </a:r>
+          </a:p>
+          <a:p>
+            <a:pPr marL="342900" indent="-342900" algn="l">
+              <a:buFont typeface="Arial" panose="020B0604020202020204" pitchFamily="34" charset="0"/>
+              <a:buChar char="•"/>
+            </a:pPr>
+            <a:r>
+              <a:rPr lang="sv-SE" dirty="0"/>
+              <a:t>Beroenden</a:t>
+            </a:r>
+          </a:p>
+          <a:p>
+            <a:pPr algn="l"/>
+            <a:endParaRPr lang="sv-SE" dirty="0"/>
+          </a:p>
+          <a:p>
+            <a:pPr algn="l"/>
+            <a:endParaRPr lang="sv-SE" dirty="0"/>
+          </a:p>
+        </p:txBody>
+      </p:sp>
+    </p:spTree>
+    <p:extLst>
+      <p:ext uri="{BB962C8B-B14F-4D97-AF65-F5344CB8AC3E}">
+        <p14:creationId xmlns:p14="http://schemas.microsoft.com/office/powerpoint/2010/main" val="3653152674"/>
+      </p:ext>
+    </p:extLst>
+  </p:cSld>
+  <p:clrMapOvr>
+    <a:masterClrMapping/>
+  </p:clrMapOvr>
+</p:sld>
+</file>
+
+<file path=ppt/slides/slide17.xml><?xml version="1.0" encoding="utf-8"?>
+<p:sld xmlns:a="http://schemas.openxmlformats.org/drawingml/2006/main" xmlns:r="http://schemas.openxmlformats.org/officeDocument/2006/relationships" xmlns:p="http://schemas.openxmlformats.org/presentationml/2006/main">
+  <p:cSld>
+    <p:spTree>
+      <p:nvGrpSpPr>
+        <p:cNvPr id="1" name=""/>
+        <p:cNvGrpSpPr/>
+        <p:nvPr/>
+      </p:nvGrpSpPr>
+      <p:grpSpPr>
+        <a:xfrm>
+          <a:off x="0" y="0"/>
+          <a:ext cx="0" cy="0"/>
+          <a:chOff x="0" y="0"/>
+          <a:chExt cx="0" cy="0"/>
+        </a:xfrm>
+      </p:grpSpPr>
+      <p:sp>
+        <p:nvSpPr>
+          <p:cNvPr id="2" name="Title 1">
+            <a:extLst>
+              <a:ext uri="{FF2B5EF4-FFF2-40B4-BE49-F238E27FC236}">
+                <a16:creationId xmlns:a16="http://schemas.microsoft.com/office/drawing/2014/main" id="{C81699F1-5A5E-704C-9085-8117DAAEE2BF}"/>
+              </a:ext>
+            </a:extLst>
+          </p:cNvPr>
+          <p:cNvSpPr>
+            <a:spLocks noGrp="1"/>
+          </p:cNvSpPr>
+          <p:nvPr>
+            <p:ph type="ctrTitle"/>
+          </p:nvPr>
+        </p:nvSpPr>
+        <p:spPr>
+          <a:xfrm>
+            <a:off x="620110" y="603379"/>
+            <a:ext cx="2333297" cy="1614304"/>
+          </a:xfrm>
+        </p:spPr>
+        <p:txBody>
+          <a:bodyPr anchor="ctr">
+            <a:normAutofit/>
+          </a:bodyPr>
+          <a:lstStyle/>
+          <a:p>
+            <a:r>
               <a:rPr lang="sv-SE" sz="3200" b="1" dirty="0"/>
               <a:t>Andra metoder och sätt</a:t>
             </a:r>
@@ -4693,7 +4873,7 @@
 </p:sld>
 </file>
 
-<file path=ppt/slides/slide17.xml><?xml version="1.0" encoding="utf-8"?>
+<file path=ppt/slides/slide18.xml><?xml version="1.0" encoding="utf-8"?>
 <p:sld xmlns:a="http://schemas.openxmlformats.org/drawingml/2006/main" xmlns:r="http://schemas.openxmlformats.org/officeDocument/2006/relationships" xmlns:p="http://schemas.openxmlformats.org/presentationml/2006/main">
   <p:cSld>
     <p:spTree>

</xml_diff>

<commit_message>
add slides to ppt and one simple test
</commit_message>
<xml_diff>
--- a/TDD-Presentation.pptx
+++ b/TDD-Presentation.pptx
@@ -8,21 +8,22 @@
     <p:sldId id="256" r:id="rId2"/>
     <p:sldId id="257" r:id="rId3"/>
     <p:sldId id="258" r:id="rId4"/>
-    <p:sldId id="259" r:id="rId5"/>
-    <p:sldId id="260" r:id="rId6"/>
-    <p:sldId id="262" r:id="rId7"/>
-    <p:sldId id="277" r:id="rId8"/>
-    <p:sldId id="271" r:id="rId9"/>
-    <p:sldId id="272" r:id="rId10"/>
-    <p:sldId id="273" r:id="rId11"/>
-    <p:sldId id="275" r:id="rId12"/>
-    <p:sldId id="276" r:id="rId13"/>
-    <p:sldId id="263" r:id="rId14"/>
-    <p:sldId id="278" r:id="rId15"/>
-    <p:sldId id="265" r:id="rId16"/>
-    <p:sldId id="279" r:id="rId17"/>
-    <p:sldId id="267" r:id="rId18"/>
-    <p:sldId id="270" r:id="rId19"/>
+    <p:sldId id="280" r:id="rId5"/>
+    <p:sldId id="259" r:id="rId6"/>
+    <p:sldId id="260" r:id="rId7"/>
+    <p:sldId id="262" r:id="rId8"/>
+    <p:sldId id="277" r:id="rId9"/>
+    <p:sldId id="271" r:id="rId10"/>
+    <p:sldId id="272" r:id="rId11"/>
+    <p:sldId id="273" r:id="rId12"/>
+    <p:sldId id="275" r:id="rId13"/>
+    <p:sldId id="276" r:id="rId14"/>
+    <p:sldId id="263" r:id="rId15"/>
+    <p:sldId id="278" r:id="rId16"/>
+    <p:sldId id="265" r:id="rId17"/>
+    <p:sldId id="279" r:id="rId18"/>
+    <p:sldId id="267" r:id="rId19"/>
+    <p:sldId id="270" r:id="rId20"/>
   </p:sldIdLst>
   <p:sldSz cx="12192000" cy="6858000"/>
   <p:notesSz cx="6858000" cy="9144000"/>
@@ -278,7 +279,7 @@
           <a:p>
             <a:fld id="{4103C207-1B24-E341-B490-8E9928603720}" type="datetimeFigureOut">
               <a:rPr lang="sv-SE" smtClean="0"/>
-              <a:t>2020-01-28</a:t>
+              <a:t>2020-01-31</a:t>
             </a:fld>
             <a:endParaRPr lang="sv-SE"/>
           </a:p>
@@ -478,7 +479,7 @@
           <a:p>
             <a:fld id="{4103C207-1B24-E341-B490-8E9928603720}" type="datetimeFigureOut">
               <a:rPr lang="sv-SE" smtClean="0"/>
-              <a:t>2020-01-28</a:t>
+              <a:t>2020-01-31</a:t>
             </a:fld>
             <a:endParaRPr lang="sv-SE"/>
           </a:p>
@@ -688,7 +689,7 @@
           <a:p>
             <a:fld id="{4103C207-1B24-E341-B490-8E9928603720}" type="datetimeFigureOut">
               <a:rPr lang="sv-SE" smtClean="0"/>
-              <a:t>2020-01-28</a:t>
+              <a:t>2020-01-31</a:t>
             </a:fld>
             <a:endParaRPr lang="sv-SE"/>
           </a:p>
@@ -888,7 +889,7 @@
           <a:p>
             <a:fld id="{4103C207-1B24-E341-B490-8E9928603720}" type="datetimeFigureOut">
               <a:rPr lang="sv-SE" smtClean="0"/>
-              <a:t>2020-01-28</a:t>
+              <a:t>2020-01-31</a:t>
             </a:fld>
             <a:endParaRPr lang="sv-SE"/>
           </a:p>
@@ -1164,7 +1165,7 @@
           <a:p>
             <a:fld id="{4103C207-1B24-E341-B490-8E9928603720}" type="datetimeFigureOut">
               <a:rPr lang="sv-SE" smtClean="0"/>
-              <a:t>2020-01-28</a:t>
+              <a:t>2020-01-31</a:t>
             </a:fld>
             <a:endParaRPr lang="sv-SE"/>
           </a:p>
@@ -1432,7 +1433,7 @@
           <a:p>
             <a:fld id="{4103C207-1B24-E341-B490-8E9928603720}" type="datetimeFigureOut">
               <a:rPr lang="sv-SE" smtClean="0"/>
-              <a:t>2020-01-28</a:t>
+              <a:t>2020-01-31</a:t>
             </a:fld>
             <a:endParaRPr lang="sv-SE"/>
           </a:p>
@@ -1847,7 +1848,7 @@
           <a:p>
             <a:fld id="{4103C207-1B24-E341-B490-8E9928603720}" type="datetimeFigureOut">
               <a:rPr lang="sv-SE" smtClean="0"/>
-              <a:t>2020-01-28</a:t>
+              <a:t>2020-01-31</a:t>
             </a:fld>
             <a:endParaRPr lang="sv-SE"/>
           </a:p>
@@ -1989,7 +1990,7 @@
           <a:p>
             <a:fld id="{4103C207-1B24-E341-B490-8E9928603720}" type="datetimeFigureOut">
               <a:rPr lang="sv-SE" smtClean="0"/>
-              <a:t>2020-01-28</a:t>
+              <a:t>2020-01-31</a:t>
             </a:fld>
             <a:endParaRPr lang="sv-SE"/>
           </a:p>
@@ -2102,7 +2103,7 @@
           <a:p>
             <a:fld id="{4103C207-1B24-E341-B490-8E9928603720}" type="datetimeFigureOut">
               <a:rPr lang="sv-SE" smtClean="0"/>
-              <a:t>2020-01-28</a:t>
+              <a:t>2020-01-31</a:t>
             </a:fld>
             <a:endParaRPr lang="sv-SE"/>
           </a:p>
@@ -2415,7 +2416,7 @@
           <a:p>
             <a:fld id="{4103C207-1B24-E341-B490-8E9928603720}" type="datetimeFigureOut">
               <a:rPr lang="sv-SE" smtClean="0"/>
-              <a:t>2020-01-28</a:t>
+              <a:t>2020-01-31</a:t>
             </a:fld>
             <a:endParaRPr lang="sv-SE"/>
           </a:p>
@@ -2704,7 +2705,7 @@
           <a:p>
             <a:fld id="{4103C207-1B24-E341-B490-8E9928603720}" type="datetimeFigureOut">
               <a:rPr lang="sv-SE" smtClean="0"/>
-              <a:t>2020-01-28</a:t>
+              <a:t>2020-01-31</a:t>
             </a:fld>
             <a:endParaRPr lang="sv-SE"/>
           </a:p>
@@ -2947,7 +2948,7 @@
           <a:p>
             <a:fld id="{4103C207-1B24-E341-B490-8E9928603720}" type="datetimeFigureOut">
               <a:rPr lang="sv-SE" smtClean="0"/>
-              <a:t>2020-01-28</a:t>
+              <a:t>2020-01-31</a:t>
             </a:fld>
             <a:endParaRPr lang="sv-SE"/>
           </a:p>
@@ -3403,6 +3404,10 @@
               <a:rPr lang="sv-SE" sz="2800" dirty="0"/>
               <a:t>Testdriven utveckling</a:t>
             </a:r>
+            <a:r>
+              <a:rPr lang="sv-SE" sz="3600" dirty="0"/>
+              <a:t/>
+            </a:r>
             <a:br>
               <a:rPr lang="sv-SE" sz="3600" dirty="0"/>
             </a:br>
@@ -3510,13 +3515,8 @@
             <a:pPr algn="l"/>
             <a:r>
               <a:rPr lang="sv-SE" sz="3600" b="1" dirty="0"/>
-              <a:t>Verktyg – </a:t>
-            </a:r>
-            <a:r>
-              <a:rPr lang="sv-SE" sz="3600" b="1" dirty="0" err="1"/>
-              <a:t>Javascript</a:t>
-            </a:r>
-            <a:endParaRPr lang="sv-SE" sz="3600" b="1" dirty="0"/>
+              <a:t>Verktyg – Java</a:t>
+            </a:r>
           </a:p>
         </p:txBody>
       </p:sp>
@@ -3538,13 +3538,13 @@
         </p:nvSpPr>
         <p:spPr>
           <a:xfrm>
-            <a:off x="3175688" y="2060027"/>
-            <a:ext cx="7492312" cy="3160043"/>
+            <a:off x="4719918" y="1963271"/>
+            <a:ext cx="5948082" cy="4291350"/>
           </a:xfrm>
         </p:spPr>
         <p:txBody>
           <a:bodyPr>
-            <a:normAutofit/>
+            <a:normAutofit fontScale="85000" lnSpcReduction="20000"/>
           </a:bodyPr>
           <a:lstStyle/>
           <a:p>
@@ -3565,7 +3565,7 @@
             </a:pPr>
             <a:r>
               <a:rPr lang="sv-SE" dirty="0" err="1"/>
-              <a:t>MochaJS</a:t>
+              <a:t>JUnit</a:t>
             </a:r>
             <a:endParaRPr lang="sv-SE" dirty="0"/>
           </a:p>
@@ -3575,9 +3575,10 @@
               <a:buChar char="•"/>
             </a:pPr>
             <a:r>
-              <a:rPr lang="sv-SE" dirty="0"/>
-              <a:t>JEST</a:t>
-            </a:r>
+              <a:rPr lang="sv-SE" dirty="0" err="1"/>
+              <a:t>TestNG</a:t>
+            </a:r>
+            <a:endParaRPr lang="sv-SE" dirty="0"/>
           </a:p>
           <a:p>
             <a:pPr marL="800100" lvl="1" indent="-342900" algn="l">
@@ -3585,9 +3586,155 @@
               <a:buChar char="•"/>
             </a:pPr>
             <a:r>
-              <a:rPr lang="sv-SE" dirty="0"/>
-              <a:t>Jasmine</a:t>
-            </a:r>
+              <a:rPr lang="sv-SE" dirty="0" err="1"/>
+              <a:t>Spek</a:t>
+            </a:r>
+            <a:r>
+              <a:rPr lang="sv-SE" dirty="0"/>
+              <a:t> (</a:t>
+            </a:r>
+            <a:r>
+              <a:rPr lang="sv-SE" dirty="0" err="1"/>
+              <a:t>Kotlin</a:t>
+            </a:r>
+            <a:r>
+              <a:rPr lang="sv-SE" dirty="0"/>
+              <a:t>)</a:t>
+            </a:r>
+          </a:p>
+          <a:p>
+            <a:pPr marL="800100" lvl="1" indent="-342900" algn="l">
+              <a:buFont typeface="Arial" panose="020B0604020202020204" pitchFamily="34" charset="0"/>
+              <a:buChar char="•"/>
+            </a:pPr>
+            <a:r>
+              <a:rPr lang="sv-SE" dirty="0"/>
+              <a:t>Spock (</a:t>
+            </a:r>
+            <a:r>
+              <a:rPr lang="sv-SE" dirty="0" err="1"/>
+              <a:t>Groovy</a:t>
+            </a:r>
+            <a:r>
+              <a:rPr lang="sv-SE" dirty="0"/>
+              <a:t>)</a:t>
+            </a:r>
+          </a:p>
+          <a:p>
+            <a:pPr marL="800100" lvl="1" indent="-342900" algn="l">
+              <a:buFont typeface="Arial" panose="020B0604020202020204" pitchFamily="34" charset="0"/>
+              <a:buChar char="•"/>
+            </a:pPr>
+            <a:r>
+              <a:rPr lang="sv-SE" dirty="0" err="1"/>
+              <a:t>Cucumber</a:t>
+            </a:r>
+            <a:endParaRPr lang="sv-SE" dirty="0"/>
+          </a:p>
+          <a:p>
+            <a:pPr marL="800100" lvl="1" indent="-342900" algn="l">
+              <a:buFont typeface="Arial" panose="020B0604020202020204" pitchFamily="34" charset="0"/>
+              <a:buChar char="•"/>
+            </a:pPr>
+            <a:r>
+              <a:rPr lang="sv-SE" dirty="0"/>
+              <a:t>Scalatest (Scala)</a:t>
+            </a:r>
+          </a:p>
+          <a:p>
+            <a:pPr marL="342900" indent="-342900" algn="l">
+              <a:buFont typeface="Arial" panose="020B0604020202020204" pitchFamily="34" charset="0"/>
+              <a:buChar char="•"/>
+            </a:pPr>
+            <a:r>
+              <a:rPr lang="sv-SE" dirty="0" err="1"/>
+              <a:t>Assertions</a:t>
+            </a:r>
+            <a:endParaRPr lang="sv-SE" dirty="0"/>
+          </a:p>
+          <a:p>
+            <a:pPr marL="800100" lvl="1" indent="-342900" algn="l">
+              <a:buFont typeface="Arial" panose="020B0604020202020204" pitchFamily="34" charset="0"/>
+              <a:buChar char="•"/>
+            </a:pPr>
+            <a:r>
+              <a:rPr lang="sv-SE" dirty="0" err="1"/>
+              <a:t>AssertJ</a:t>
+            </a:r>
+            <a:endParaRPr lang="sv-SE" dirty="0"/>
+          </a:p>
+          <a:p>
+            <a:pPr marL="800100" lvl="1" indent="-342900" algn="l">
+              <a:buFont typeface="Arial" panose="020B0604020202020204" pitchFamily="34" charset="0"/>
+              <a:buChar char="•"/>
+            </a:pPr>
+            <a:r>
+              <a:rPr lang="sv-SE" dirty="0" err="1"/>
+              <a:t>Hamcrest</a:t>
+            </a:r>
+            <a:endParaRPr lang="sv-SE" dirty="0"/>
+          </a:p>
+          <a:p>
+            <a:pPr marL="800100" lvl="1" indent="-342900" algn="l">
+              <a:buFont typeface="Arial" panose="020B0604020202020204" pitchFamily="34" charset="0"/>
+              <a:buChar char="•"/>
+            </a:pPr>
+            <a:r>
+              <a:rPr lang="sv-SE" dirty="0" err="1"/>
+              <a:t>JUnit</a:t>
+            </a:r>
+            <a:endParaRPr lang="sv-SE" dirty="0"/>
+          </a:p>
+          <a:p>
+            <a:pPr marL="342900" indent="-342900" algn="l">
+              <a:buFont typeface="Arial" panose="020B0604020202020204" pitchFamily="34" charset="0"/>
+              <a:buChar char="•"/>
+            </a:pPr>
+            <a:r>
+              <a:rPr lang="sv-SE" dirty="0" err="1"/>
+              <a:t>Mock</a:t>
+            </a:r>
+            <a:endParaRPr lang="sv-SE" dirty="0"/>
+          </a:p>
+          <a:p>
+            <a:pPr marL="800100" lvl="1" indent="-342900" algn="l">
+              <a:buFont typeface="Arial" panose="020B0604020202020204" pitchFamily="34" charset="0"/>
+              <a:buChar char="•"/>
+            </a:pPr>
+            <a:r>
+              <a:rPr lang="sv-SE" dirty="0" err="1"/>
+              <a:t>Mockito</a:t>
+            </a:r>
+            <a:endParaRPr lang="sv-SE" dirty="0"/>
+          </a:p>
+          <a:p>
+            <a:pPr marL="800100" lvl="1" indent="-342900" algn="l">
+              <a:buFont typeface="Arial" panose="020B0604020202020204" pitchFamily="34" charset="0"/>
+              <a:buChar char="•"/>
+            </a:pPr>
+            <a:r>
+              <a:rPr lang="sv-SE" dirty="0" err="1"/>
+              <a:t>Easymock</a:t>
+            </a:r>
+            <a:endParaRPr lang="sv-SE" dirty="0"/>
+          </a:p>
+          <a:p>
+            <a:pPr marL="800100" lvl="1" indent="-342900" algn="l">
+              <a:buFont typeface="Arial" panose="020B0604020202020204" pitchFamily="34" charset="0"/>
+              <a:buChar char="•"/>
+            </a:pPr>
+            <a:r>
+              <a:rPr lang="sv-SE" dirty="0" err="1"/>
+              <a:t>Powermock</a:t>
+            </a:r>
+            <a:endParaRPr lang="sv-SE" dirty="0"/>
+          </a:p>
+          <a:p>
+            <a:pPr marL="800100" lvl="1" indent="-342900" algn="l">
+              <a:buFont typeface="Arial" panose="020B0604020202020204" pitchFamily="34" charset="0"/>
+              <a:buChar char="•"/>
+            </a:pPr>
+            <a:endParaRPr lang="sv-SE" dirty="0"/>
           </a:p>
           <a:p>
             <a:pPr algn="l"/>
@@ -3605,7 +3752,7 @@
     </p:spTree>
     <p:extLst>
       <p:ext uri="{BB962C8B-B14F-4D97-AF65-F5344CB8AC3E}">
-        <p14:creationId xmlns:p14="http://schemas.microsoft.com/office/powerpoint/2010/main" val="1957325092"/>
+        <p14:creationId xmlns:p14="http://schemas.microsoft.com/office/powerpoint/2010/main" val="295322603"/>
       </p:ext>
     </p:extLst>
   </p:cSld>
@@ -3650,21 +3797,26 @@
         </p:nvSpPr>
         <p:spPr>
           <a:xfrm>
-            <a:off x="832021" y="603379"/>
-            <a:ext cx="6731753" cy="626331"/>
+            <a:off x="832022" y="603379"/>
+            <a:ext cx="4633357" cy="626331"/>
           </a:xfrm>
         </p:spPr>
         <p:txBody>
           <a:bodyPr anchor="ctr">
-            <a:noAutofit/>
+            <a:normAutofit/>
           </a:bodyPr>
           <a:lstStyle/>
           <a:p>
             <a:pPr algn="l"/>
             <a:r>
               <a:rPr lang="sv-SE" sz="3600" b="1" dirty="0"/>
-              <a:t>Test med externt beroende</a:t>
-            </a:r>
+              <a:t>Verktyg – </a:t>
+            </a:r>
+            <a:r>
+              <a:rPr lang="sv-SE" sz="3600" b="1" dirty="0" err="1"/>
+              <a:t>Javascript</a:t>
+            </a:r>
+            <a:endParaRPr lang="sv-SE" sz="3600" b="1" dirty="0"/>
           </a:p>
         </p:txBody>
       </p:sp>
@@ -3686,8 +3838,8 @@
         </p:nvSpPr>
         <p:spPr>
           <a:xfrm>
-            <a:off x="3175688" y="2060027"/>
-            <a:ext cx="7492312" cy="3160043"/>
+            <a:off x="4948518" y="2060027"/>
+            <a:ext cx="5719482" cy="3160043"/>
           </a:xfrm>
         </p:spPr>
         <p:txBody>
@@ -3701,84 +3853,40 @@
               <a:buChar char="•"/>
             </a:pPr>
             <a:r>
-              <a:rPr lang="sv-SE" dirty="0"/>
-              <a:t>Trolla bort besvärliga beroenden</a:t>
-            </a:r>
-          </a:p>
-          <a:p>
-            <a:pPr marL="342900" indent="-342900" algn="l">
-              <a:buFont typeface="Arial" panose="020B0604020202020204" pitchFamily="34" charset="0"/>
-              <a:buChar char="•"/>
-            </a:pPr>
-            <a:r>
               <a:rPr lang="sv-SE" dirty="0" err="1"/>
-              <a:t>Mock</a:t>
-            </a:r>
-            <a:r>
-              <a:rPr lang="sv-SE" dirty="0"/>
-              <a:t> – </a:t>
-            </a:r>
+              <a:t>Testkörare</a:t>
+            </a:r>
+            <a:endParaRPr lang="sv-SE" dirty="0"/>
+          </a:p>
+          <a:p>
+            <a:pPr marL="800100" lvl="1" indent="-342900" algn="l">
+              <a:buFont typeface="Arial" panose="020B0604020202020204" pitchFamily="34" charset="0"/>
+              <a:buChar char="•"/>
+            </a:pPr>
             <a:r>
               <a:rPr lang="sv-SE" dirty="0" err="1"/>
-              <a:t>Attrap</a:t>
-            </a:r>
-            <a:r>
-              <a:rPr lang="sv-SE" dirty="0"/>
-              <a:t>. Egengjorda eller med befintliga verktyg</a:t>
-            </a:r>
-          </a:p>
-          <a:p>
-            <a:pPr marL="342900" indent="-342900" algn="l">
-              <a:buFont typeface="Arial" panose="020B0604020202020204" pitchFamily="34" charset="0"/>
-              <a:buChar char="•"/>
-            </a:pPr>
-            <a:r>
-              <a:rPr lang="sv-SE" dirty="0" err="1"/>
-              <a:t>Dependency</a:t>
-            </a:r>
-            <a:r>
-              <a:rPr lang="sv-SE" dirty="0"/>
-              <a:t> </a:t>
-            </a:r>
-            <a:r>
-              <a:rPr lang="sv-SE" dirty="0" err="1"/>
-              <a:t>Injection</a:t>
-            </a:r>
-            <a:r>
-              <a:rPr lang="sv-SE" dirty="0"/>
-              <a:t> – Bestämma beroenden utifrån</a:t>
-            </a:r>
-          </a:p>
-          <a:p>
-            <a:pPr marL="342900" indent="-342900" algn="l">
-              <a:buFont typeface="Arial" panose="020B0604020202020204" pitchFamily="34" charset="0"/>
-              <a:buChar char="•"/>
-            </a:pPr>
-            <a:r>
-              <a:rPr lang="sv-SE" dirty="0" err="1"/>
-              <a:t>Dependency</a:t>
-            </a:r>
-            <a:r>
-              <a:rPr lang="sv-SE" dirty="0"/>
-              <a:t> Inversion </a:t>
-            </a:r>
-            <a:r>
-              <a:rPr lang="sv-SE" dirty="0" err="1"/>
-              <a:t>Principle</a:t>
-            </a:r>
-            <a:r>
-              <a:rPr lang="sv-SE" dirty="0"/>
-              <a:t> – Separera ansvar och gör implementation utbytbar.</a:t>
-            </a:r>
-          </a:p>
-          <a:p>
-            <a:pPr marL="342900" indent="-342900" algn="l">
-              <a:buFont typeface="Arial" panose="020B0604020202020204" pitchFamily="34" charset="0"/>
-              <a:buChar char="•"/>
-            </a:pPr>
-            <a:r>
-              <a:rPr lang="sv-SE" dirty="0"/>
-              <a:t>Demo</a:t>
+              <a:t>MochaJS</a:t>
+            </a:r>
+            <a:endParaRPr lang="sv-SE" dirty="0"/>
+          </a:p>
+          <a:p>
+            <a:pPr marL="800100" lvl="1" indent="-342900" algn="l">
+              <a:buFont typeface="Arial" panose="020B0604020202020204" pitchFamily="34" charset="0"/>
+              <a:buChar char="•"/>
+            </a:pPr>
+            <a:r>
+              <a:rPr lang="sv-SE" dirty="0"/>
+              <a:t>JEST</a:t>
+            </a:r>
+          </a:p>
+          <a:p>
+            <a:pPr marL="800100" lvl="1" indent="-342900" algn="l">
+              <a:buFont typeface="Arial" panose="020B0604020202020204" pitchFamily="34" charset="0"/>
+              <a:buChar char="•"/>
+            </a:pPr>
+            <a:r>
+              <a:rPr lang="sv-SE" dirty="0"/>
+              <a:t>Jasmine</a:t>
             </a:r>
           </a:p>
           <a:p>
@@ -3797,7 +3905,7 @@
     </p:spTree>
     <p:extLst>
       <p:ext uri="{BB962C8B-B14F-4D97-AF65-F5344CB8AC3E}">
-        <p14:creationId xmlns:p14="http://schemas.microsoft.com/office/powerpoint/2010/main" val="4103962270"/>
+        <p14:creationId xmlns:p14="http://schemas.microsoft.com/office/powerpoint/2010/main" val="1957325092"/>
       </p:ext>
     </p:extLst>
   </p:cSld>
@@ -3842,8 +3950,8 @@
         </p:nvSpPr>
         <p:spPr>
           <a:xfrm>
-            <a:off x="832022" y="603379"/>
-            <a:ext cx="6163582" cy="626331"/>
+            <a:off x="832021" y="603379"/>
+            <a:ext cx="6731753" cy="626331"/>
           </a:xfrm>
         </p:spPr>
         <p:txBody>
@@ -3854,12 +3962,8 @@
           <a:p>
             <a:pPr algn="l"/>
             <a:r>
-              <a:rPr lang="sv-SE" sz="3600" b="1" dirty="0" err="1"/>
-              <a:t>Mockito</a:t>
-            </a:r>
-            <a:r>
               <a:rPr lang="sv-SE" sz="3600" b="1" dirty="0"/>
-              <a:t> exempel</a:t>
+              <a:t>Test med externt beroende</a:t>
             </a:r>
           </a:p>
         </p:txBody>
@@ -3898,68 +4002,52 @@
             </a:pPr>
             <a:r>
               <a:rPr lang="sv-SE" dirty="0"/>
-              <a:t>Skapa </a:t>
-            </a:r>
+              <a:t>Trolla bort besvärliga beroenden</a:t>
+            </a:r>
+          </a:p>
+          <a:p>
+            <a:pPr marL="342900" indent="-342900" algn="l">
+              <a:buFont typeface="Arial" panose="020B0604020202020204" pitchFamily="34" charset="0"/>
+              <a:buChar char="•"/>
+            </a:pPr>
             <a:r>
               <a:rPr lang="sv-SE" dirty="0" err="1"/>
-              <a:t>mock</a:t>
-            </a:r>
-            <a:r>
-              <a:rPr lang="sv-SE" sz="1600" dirty="0"/>
-              <a:t>:</a:t>
-            </a:r>
-            <a:br>
-              <a:rPr lang="sv-SE" sz="1600" dirty="0"/>
-            </a:br>
-            <a:r>
-              <a:rPr lang="sv-SE" sz="1600" dirty="0" err="1">
-                <a:latin typeface="Consolas" panose="020B0609020204030204" pitchFamily="49" charset="0"/>
-              </a:rPr>
-              <a:t>HttpClient</a:t>
-            </a:r>
-            <a:r>
-              <a:rPr lang="sv-SE" sz="1600" dirty="0">
-                <a:latin typeface="Consolas" panose="020B0609020204030204" pitchFamily="49" charset="0"/>
-              </a:rPr>
+              <a:t>Mock</a:t>
+            </a:r>
+            <a:r>
+              <a:rPr lang="sv-SE" dirty="0"/>
+              <a:t> – </a:t>
+            </a:r>
+            <a:r>
+              <a:rPr lang="sv-SE" dirty="0" err="1"/>
+              <a:t>Attrap</a:t>
+            </a:r>
+            <a:r>
+              <a:rPr lang="sv-SE" dirty="0"/>
+              <a:t>. Egengjorda eller med befintliga verktyg</a:t>
+            </a:r>
+          </a:p>
+          <a:p>
+            <a:pPr marL="342900" indent="-342900" algn="l">
+              <a:buFont typeface="Arial" panose="020B0604020202020204" pitchFamily="34" charset="0"/>
+              <a:buChar char="•"/>
+            </a:pPr>
+            <a:r>
+              <a:rPr lang="sv-SE" dirty="0" err="1"/>
+              <a:t>Dependency</a:t>
+            </a:r>
+            <a:r>
+              <a:rPr lang="sv-SE" dirty="0"/>
               <a:t> </a:t>
             </a:r>
             <a:r>
-              <a:rPr lang="sv-SE" sz="1600" dirty="0" err="1">
-                <a:latin typeface="Consolas" panose="020B0609020204030204" pitchFamily="49" charset="0"/>
-              </a:rPr>
-              <a:t>httpClient</a:t>
-            </a:r>
-            <a:r>
-              <a:rPr lang="sv-SE" sz="1600" dirty="0">
-                <a:latin typeface="Consolas" panose="020B0609020204030204" pitchFamily="49" charset="0"/>
-              </a:rPr>
-              <a:t> = </a:t>
-            </a:r>
-            <a:r>
-              <a:rPr lang="sv-SE" sz="1600" dirty="0" err="1">
-                <a:latin typeface="Consolas" panose="020B0609020204030204" pitchFamily="49" charset="0"/>
-              </a:rPr>
-              <a:t>Mockito.mock</a:t>
-            </a:r>
-            <a:r>
-              <a:rPr lang="sv-SE" sz="1600" dirty="0">
-                <a:latin typeface="Consolas" panose="020B0609020204030204" pitchFamily="49" charset="0"/>
-              </a:rPr>
-              <a:t>(</a:t>
-            </a:r>
-            <a:r>
-              <a:rPr lang="sv-SE" sz="1600" dirty="0" err="1">
-                <a:latin typeface="Consolas" panose="020B0609020204030204" pitchFamily="49" charset="0"/>
-              </a:rPr>
-              <a:t>HttpClient.class</a:t>
-            </a:r>
-            <a:r>
-              <a:rPr lang="sv-SE" sz="1600" dirty="0">
-                <a:latin typeface="Consolas" panose="020B0609020204030204" pitchFamily="49" charset="0"/>
-              </a:rPr>
-              <a:t>);</a:t>
-            </a:r>
-            <a:endParaRPr lang="sv-SE" sz="1600" dirty="0"/>
+              <a:rPr lang="sv-SE" dirty="0" err="1"/>
+              <a:t>Injection</a:t>
+            </a:r>
+            <a:r>
+              <a:rPr lang="sv-SE" dirty="0"/>
+              <a:t> – Bestämma beroenden utifrån</a:t>
+            </a:r>
           </a:p>
           <a:p>
             <a:pPr marL="342900" indent="-342900" algn="l">
@@ -3967,61 +4055,21 @@
               <a:buChar char="•"/>
             </a:pPr>
             <a:r>
-              <a:rPr lang="sv-SE" dirty="0"/>
-              <a:t>Sätta upp beteende:</a:t>
-            </a:r>
-            <a:br>
-              <a:rPr lang="sv-SE" dirty="0"/>
-            </a:br>
-            <a:r>
-              <a:rPr lang="sv-SE" sz="1600" dirty="0" err="1">
-                <a:latin typeface="Consolas" panose="020B0609020204030204" pitchFamily="49" charset="0"/>
-              </a:rPr>
-              <a:t>Mockito.when</a:t>
-            </a:r>
-            <a:r>
-              <a:rPr lang="sv-SE" sz="1600" dirty="0">
-                <a:latin typeface="Consolas" panose="020B0609020204030204" pitchFamily="49" charset="0"/>
-              </a:rPr>
-              <a:t>(</a:t>
-            </a:r>
-            <a:r>
-              <a:rPr lang="sv-SE" sz="1600" dirty="0" err="1">
-                <a:latin typeface="Consolas" panose="020B0609020204030204" pitchFamily="49" charset="0"/>
-              </a:rPr>
-              <a:t>httpClient.get</a:t>
-            </a:r>
-            <a:r>
-              <a:rPr lang="sv-SE" sz="1600" dirty="0">
-                <a:latin typeface="Consolas" panose="020B0609020204030204" pitchFamily="49" charset="0"/>
-              </a:rPr>
-              <a:t>(</a:t>
-            </a:r>
-            <a:r>
-              <a:rPr lang="sv-SE" sz="1600" dirty="0" err="1">
-                <a:latin typeface="Consolas" panose="020B0609020204030204" pitchFamily="49" charset="0"/>
-              </a:rPr>
-              <a:t>Mockito.any</a:t>
-            </a:r>
-            <a:r>
-              <a:rPr lang="sv-SE" sz="1600" dirty="0">
-                <a:latin typeface="Consolas" panose="020B0609020204030204" pitchFamily="49" charset="0"/>
-              </a:rPr>
-              <a:t>())).</a:t>
-            </a:r>
-            <a:r>
-              <a:rPr lang="sv-SE" sz="1600" dirty="0" err="1">
-                <a:latin typeface="Consolas" panose="020B0609020204030204" pitchFamily="49" charset="0"/>
-              </a:rPr>
-              <a:t>thenReturn</a:t>
-            </a:r>
-            <a:r>
-              <a:rPr lang="sv-SE" sz="1600" dirty="0">
-                <a:latin typeface="Consolas" panose="020B0609020204030204" pitchFamily="49" charset="0"/>
-              </a:rPr>
-              <a:t>("OK");</a:t>
-            </a:r>
-            <a:endParaRPr lang="sv-SE" sz="1600" dirty="0"/>
+              <a:rPr lang="sv-SE" dirty="0" err="1"/>
+              <a:t>Dependency</a:t>
+            </a:r>
+            <a:r>
+              <a:rPr lang="sv-SE" dirty="0"/>
+              <a:t> Inversion </a:t>
+            </a:r>
+            <a:r>
+              <a:rPr lang="sv-SE" dirty="0" err="1"/>
+              <a:t>Principle</a:t>
+            </a:r>
+            <a:r>
+              <a:rPr lang="sv-SE" dirty="0"/>
+              <a:t> – Separera ansvar och gör implementation utbytbar.</a:t>
+            </a:r>
           </a:p>
           <a:p>
             <a:pPr marL="342900" indent="-342900" algn="l">
@@ -4030,68 +4078,12 @@
             </a:pPr>
             <a:r>
               <a:rPr lang="sv-SE" dirty="0"/>
-              <a:t>Verifiera </a:t>
-            </a:r>
-            <a:r>
-              <a:rPr lang="sv-SE" dirty="0" err="1"/>
-              <a:t>mock</a:t>
-            </a:r>
-            <a:r>
-              <a:rPr lang="sv-SE" dirty="0"/>
-              <a:t>:</a:t>
-            </a:r>
-            <a:br>
-              <a:rPr lang="sv-SE" dirty="0"/>
-            </a:br>
-            <a:r>
-              <a:rPr lang="sv-SE" sz="1600" dirty="0" err="1">
-                <a:latin typeface="Consolas" panose="020B0609020204030204" pitchFamily="49" charset="0"/>
-              </a:rPr>
-              <a:t>Mockito.verify</a:t>
-            </a:r>
-            <a:r>
-              <a:rPr lang="sv-SE" sz="1600" dirty="0">
-                <a:latin typeface="Consolas" panose="020B0609020204030204" pitchFamily="49" charset="0"/>
-              </a:rPr>
-              <a:t>(</a:t>
-            </a:r>
-            <a:r>
-              <a:rPr lang="sv-SE" sz="1600" dirty="0" err="1">
-                <a:latin typeface="Consolas" panose="020B0609020204030204" pitchFamily="49" charset="0"/>
-              </a:rPr>
-              <a:t>httpClient</a:t>
-            </a:r>
-            <a:r>
-              <a:rPr lang="sv-SE" sz="1600" dirty="0">
-                <a:latin typeface="Consolas" panose="020B0609020204030204" pitchFamily="49" charset="0"/>
-              </a:rPr>
-              <a:t>).get(</a:t>
-            </a:r>
-            <a:r>
-              <a:rPr lang="sv-SE" sz="1600" dirty="0" err="1">
-                <a:latin typeface="Consolas" panose="020B0609020204030204" pitchFamily="49" charset="0"/>
-              </a:rPr>
-              <a:t>URI.create</a:t>
-            </a:r>
-            <a:r>
-              <a:rPr lang="sv-SE" sz="1600" dirty="0">
-                <a:latin typeface="Consolas" panose="020B0609020204030204" pitchFamily="49" charset="0"/>
-              </a:rPr>
-              <a:t>("/</a:t>
-            </a:r>
-            <a:r>
-              <a:rPr lang="sv-SE" sz="1600" dirty="0" err="1">
-                <a:latin typeface="Consolas" panose="020B0609020204030204" pitchFamily="49" charset="0"/>
-              </a:rPr>
-              <a:t>healthcheck</a:t>
-            </a:r>
-            <a:r>
-              <a:rPr lang="sv-SE" sz="1600" dirty="0">
-                <a:latin typeface="Consolas" panose="020B0609020204030204" pitchFamily="49" charset="0"/>
-              </a:rPr>
-              <a:t>"));</a:t>
-            </a:r>
-            <a:endParaRPr lang="sv-SE" sz="1600" dirty="0"/>
+              <a:t>Demo</a:t>
+            </a:r>
+          </a:p>
+          <a:p>
+            <a:pPr algn="l"/>
+            <a:endParaRPr lang="sv-SE" dirty="0"/>
           </a:p>
           <a:p>
             <a:pPr marL="342900" indent="-342900" algn="l">
@@ -4105,7 +4097,7 @@
     </p:spTree>
     <p:extLst>
       <p:ext uri="{BB962C8B-B14F-4D97-AF65-F5344CB8AC3E}">
-        <p14:creationId xmlns:p14="http://schemas.microsoft.com/office/powerpoint/2010/main" val="1825566262"/>
+        <p14:creationId xmlns:p14="http://schemas.microsoft.com/office/powerpoint/2010/main" val="4103962270"/>
       </p:ext>
     </p:extLst>
   </p:cSld>
@@ -4151,99 +4143,55 @@
         <p:spPr>
           <a:xfrm>
             <a:off x="832022" y="603379"/>
-            <a:ext cx="4633357" cy="626331"/>
+            <a:ext cx="6163582" cy="626331"/>
           </a:xfrm>
         </p:spPr>
         <p:txBody>
           <a:bodyPr anchor="ctr">
+            <a:noAutofit/>
+          </a:bodyPr>
+          <a:lstStyle/>
+          <a:p>
+            <a:pPr algn="l"/>
+            <a:r>
+              <a:rPr lang="sv-SE" sz="3600" b="1" dirty="0" err="1"/>
+              <a:t>Mockito</a:t>
+            </a:r>
+            <a:r>
+              <a:rPr lang="sv-SE" sz="3600" b="1" dirty="0"/>
+              <a:t> exempel</a:t>
+            </a:r>
+          </a:p>
+        </p:txBody>
+      </p:sp>
+      <p:sp>
+        <p:nvSpPr>
+          <p:cNvPr id="3" name="Subtitle 2">
+            <a:extLst>
+              <a:ext uri="{FF2B5EF4-FFF2-40B4-BE49-F238E27FC236}">
+                <a16:creationId xmlns:a16="http://schemas.microsoft.com/office/drawing/2014/main" id="{556D9DB8-FEA7-1543-85E3-64536A063D0D}"/>
+              </a:ext>
+            </a:extLst>
+          </p:cNvPr>
+          <p:cNvSpPr>
+            <a:spLocks noGrp="1"/>
+          </p:cNvSpPr>
+          <p:nvPr>
+            <p:ph type="subTitle" idx="1"/>
+          </p:nvPr>
+        </p:nvSpPr>
+        <p:spPr>
+          <a:xfrm>
+            <a:off x="3175688" y="2060027"/>
+            <a:ext cx="7492312" cy="3160043"/>
+          </a:xfrm>
+        </p:spPr>
+        <p:txBody>
+          <a:bodyPr>
             <a:normAutofit/>
           </a:bodyPr>
           <a:lstStyle/>
           <a:p>
-            <a:r>
-              <a:rPr lang="sv-SE" sz="3600" b="1" dirty="0"/>
-              <a:t>Mobbprogrammering</a:t>
-            </a:r>
-          </a:p>
-        </p:txBody>
-      </p:sp>
-      <p:sp>
-        <p:nvSpPr>
-          <p:cNvPr id="3" name="Subtitle 2">
-            <a:extLst>
-              <a:ext uri="{FF2B5EF4-FFF2-40B4-BE49-F238E27FC236}">
-                <a16:creationId xmlns:a16="http://schemas.microsoft.com/office/drawing/2014/main" id="{556D9DB8-FEA7-1543-85E3-64536A063D0D}"/>
-              </a:ext>
-            </a:extLst>
-          </p:cNvPr>
-          <p:cNvSpPr>
-            <a:spLocks noGrp="1"/>
-          </p:cNvSpPr>
-          <p:nvPr>
-            <p:ph type="subTitle" idx="1"/>
-          </p:nvPr>
-        </p:nvSpPr>
-        <p:spPr>
-          <a:xfrm>
-            <a:off x="3175688" y="2060028"/>
-            <a:ext cx="7492312" cy="3197772"/>
-          </a:xfrm>
-        </p:spPr>
-        <p:txBody>
-          <a:bodyPr/>
-          <a:lstStyle/>
-          <a:p>
-            <a:pPr algn="l"/>
-            <a:r>
-              <a:rPr lang="sv-SE" dirty="0"/>
-              <a:t>Ändrade krav: Vi vill slå upp priserna från </a:t>
-            </a:r>
-            <a:r>
-              <a:rPr lang="sv-SE" dirty="0" err="1"/>
-              <a:t>pristjänst</a:t>
-            </a:r>
-            <a:r>
-              <a:rPr lang="sv-SE" dirty="0"/>
-              <a:t> då totala priset beräknas.</a:t>
-            </a:r>
-          </a:p>
-          <a:p>
-            <a:pPr marL="342900" indent="-342900" algn="l">
-              <a:buFont typeface="Arial" panose="020B0604020202020204" pitchFamily="34" charset="0"/>
-              <a:buChar char="•"/>
-            </a:pPr>
-            <a:r>
-              <a:rPr lang="sv-SE" dirty="0"/>
-              <a:t>Se till att det finns ett tjänstegränssnitt.</a:t>
-            </a:r>
-          </a:p>
-          <a:p>
-            <a:pPr marL="342900" indent="-342900" algn="l">
-              <a:buFont typeface="Arial" panose="020B0604020202020204" pitchFamily="34" charset="0"/>
-              <a:buChar char="•"/>
-            </a:pPr>
-            <a:r>
-              <a:rPr lang="sv-SE" dirty="0"/>
-              <a:t>Definiera tjänsten som skall användas (</a:t>
-            </a:r>
-            <a:r>
-              <a:rPr lang="sv-SE" dirty="0" err="1"/>
-              <a:t>dependency</a:t>
-            </a:r>
-            <a:r>
-              <a:rPr lang="sv-SE" dirty="0"/>
-              <a:t> </a:t>
-            </a:r>
-            <a:r>
-              <a:rPr lang="sv-SE" dirty="0" err="1"/>
-              <a:t>injection</a:t>
-            </a:r>
-            <a:r>
-              <a:rPr lang="sv-SE" dirty="0"/>
-              <a:t>).</a:t>
-            </a:r>
-          </a:p>
-          <a:p>
             <a:pPr marL="342900" indent="-342900" algn="l">
               <a:buFont typeface="Arial" panose="020B0604020202020204" pitchFamily="34" charset="0"/>
               <a:buChar char="•"/>
@@ -4257,13 +4205,199 @@
               <a:t>mock</a:t>
             </a:r>
             <a:r>
-              <a:rPr lang="sv-SE" dirty="0"/>
-              <a:t>: Jobba med </a:t>
+              <a:rPr lang="sv-SE" sz="1600" dirty="0"/>
+              <a:t>:</a:t>
+            </a:r>
+            <a:br>
+              <a:rPr lang="sv-SE" sz="1600" dirty="0"/>
+            </a:br>
+            <a:r>
+              <a:rPr lang="sv-SE" sz="1600" dirty="0" err="1">
+                <a:latin typeface="Consolas" panose="020B0609020204030204" pitchFamily="49" charset="0"/>
+              </a:rPr>
+              <a:t>HttpClient</a:t>
+            </a:r>
+            <a:r>
+              <a:rPr lang="sv-SE" sz="1600" dirty="0">
+                <a:latin typeface="Consolas" panose="020B0609020204030204" pitchFamily="49" charset="0"/>
+              </a:rPr>
+              <a:t> </a:t>
+            </a:r>
+            <a:r>
+              <a:rPr lang="sv-SE" sz="1600" dirty="0" err="1">
+                <a:latin typeface="Consolas" panose="020B0609020204030204" pitchFamily="49" charset="0"/>
+              </a:rPr>
+              <a:t>httpClient</a:t>
+            </a:r>
+            <a:r>
+              <a:rPr lang="sv-SE" sz="1600" dirty="0">
+                <a:latin typeface="Consolas" panose="020B0609020204030204" pitchFamily="49" charset="0"/>
+              </a:rPr>
+              <a:t> = </a:t>
+            </a:r>
+            <a:r>
+              <a:rPr lang="sv-SE" sz="1600" dirty="0" err="1">
+                <a:latin typeface="Consolas" panose="020B0609020204030204" pitchFamily="49" charset="0"/>
+              </a:rPr>
+              <a:t>Mockito.mock</a:t>
+            </a:r>
+            <a:r>
+              <a:rPr lang="sv-SE" sz="1600" dirty="0">
+                <a:latin typeface="Consolas" panose="020B0609020204030204" pitchFamily="49" charset="0"/>
+              </a:rPr>
+              <a:t>(</a:t>
+            </a:r>
+            <a:r>
+              <a:rPr lang="sv-SE" sz="1600" dirty="0" err="1">
+                <a:latin typeface="Consolas" panose="020B0609020204030204" pitchFamily="49" charset="0"/>
+              </a:rPr>
+              <a:t>HttpClient.class</a:t>
+            </a:r>
+            <a:r>
+              <a:rPr lang="sv-SE" sz="1600" dirty="0">
+                <a:latin typeface="Consolas" panose="020B0609020204030204" pitchFamily="49" charset="0"/>
+              </a:rPr>
+              <a:t>);</a:t>
+            </a:r>
+            <a:endParaRPr lang="sv-SE" sz="1600" dirty="0"/>
+          </a:p>
+          <a:p>
+            <a:pPr marL="342900" indent="-342900" algn="l">
+              <a:buFont typeface="Arial" panose="020B0604020202020204" pitchFamily="34" charset="0"/>
+              <a:buChar char="•"/>
+            </a:pPr>
+            <a:r>
+              <a:rPr lang="sv-SE" dirty="0"/>
+              <a:t>Sätta upp beteende:</a:t>
+            </a:r>
+            <a:br>
+              <a:rPr lang="sv-SE" dirty="0"/>
+            </a:br>
+            <a:r>
+              <a:rPr lang="sv-SE" sz="1600" dirty="0" err="1">
+                <a:latin typeface="Consolas" panose="020B0609020204030204" pitchFamily="49" charset="0"/>
+              </a:rPr>
+              <a:t>Mockito.when</a:t>
+            </a:r>
+            <a:r>
+              <a:rPr lang="sv-SE" sz="1600" dirty="0">
+                <a:latin typeface="Consolas" panose="020B0609020204030204" pitchFamily="49" charset="0"/>
+              </a:rPr>
+              <a:t>(</a:t>
+            </a:r>
+            <a:r>
+              <a:rPr lang="sv-SE" sz="1600" dirty="0" err="1">
+                <a:latin typeface="Consolas" panose="020B0609020204030204" pitchFamily="49" charset="0"/>
+              </a:rPr>
+              <a:t>httpClient.get</a:t>
+            </a:r>
+            <a:r>
+              <a:rPr lang="sv-SE" sz="1600" dirty="0">
+                <a:latin typeface="Consolas" panose="020B0609020204030204" pitchFamily="49" charset="0"/>
+              </a:rPr>
+              <a:t>(</a:t>
+            </a:r>
+            <a:r>
+              <a:rPr lang="sv-SE" sz="1600" dirty="0" err="1">
+                <a:latin typeface="Consolas" panose="020B0609020204030204" pitchFamily="49" charset="0"/>
+              </a:rPr>
+              <a:t>Mockito.any</a:t>
+            </a:r>
+            <a:r>
+              <a:rPr lang="sv-SE" sz="1600" dirty="0">
+                <a:latin typeface="Consolas" panose="020B0609020204030204" pitchFamily="49" charset="0"/>
+              </a:rPr>
+              <a:t>())).</a:t>
+            </a:r>
+            <a:r>
+              <a:rPr lang="sv-SE" sz="1600" dirty="0" err="1">
+                <a:latin typeface="Consolas" panose="020B0609020204030204" pitchFamily="49" charset="0"/>
+              </a:rPr>
+              <a:t>thenReturn</a:t>
+            </a:r>
+            <a:r>
+              <a:rPr lang="sv-SE" sz="1600" dirty="0">
+                <a:latin typeface="Consolas" panose="020B0609020204030204" pitchFamily="49" charset="0"/>
+              </a:rPr>
+              <a:t>("OK");</a:t>
+            </a:r>
+            <a:endParaRPr lang="sv-SE" sz="1600" dirty="0"/>
+          </a:p>
+          <a:p>
+            <a:pPr marL="342900" indent="-342900" algn="l">
+              <a:buFont typeface="Arial" panose="020B0604020202020204" pitchFamily="34" charset="0"/>
+              <a:buChar char="•"/>
+            </a:pPr>
+            <a:r>
+              <a:rPr lang="sv-SE" dirty="0"/>
+              <a:t>Verifiera </a:t>
             </a:r>
             <a:r>
               <a:rPr lang="sv-SE" dirty="0" err="1"/>
-              <a:t>Mockito</a:t>
-            </a:r>
+              <a:t>mock</a:t>
+            </a:r>
+            <a:r>
+              <a:rPr lang="sv-SE" dirty="0"/>
+              <a:t>:</a:t>
+            </a:r>
+            <a:br>
+              <a:rPr lang="sv-SE" dirty="0"/>
+            </a:br>
+            <a:r>
+              <a:rPr lang="sv-SE" sz="1600" dirty="0" err="1">
+                <a:latin typeface="Consolas" panose="020B0609020204030204" pitchFamily="49" charset="0"/>
+              </a:rPr>
+              <a:t>Mockito.verify</a:t>
+            </a:r>
+            <a:r>
+              <a:rPr lang="sv-SE" sz="1600" dirty="0">
+                <a:latin typeface="Consolas" panose="020B0609020204030204" pitchFamily="49" charset="0"/>
+              </a:rPr>
+              <a:t>(</a:t>
+            </a:r>
+            <a:r>
+              <a:rPr lang="sv-SE" sz="1600" dirty="0" err="1">
+                <a:latin typeface="Consolas" panose="020B0609020204030204" pitchFamily="49" charset="0"/>
+              </a:rPr>
+              <a:t>httpClient</a:t>
+            </a:r>
+            <a:r>
+              <a:rPr lang="sv-SE" sz="1600" dirty="0">
+                <a:latin typeface="Consolas" panose="020B0609020204030204" pitchFamily="49" charset="0"/>
+              </a:rPr>
+              <a:t>).get(</a:t>
+            </a:r>
+            <a:r>
+              <a:rPr lang="sv-SE" sz="1600" dirty="0" err="1">
+                <a:latin typeface="Consolas" panose="020B0609020204030204" pitchFamily="49" charset="0"/>
+              </a:rPr>
+              <a:t>URI.create</a:t>
+            </a:r>
+            <a:r>
+              <a:rPr lang="sv-SE" sz="1600" dirty="0">
+                <a:latin typeface="Consolas" panose="020B0609020204030204" pitchFamily="49" charset="0"/>
+              </a:rPr>
+              <a:t>("/</a:t>
+            </a:r>
+            <a:r>
+              <a:rPr lang="sv-SE" sz="1600" dirty="0" err="1">
+                <a:latin typeface="Consolas" panose="020B0609020204030204" pitchFamily="49" charset="0"/>
+              </a:rPr>
+              <a:t>healthcheck</a:t>
+            </a:r>
+            <a:r>
+              <a:rPr lang="sv-SE" sz="1600" dirty="0">
+                <a:latin typeface="Consolas" panose="020B0609020204030204" pitchFamily="49" charset="0"/>
+              </a:rPr>
+              <a:t>"));</a:t>
+            </a:r>
+            <a:endParaRPr lang="sv-SE" sz="1600" dirty="0"/>
+          </a:p>
+          <a:p>
+            <a:pPr marL="342900" indent="-342900" algn="l">
+              <a:buFont typeface="Arial" panose="020B0604020202020204" pitchFamily="34" charset="0"/>
+              <a:buChar char="•"/>
+            </a:pPr>
             <a:endParaRPr lang="sv-SE" dirty="0"/>
           </a:p>
         </p:txBody>
@@ -4271,7 +4405,7 @@
     </p:spTree>
     <p:extLst>
       <p:ext uri="{BB962C8B-B14F-4D97-AF65-F5344CB8AC3E}">
-        <p14:creationId xmlns:p14="http://schemas.microsoft.com/office/powerpoint/2010/main" val="4253517235"/>
+        <p14:creationId xmlns:p14="http://schemas.microsoft.com/office/powerpoint/2010/main" val="1825566262"/>
       </p:ext>
     </p:extLst>
   </p:cSld>
@@ -4326,10 +4460,9 @@
           </a:bodyPr>
           <a:lstStyle/>
           <a:p>
-            <a:pPr algn="l"/>
             <a:r>
               <a:rPr lang="sv-SE" sz="3600" b="1" dirty="0"/>
-              <a:t>Del 3</a:t>
+              <a:t>Mobbprogrammering</a:t>
             </a:r>
           </a:p>
         </p:txBody>
@@ -4363,15 +4496,82 @@
             <a:pPr algn="l"/>
             <a:r>
               <a:rPr lang="sv-SE" dirty="0"/>
-              <a:t>Generellt om testning och testmetoder</a:t>
-            </a:r>
+              <a:t>Ändrade krav: Vi vill slå upp priserna från </a:t>
+            </a:r>
+            <a:r>
+              <a:rPr lang="sv-SE" dirty="0" err="1"/>
+              <a:t>pristjänst</a:t>
+            </a:r>
+            <a:r>
+              <a:rPr lang="sv-SE" dirty="0"/>
+              <a:t> då totala priset beräknas.</a:t>
+            </a:r>
+          </a:p>
+          <a:p>
+            <a:pPr marL="342900" indent="-342900" algn="l">
+              <a:buFont typeface="Arial" panose="020B0604020202020204" pitchFamily="34" charset="0"/>
+              <a:buChar char="•"/>
+            </a:pPr>
+            <a:r>
+              <a:rPr lang="sv-SE" dirty="0"/>
+              <a:t>Se till att det finns ett tjänstegränssnitt.</a:t>
+            </a:r>
+          </a:p>
+          <a:p>
+            <a:pPr marL="342900" indent="-342900" algn="l">
+              <a:buFont typeface="Arial" panose="020B0604020202020204" pitchFamily="34" charset="0"/>
+              <a:buChar char="•"/>
+            </a:pPr>
+            <a:r>
+              <a:rPr lang="sv-SE" dirty="0"/>
+              <a:t>Definiera tjänsten som skall användas (</a:t>
+            </a:r>
+            <a:r>
+              <a:rPr lang="sv-SE" dirty="0" err="1"/>
+              <a:t>dependency</a:t>
+            </a:r>
+            <a:r>
+              <a:rPr lang="sv-SE" dirty="0"/>
+              <a:t> </a:t>
+            </a:r>
+            <a:r>
+              <a:rPr lang="sv-SE" dirty="0" err="1"/>
+              <a:t>injection</a:t>
+            </a:r>
+            <a:r>
+              <a:rPr lang="sv-SE" dirty="0"/>
+              <a:t>).</a:t>
+            </a:r>
+          </a:p>
+          <a:p>
+            <a:pPr marL="342900" indent="-342900" algn="l">
+              <a:buFont typeface="Arial" panose="020B0604020202020204" pitchFamily="34" charset="0"/>
+              <a:buChar char="•"/>
+            </a:pPr>
+            <a:r>
+              <a:rPr lang="sv-SE" dirty="0"/>
+              <a:t>Skapa </a:t>
+            </a:r>
+            <a:r>
+              <a:rPr lang="sv-SE" dirty="0" err="1"/>
+              <a:t>mock</a:t>
+            </a:r>
+            <a:r>
+              <a:rPr lang="sv-SE" dirty="0"/>
+              <a:t>: Jobba med </a:t>
+            </a:r>
+            <a:r>
+              <a:rPr lang="sv-SE" dirty="0" err="1"/>
+              <a:t>Mockito</a:t>
+            </a:r>
+            <a:endParaRPr lang="sv-SE" dirty="0"/>
           </a:p>
         </p:txBody>
       </p:sp>
     </p:spTree>
     <p:extLst>
       <p:ext uri="{BB962C8B-B14F-4D97-AF65-F5344CB8AC3E}">
-        <p14:creationId xmlns:p14="http://schemas.microsoft.com/office/powerpoint/2010/main" val="758694239"/>
+        <p14:creationId xmlns:p14="http://schemas.microsoft.com/office/powerpoint/2010/main" val="4253517235"/>
       </p:ext>
     </p:extLst>
   </p:cSld>
@@ -4416,8 +4616,8 @@
         </p:nvSpPr>
         <p:spPr>
           <a:xfrm>
-            <a:off x="620110" y="603379"/>
-            <a:ext cx="2333297" cy="1614304"/>
+            <a:off x="832022" y="603379"/>
+            <a:ext cx="4633357" cy="626331"/>
           </a:xfrm>
         </p:spPr>
         <p:txBody>
@@ -4426,9 +4626,10 @@
           </a:bodyPr>
           <a:lstStyle/>
           <a:p>
+            <a:pPr algn="l"/>
             <a:r>
               <a:rPr lang="sv-SE" sz="3600" b="1" dirty="0"/>
-              <a:t>Kategorier</a:t>
+              <a:t>Del 3</a:t>
             </a:r>
           </a:p>
         </p:txBody>
@@ -4451,106 +4652,35 @@
         </p:nvSpPr>
         <p:spPr>
           <a:xfrm>
-            <a:off x="3175687" y="603379"/>
-            <a:ext cx="8921719" cy="5976097"/>
+            <a:off x="3175688" y="2060028"/>
+            <a:ext cx="7492312" cy="3197772"/>
           </a:xfrm>
         </p:spPr>
         <p:txBody>
-          <a:bodyPr>
-            <a:normAutofit/>
-          </a:bodyPr>
+          <a:bodyPr/>
           <a:lstStyle/>
           <a:p>
             <a:pPr algn="l"/>
             <a:r>
               <a:rPr lang="sv-SE" dirty="0"/>
-              <a:t>Testpyramiden</a:t>
-            </a:r>
-          </a:p>
-          <a:p>
-            <a:pPr marL="342900" indent="-342900" algn="l">
-              <a:buFont typeface="Arial" panose="020B0604020202020204" pitchFamily="34" charset="0"/>
-              <a:buChar char="•"/>
-            </a:pPr>
-            <a:r>
-              <a:rPr lang="sv-SE" dirty="0"/>
-              <a:t>Enhet</a:t>
-            </a:r>
-          </a:p>
-          <a:p>
-            <a:pPr marL="342900" indent="-342900" algn="l">
-              <a:buFont typeface="Arial" panose="020B0604020202020204" pitchFamily="34" charset="0"/>
-              <a:buChar char="•"/>
-            </a:pPr>
-            <a:r>
-              <a:rPr lang="sv-SE" dirty="0"/>
-              <a:t>Integration</a:t>
-            </a:r>
-          </a:p>
-          <a:p>
-            <a:pPr marL="342900" indent="-342900" algn="l">
-              <a:buFont typeface="Arial" panose="020B0604020202020204" pitchFamily="34" charset="0"/>
-              <a:buChar char="•"/>
-            </a:pPr>
-            <a:r>
-              <a:rPr lang="sv-SE" dirty="0"/>
-              <a:t>Funktion</a:t>
-            </a:r>
-          </a:p>
-          <a:p>
-            <a:pPr marL="342900" indent="-342900" algn="l">
-              <a:buFont typeface="Arial" panose="020B0604020202020204" pitchFamily="34" charset="0"/>
-              <a:buChar char="•"/>
-            </a:pPr>
-            <a:r>
-              <a:rPr lang="sv-SE" dirty="0"/>
-              <a:t>End to end (E2E)</a:t>
-            </a:r>
-          </a:p>
-          <a:p>
-            <a:pPr marL="342900" indent="-342900" algn="l">
-              <a:buFont typeface="Arial" panose="020B0604020202020204" pitchFamily="34" charset="0"/>
-              <a:buChar char="•"/>
-            </a:pPr>
-            <a:r>
-              <a:rPr lang="sv-SE" dirty="0"/>
-              <a:t>Acceptans</a:t>
-            </a:r>
-          </a:p>
-          <a:p>
-            <a:pPr marL="342900" indent="-342900" algn="l">
-              <a:buFont typeface="Arial" panose="020B0604020202020204" pitchFamily="34" charset="0"/>
-              <a:buChar char="•"/>
-            </a:pPr>
-            <a:r>
-              <a:rPr lang="sv-SE" dirty="0"/>
-              <a:t>System</a:t>
-            </a:r>
-          </a:p>
-          <a:p>
-            <a:pPr marL="342900" indent="-342900" algn="l">
-              <a:buFont typeface="Arial" panose="020B0604020202020204" pitchFamily="34" charset="0"/>
-              <a:buChar char="•"/>
-            </a:pPr>
-            <a:r>
-              <a:rPr lang="sv-SE" dirty="0"/>
-              <a:t>Prestanda</a:t>
-            </a:r>
+              <a:t>Generellt om testning och </a:t>
+            </a:r>
+            <a:r>
+              <a:rPr lang="sv-SE" dirty="0" smtClean="0"/>
+              <a:t>testmetoder</a:t>
+            </a:r>
+            <a:endParaRPr lang="sv-SE" dirty="0"/>
           </a:p>
           <a:p>
             <a:pPr algn="l"/>
-            <a:endParaRPr lang="sv-SE" dirty="0"/>
-          </a:p>
-          <a:p>
-            <a:pPr algn="l"/>
-            <a:endParaRPr lang="sv-SE" dirty="0"/>
+            <a:endParaRPr lang="sv-SE" dirty="0" smtClean="0"/>
           </a:p>
         </p:txBody>
       </p:sp>
     </p:spTree>
     <p:extLst>
       <p:ext uri="{BB962C8B-B14F-4D97-AF65-F5344CB8AC3E}">
-        <p14:creationId xmlns:p14="http://schemas.microsoft.com/office/powerpoint/2010/main" val="1267284021"/>
+        <p14:creationId xmlns:p14="http://schemas.microsoft.com/office/powerpoint/2010/main" val="758694239"/>
       </p:ext>
     </p:extLst>
   </p:cSld>
@@ -4607,7 +4737,7 @@
           <a:p>
             <a:r>
               <a:rPr lang="sv-SE" sz="3600" b="1" dirty="0"/>
-              <a:t>Egenskaper</a:t>
+              <a:t>Kategorier</a:t>
             </a:r>
           </a:p>
         </p:txBody>
@@ -4630,8 +4760,8 @@
         </p:nvSpPr>
         <p:spPr>
           <a:xfrm>
-            <a:off x="3175687" y="603379"/>
-            <a:ext cx="8921719" cy="5976097"/>
+            <a:off x="4329953" y="1775012"/>
+            <a:ext cx="7767453" cy="4804464"/>
           </a:xfrm>
         </p:spPr>
         <p:txBody>
@@ -4640,14 +4770,26 @@
           </a:bodyPr>
           <a:lstStyle/>
           <a:p>
+            <a:pPr algn="l"/>
+            <a:r>
+              <a:rPr lang="sv-SE" dirty="0"/>
+              <a:t>Testpyramiden</a:t>
+            </a:r>
+          </a:p>
+          <a:p>
             <a:pPr marL="342900" indent="-342900" algn="l">
               <a:buFont typeface="Arial" panose="020B0604020202020204" pitchFamily="34" charset="0"/>
               <a:buChar char="•"/>
             </a:pPr>
             <a:r>
-              <a:rPr lang="sv-SE" dirty="0"/>
-              <a:t>Exekveringstid</a:t>
-            </a:r>
+              <a:rPr lang="sv-SE" dirty="0" smtClean="0"/>
+              <a:t>Enhe</a:t>
+            </a:r>
+            <a:r>
+              <a:rPr lang="sv-SE" dirty="0"/>
+              <a:t>t</a:t>
+            </a:r>
+            <a:endParaRPr lang="sv-SE" dirty="0"/>
           </a:p>
           <a:p>
             <a:pPr marL="342900" indent="-342900" algn="l">
@@ -4656,7 +4798,7 @@
             </a:pPr>
             <a:r>
               <a:rPr lang="sv-SE" dirty="0"/>
-              <a:t>Målgrupp</a:t>
+              <a:t>Integration</a:t>
             </a:r>
           </a:p>
           <a:p>
@@ -4666,7 +4808,7 @@
             </a:pPr>
             <a:r>
               <a:rPr lang="sv-SE" dirty="0"/>
-              <a:t>Stabilitet</a:t>
+              <a:t>Funktion</a:t>
             </a:r>
           </a:p>
           <a:p>
@@ -4676,7 +4818,37 @@
             </a:pPr>
             <a:r>
               <a:rPr lang="sv-SE" dirty="0"/>
-              <a:t>Beroenden</a:t>
+              <a:t>End to end (E2E)</a:t>
+            </a:r>
+          </a:p>
+          <a:p>
+            <a:pPr marL="342900" indent="-342900" algn="l">
+              <a:buFont typeface="Arial" panose="020B0604020202020204" pitchFamily="34" charset="0"/>
+              <a:buChar char="•"/>
+            </a:pPr>
+            <a:r>
+              <a:rPr lang="sv-SE" dirty="0"/>
+              <a:t>Acceptans</a:t>
+            </a:r>
+          </a:p>
+          <a:p>
+            <a:pPr marL="342900" indent="-342900" algn="l">
+              <a:buFont typeface="Arial" panose="020B0604020202020204" pitchFamily="34" charset="0"/>
+              <a:buChar char="•"/>
+            </a:pPr>
+            <a:r>
+              <a:rPr lang="sv-SE" dirty="0"/>
+              <a:t>System</a:t>
+            </a:r>
+          </a:p>
+          <a:p>
+            <a:pPr marL="342900" indent="-342900" algn="l">
+              <a:buFont typeface="Arial" panose="020B0604020202020204" pitchFamily="34" charset="0"/>
+              <a:buChar char="•"/>
+            </a:pPr>
+            <a:r>
+              <a:rPr lang="sv-SE" dirty="0"/>
+              <a:t>Prestanda</a:t>
             </a:r>
           </a:p>
           <a:p>
@@ -4692,7 +4864,7 @@
     </p:spTree>
     <p:extLst>
       <p:ext uri="{BB962C8B-B14F-4D97-AF65-F5344CB8AC3E}">
-        <p14:creationId xmlns:p14="http://schemas.microsoft.com/office/powerpoint/2010/main" val="3653152674"/>
+        <p14:creationId xmlns:p14="http://schemas.microsoft.com/office/powerpoint/2010/main" val="1267284021"/>
       </p:ext>
     </p:extLst>
   </p:cSld>
@@ -4748,6 +4920,148 @@
           <a:lstStyle/>
           <a:p>
             <a:r>
+              <a:rPr lang="sv-SE" sz="3600" b="1" dirty="0"/>
+              <a:t>Egenskaper</a:t>
+            </a:r>
+          </a:p>
+        </p:txBody>
+      </p:sp>
+      <p:sp>
+        <p:nvSpPr>
+          <p:cNvPr id="3" name="Subtitle 2">
+            <a:extLst>
+              <a:ext uri="{FF2B5EF4-FFF2-40B4-BE49-F238E27FC236}">
+                <a16:creationId xmlns:a16="http://schemas.microsoft.com/office/drawing/2014/main" id="{556D9DB8-FEA7-1543-85E3-64536A063D0D}"/>
+              </a:ext>
+            </a:extLst>
+          </p:cNvPr>
+          <p:cNvSpPr>
+            <a:spLocks noGrp="1"/>
+          </p:cNvSpPr>
+          <p:nvPr>
+            <p:ph type="subTitle" idx="1"/>
+          </p:nvPr>
+        </p:nvSpPr>
+        <p:spPr>
+          <a:xfrm>
+            <a:off x="3886200" y="2378390"/>
+            <a:ext cx="8305800" cy="5976097"/>
+          </a:xfrm>
+        </p:spPr>
+        <p:txBody>
+          <a:bodyPr>
+            <a:normAutofit/>
+          </a:bodyPr>
+          <a:lstStyle/>
+          <a:p>
+            <a:pPr marL="342900" indent="-342900" algn="l">
+              <a:buFont typeface="Arial" panose="020B0604020202020204" pitchFamily="34" charset="0"/>
+              <a:buChar char="•"/>
+            </a:pPr>
+            <a:r>
+              <a:rPr lang="sv-SE" dirty="0"/>
+              <a:t>Exekveringstid</a:t>
+            </a:r>
+          </a:p>
+          <a:p>
+            <a:pPr marL="342900" indent="-342900" algn="l">
+              <a:buFont typeface="Arial" panose="020B0604020202020204" pitchFamily="34" charset="0"/>
+              <a:buChar char="•"/>
+            </a:pPr>
+            <a:r>
+              <a:rPr lang="sv-SE" dirty="0"/>
+              <a:t>Målgrupp</a:t>
+            </a:r>
+          </a:p>
+          <a:p>
+            <a:pPr marL="342900" indent="-342900" algn="l">
+              <a:buFont typeface="Arial" panose="020B0604020202020204" pitchFamily="34" charset="0"/>
+              <a:buChar char="•"/>
+            </a:pPr>
+            <a:r>
+              <a:rPr lang="sv-SE" dirty="0"/>
+              <a:t>Stabilitet</a:t>
+            </a:r>
+          </a:p>
+          <a:p>
+            <a:pPr marL="342900" indent="-342900" algn="l">
+              <a:buFont typeface="Arial" panose="020B0604020202020204" pitchFamily="34" charset="0"/>
+              <a:buChar char="•"/>
+            </a:pPr>
+            <a:r>
+              <a:rPr lang="sv-SE" dirty="0"/>
+              <a:t>Beroenden</a:t>
+            </a:r>
+          </a:p>
+          <a:p>
+            <a:pPr algn="l"/>
+            <a:endParaRPr lang="sv-SE" dirty="0"/>
+          </a:p>
+          <a:p>
+            <a:pPr algn="l"/>
+            <a:endParaRPr lang="sv-SE" dirty="0"/>
+          </a:p>
+        </p:txBody>
+      </p:sp>
+    </p:spTree>
+    <p:extLst>
+      <p:ext uri="{BB962C8B-B14F-4D97-AF65-F5344CB8AC3E}">
+        <p14:creationId xmlns:p14="http://schemas.microsoft.com/office/powerpoint/2010/main" val="3653152674"/>
+      </p:ext>
+    </p:extLst>
+  </p:cSld>
+  <p:clrMapOvr>
+    <a:masterClrMapping/>
+  </p:clrMapOvr>
+</p:sld>
+</file>
+
+<file path=ppt/slides/slide18.xml><?xml version="1.0" encoding="utf-8"?>
+<p:sld xmlns:a="http://schemas.openxmlformats.org/drawingml/2006/main" xmlns:r="http://schemas.openxmlformats.org/officeDocument/2006/relationships" xmlns:p="http://schemas.openxmlformats.org/presentationml/2006/main">
+  <p:cSld>
+    <p:spTree>
+      <p:nvGrpSpPr>
+        <p:cNvPr id="1" name=""/>
+        <p:cNvGrpSpPr/>
+        <p:nvPr/>
+      </p:nvGrpSpPr>
+      <p:grpSpPr>
+        <a:xfrm>
+          <a:off x="0" y="0"/>
+          <a:ext cx="0" cy="0"/>
+          <a:chOff x="0" y="0"/>
+          <a:chExt cx="0" cy="0"/>
+        </a:xfrm>
+      </p:grpSpPr>
+      <p:sp>
+        <p:nvSpPr>
+          <p:cNvPr id="2" name="Title 1">
+            <a:extLst>
+              <a:ext uri="{FF2B5EF4-FFF2-40B4-BE49-F238E27FC236}">
+                <a16:creationId xmlns:a16="http://schemas.microsoft.com/office/drawing/2014/main" id="{C81699F1-5A5E-704C-9085-8117DAAEE2BF}"/>
+              </a:ext>
+            </a:extLst>
+          </p:cNvPr>
+          <p:cNvSpPr>
+            <a:spLocks noGrp="1"/>
+          </p:cNvSpPr>
+          <p:nvPr>
+            <p:ph type="ctrTitle"/>
+          </p:nvPr>
+        </p:nvSpPr>
+        <p:spPr>
+          <a:xfrm>
+            <a:off x="620110" y="603379"/>
+            <a:ext cx="2333297" cy="1614304"/>
+          </a:xfrm>
+        </p:spPr>
+        <p:txBody>
+          <a:bodyPr anchor="ctr">
+            <a:normAutofit/>
+          </a:bodyPr>
+          <a:lstStyle/>
+          <a:p>
+            <a:r>
               <a:rPr lang="sv-SE" sz="3200" b="1" dirty="0"/>
               <a:t>Andra metoder och sätt</a:t>
             </a:r>
@@ -4899,7 +5213,7 @@
 </p:sld>
 </file>
 
-<file path=ppt/slides/slide18.xml><?xml version="1.0" encoding="utf-8"?>
+<file path=ppt/slides/slide19.xml><?xml version="1.0" encoding="utf-8"?>
 <p:sld xmlns:a="http://schemas.openxmlformats.org/drawingml/2006/main" xmlns:r="http://schemas.openxmlformats.org/officeDocument/2006/relationships" xmlns:p="http://schemas.openxmlformats.org/presentationml/2006/main">
   <p:cSld>
     <p:spTree>
@@ -5207,20 +5521,37 @@
         </p:nvSpPr>
         <p:spPr>
           <a:xfrm>
-            <a:off x="832022" y="603379"/>
-            <a:ext cx="2121385" cy="1614304"/>
+            <a:off x="832021" y="603379"/>
+            <a:ext cx="2469601" cy="1614304"/>
           </a:xfrm>
         </p:spPr>
         <p:txBody>
           <a:bodyPr>
-            <a:normAutofit/>
+            <a:normAutofit fontScale="90000"/>
           </a:bodyPr>
           <a:lstStyle/>
           <a:p>
-            <a:r>
-              <a:rPr lang="sv-SE" sz="3600" b="1" dirty="0"/>
-              <a:t>Test driven design</a:t>
-            </a:r>
+            <a:pPr algn="l"/>
+            <a:r>
+              <a:rPr lang="sv-SE" sz="3600" b="1" dirty="0" smtClean="0"/>
+              <a:t>Test</a:t>
+            </a:r>
+            <a:br>
+              <a:rPr lang="sv-SE" sz="3600" b="1" dirty="0" smtClean="0"/>
+            </a:br>
+            <a:r>
+              <a:rPr lang="sv-SE" sz="3600" b="1" dirty="0" smtClean="0"/>
+              <a:t>Driven </a:t>
+            </a:r>
+            <a:r>
+              <a:rPr lang="sv-SE" sz="3600" b="1" dirty="0" err="1"/>
+              <a:t>D</a:t>
+            </a:r>
+            <a:r>
+              <a:rPr lang="sv-SE" sz="3600" b="1" dirty="0" err="1" smtClean="0"/>
+              <a:t>evelopment</a:t>
+            </a:r>
+            <a:endParaRPr lang="sv-SE" sz="3600" b="1" dirty="0"/>
           </a:p>
         </p:txBody>
       </p:sp>
@@ -5242,7 +5573,7 @@
         </p:nvSpPr>
         <p:spPr>
           <a:xfrm>
-            <a:off x="3175688" y="603379"/>
+            <a:off x="3301623" y="1599911"/>
             <a:ext cx="7492312" cy="4654421"/>
           </a:xfrm>
         </p:spPr>
@@ -5364,9 +5695,10 @@
           <a:lstStyle/>
           <a:p>
             <a:r>
-              <a:rPr lang="sv-SE" sz="3600" b="1" dirty="0"/>
-              <a:t>Varför?</a:t>
-            </a:r>
+              <a:rPr lang="sv-SE" sz="3600" b="1" dirty="0" smtClean="0"/>
+              <a:t>Varför TDD?</a:t>
+            </a:r>
+            <a:endParaRPr lang="sv-SE" sz="3600" b="1" dirty="0"/>
           </a:p>
         </p:txBody>
       </p:sp>
@@ -5388,7 +5720,7 @@
         </p:nvSpPr>
         <p:spPr>
           <a:xfrm>
-            <a:off x="3175688" y="603379"/>
+            <a:off x="3548019" y="1764174"/>
             <a:ext cx="7492312" cy="4654421"/>
           </a:xfrm>
         </p:spPr>
@@ -5442,8 +5774,13 @@
             </a:pPr>
             <a:r>
               <a:rPr lang="sv-SE" dirty="0"/>
-              <a:t>Små steg</a:t>
-            </a:r>
+              <a:t>Små </a:t>
+            </a:r>
+            <a:r>
+              <a:rPr lang="sv-SE" dirty="0" smtClean="0"/>
+              <a:t>steg</a:t>
+            </a:r>
+            <a:endParaRPr lang="sv-SE" dirty="0"/>
           </a:p>
           <a:p>
             <a:pPr marL="342900" indent="-342900" algn="l">
@@ -5513,13 +5850,10 @@
           <a:lstStyle/>
           <a:p>
             <a:r>
-              <a:rPr lang="sv-SE" sz="3600" b="1" dirty="0" err="1"/>
-              <a:t>Junit</a:t>
-            </a:r>
-            <a:r>
-              <a:rPr lang="sv-SE" sz="3600" b="1" dirty="0"/>
-              <a:t> – Ett exempel</a:t>
-            </a:r>
+              <a:rPr lang="sv-SE" sz="3600" b="1" dirty="0" smtClean="0"/>
+              <a:t>Lite bakgrund</a:t>
+            </a:r>
+            <a:endParaRPr lang="sv-SE" sz="3600" b="1" dirty="0"/>
           </a:p>
         </p:txBody>
       </p:sp>
@@ -5541,7 +5875,7 @@
         </p:nvSpPr>
         <p:spPr>
           <a:xfrm>
-            <a:off x="3175688" y="603379"/>
+            <a:off x="3548019" y="1764174"/>
             <a:ext cx="7492312" cy="4654421"/>
           </a:xfrm>
         </p:spPr>
@@ -5554,12 +5888,56 @@
               <a:buChar char="•"/>
             </a:pPr>
             <a:r>
-              <a:rPr lang="sv-SE" dirty="0"/>
-              <a:t>Se kodexempel</a:t>
-            </a:r>
-          </a:p>
-          <a:p>
-            <a:pPr algn="l"/>
+              <a:rPr lang="sv-SE" dirty="0" smtClean="0"/>
+              <a:t>Inte enbart test utan övergripande design- utveckling- och testprocess</a:t>
+            </a:r>
+            <a:endParaRPr lang="sv-SE" dirty="0"/>
+          </a:p>
+          <a:p>
+            <a:pPr marL="342900" indent="-342900" algn="l">
+              <a:buFont typeface="Arial" panose="020B0604020202020204" pitchFamily="34" charset="0"/>
+              <a:buChar char="•"/>
+            </a:pPr>
+            <a:r>
+              <a:rPr lang="sv-SE" dirty="0" smtClean="0"/>
+              <a:t>”Återupptäckt” </a:t>
+            </a:r>
+            <a:r>
+              <a:rPr lang="sv-SE" dirty="0" err="1" smtClean="0"/>
+              <a:t>iom</a:t>
+            </a:r>
+            <a:r>
+              <a:rPr lang="sv-SE" dirty="0" smtClean="0"/>
+              <a:t> XP och Kent Beck</a:t>
+            </a:r>
+          </a:p>
+          <a:p>
+            <a:pPr marL="342900" indent="-342900" algn="l">
+              <a:buFont typeface="Arial" panose="020B0604020202020204" pitchFamily="34" charset="0"/>
+              <a:buChar char="•"/>
+            </a:pPr>
+            <a:r>
+              <a:rPr lang="sv-SE" dirty="0" err="1" smtClean="0"/>
+              <a:t>Mainframes</a:t>
+            </a:r>
+            <a:r>
+              <a:rPr lang="sv-SE" dirty="0" smtClean="0"/>
+              <a:t>, tillgänglighet och hålkort</a:t>
+            </a:r>
+          </a:p>
+          <a:p>
+            <a:pPr marL="342900" indent="-342900" algn="l">
+              <a:buFont typeface="Arial" panose="020B0604020202020204" pitchFamily="34" charset="0"/>
+              <a:buChar char="•"/>
+            </a:pPr>
+            <a:r>
+              <a:rPr lang="sv-SE" dirty="0" err="1" smtClean="0"/>
+              <a:t>Agila</a:t>
+            </a:r>
+            <a:r>
+              <a:rPr lang="sv-SE" dirty="0" smtClean="0"/>
+              <a:t> manifestet </a:t>
+            </a:r>
             <a:endParaRPr lang="sv-SE" dirty="0"/>
           </a:p>
         </p:txBody>
@@ -5567,7 +5945,7 @@
     </p:spTree>
     <p:extLst>
       <p:ext uri="{BB962C8B-B14F-4D97-AF65-F5344CB8AC3E}">
-        <p14:creationId xmlns:p14="http://schemas.microsoft.com/office/powerpoint/2010/main" val="2296253940"/>
+        <p14:creationId xmlns:p14="http://schemas.microsoft.com/office/powerpoint/2010/main" val="979221185"/>
       </p:ext>
     </p:extLst>
   </p:cSld>
@@ -5613,7 +5991,7 @@
         <p:spPr>
           <a:xfrm>
             <a:off x="832022" y="603379"/>
-            <a:ext cx="4633357" cy="626331"/>
+            <a:ext cx="2121385" cy="1614304"/>
           </a:xfrm>
         </p:spPr>
         <p:txBody>
@@ -5623,8 +6001,16 @@
           <a:lstStyle/>
           <a:p>
             <a:r>
+              <a:rPr lang="sv-SE" sz="3600" b="1" dirty="0" err="1" smtClean="0"/>
+              <a:t>JUnit</a:t>
+            </a:r>
+            <a:r>
+              <a:rPr lang="sv-SE" sz="3600" b="1" dirty="0" smtClean="0"/>
+              <a:t> </a:t>
+            </a:r>
+            <a:r>
               <a:rPr lang="sv-SE" sz="3600" b="1" dirty="0"/>
-              <a:t>Mobbprogrammering</a:t>
+              <a:t>– Ett exempel</a:t>
             </a:r>
           </a:p>
         </p:txBody>
@@ -5647,62 +6033,341 @@
         </p:nvSpPr>
         <p:spPr>
           <a:xfrm>
-            <a:off x="3175688" y="2060028"/>
-            <a:ext cx="7492312" cy="3197772"/>
+            <a:off x="3175688" y="603379"/>
+            <a:ext cx="8536700" cy="5192303"/>
           </a:xfrm>
         </p:spPr>
         <p:txBody>
-          <a:bodyPr/>
-          <a:lstStyle/>
-          <a:p>
-            <a:pPr marL="342900" indent="-342900" algn="l">
-              <a:buFont typeface="Arial" panose="020B0604020202020204" pitchFamily="34" charset="0"/>
-              <a:buChar char="•"/>
-            </a:pPr>
-            <a:r>
-              <a:rPr lang="sv-SE" dirty="0"/>
-              <a:t>1 förare och många navigatörer</a:t>
-            </a:r>
-          </a:p>
-          <a:p>
-            <a:pPr marL="342900" indent="-342900" algn="l">
-              <a:buFont typeface="Arial" panose="020B0604020202020204" pitchFamily="34" charset="0"/>
-              <a:buChar char="•"/>
-            </a:pPr>
-            <a:r>
-              <a:rPr lang="sv-SE" dirty="0"/>
-              <a:t>Växlar förare ~10 minuter</a:t>
-            </a:r>
-          </a:p>
-          <a:p>
-            <a:pPr marL="342900" indent="-342900" algn="l">
-              <a:buFont typeface="Arial" panose="020B0604020202020204" pitchFamily="34" charset="0"/>
-              <a:buChar char="•"/>
-            </a:pPr>
-            <a:r>
-              <a:rPr lang="sv-SE" dirty="0"/>
-              <a:t>Man får säga pass</a:t>
-            </a:r>
-          </a:p>
-          <a:p>
-            <a:pPr marL="342900" indent="-342900" algn="l">
-              <a:buFont typeface="Arial" panose="020B0604020202020204" pitchFamily="34" charset="0"/>
-              <a:buChar char="•"/>
-            </a:pPr>
-            <a:r>
-              <a:rPr lang="sv-SE" dirty="0"/>
-              <a:t>Man får gå ut och ta pass</a:t>
-            </a:r>
-          </a:p>
-          <a:p>
-            <a:pPr marL="342900" indent="-342900" algn="l">
-              <a:buFont typeface="Arial" panose="020B0604020202020204" pitchFamily="34" charset="0"/>
-              <a:buChar char="•"/>
-            </a:pPr>
-            <a:r>
-              <a:rPr lang="sv-SE" dirty="0"/>
-              <a:t>Kom ihåg turtagande och paus</a:t>
-            </a:r>
+          <a:bodyPr>
+            <a:normAutofit/>
+          </a:bodyPr>
+          <a:lstStyle/>
+          <a:p>
+            <a:pPr algn="l"/>
+            <a:r>
+              <a:rPr lang="en-US" sz="1800" dirty="0"/>
+              <a:t> @</a:t>
+            </a:r>
+            <a:r>
+              <a:rPr lang="en-US" sz="1800" dirty="0">
+                <a:solidFill>
+                  <a:schemeClr val="accent6">
+                    <a:lumMod val="75000"/>
+                  </a:schemeClr>
+                </a:solidFill>
+              </a:rPr>
+              <a:t>Test</a:t>
+            </a:r>
+          </a:p>
+          <a:p>
+            <a:pPr algn="l"/>
+            <a:r>
+              <a:rPr lang="en-US" sz="1800" dirty="0"/>
+              <a:t>    </a:t>
+            </a:r>
+            <a:r>
+              <a:rPr lang="en-US" sz="1800" dirty="0">
+                <a:solidFill>
+                  <a:schemeClr val="accent5">
+                    <a:lumMod val="75000"/>
+                  </a:schemeClr>
+                </a:solidFill>
+              </a:rPr>
+              <a:t>public</a:t>
+            </a:r>
+            <a:r>
+              <a:rPr lang="en-US" sz="1800" dirty="0"/>
+              <a:t> </a:t>
+            </a:r>
+            <a:r>
+              <a:rPr lang="en-US" sz="1800" dirty="0">
+                <a:solidFill>
+                  <a:schemeClr val="accent6">
+                    <a:lumMod val="75000"/>
+                  </a:schemeClr>
+                </a:solidFill>
+              </a:rPr>
+              <a:t>void</a:t>
+            </a:r>
+            <a:r>
+              <a:rPr lang="en-US" sz="1800" dirty="0"/>
+              <a:t> </a:t>
+            </a:r>
+            <a:r>
+              <a:rPr lang="en-US" sz="1800" dirty="0" err="1">
+                <a:solidFill>
+                  <a:schemeClr val="accent4">
+                    <a:lumMod val="60000"/>
+                    <a:lumOff val="40000"/>
+                  </a:schemeClr>
+                </a:solidFill>
+              </a:rPr>
+              <a:t>can_convert_to_lower_case</a:t>
+            </a:r>
+            <a:r>
+              <a:rPr lang="en-US" sz="1800" dirty="0"/>
+              <a:t>() {</a:t>
+            </a:r>
+          </a:p>
+          <a:p>
+            <a:pPr algn="l"/>
+            <a:r>
+              <a:rPr lang="en-US" sz="1800" dirty="0"/>
+              <a:t>        // given</a:t>
+            </a:r>
+          </a:p>
+          <a:p>
+            <a:pPr algn="l"/>
+            <a:r>
+              <a:rPr lang="en-US" sz="1800" dirty="0"/>
+              <a:t>        </a:t>
+            </a:r>
+            <a:r>
+              <a:rPr lang="en-US" sz="1800" dirty="0">
+                <a:solidFill>
+                  <a:schemeClr val="accent5">
+                    <a:lumMod val="75000"/>
+                  </a:schemeClr>
+                </a:solidFill>
+              </a:rPr>
+              <a:t>final</a:t>
+            </a:r>
+            <a:r>
+              <a:rPr lang="en-US" sz="1800" dirty="0"/>
+              <a:t> </a:t>
+            </a:r>
+            <a:r>
+              <a:rPr lang="en-US" sz="1800" dirty="0">
+                <a:solidFill>
+                  <a:schemeClr val="accent6">
+                    <a:lumMod val="75000"/>
+                  </a:schemeClr>
+                </a:solidFill>
+              </a:rPr>
+              <a:t>Collection&lt;String&gt;</a:t>
+            </a:r>
+            <a:r>
+              <a:rPr lang="en-US" sz="1800" dirty="0"/>
+              <a:t> </a:t>
+            </a:r>
+            <a:r>
+              <a:rPr lang="en-US" sz="1800" dirty="0">
+                <a:solidFill>
+                  <a:schemeClr val="accent1">
+                    <a:lumMod val="60000"/>
+                    <a:lumOff val="40000"/>
+                  </a:schemeClr>
+                </a:solidFill>
+              </a:rPr>
+              <a:t>strings</a:t>
+            </a:r>
+            <a:r>
+              <a:rPr lang="en-US" sz="1800" dirty="0"/>
+              <a:t> = </a:t>
+            </a:r>
+            <a:r>
+              <a:rPr lang="en-US" sz="1800" dirty="0" err="1">
+                <a:solidFill>
+                  <a:schemeClr val="accent1">
+                    <a:lumMod val="60000"/>
+                    <a:lumOff val="40000"/>
+                  </a:schemeClr>
+                </a:solidFill>
+              </a:rPr>
+              <a:t>Collections</a:t>
+            </a:r>
+            <a:r>
+              <a:rPr lang="en-US" sz="1800" dirty="0" err="1"/>
+              <a:t>.</a:t>
+            </a:r>
+            <a:r>
+              <a:rPr lang="en-US" sz="1800" dirty="0" err="1">
+                <a:solidFill>
+                  <a:schemeClr val="accent4">
+                    <a:lumMod val="60000"/>
+                    <a:lumOff val="40000"/>
+                  </a:schemeClr>
+                </a:solidFill>
+              </a:rPr>
+              <a:t>singletonList</a:t>
+            </a:r>
+            <a:r>
+              <a:rPr lang="en-US" sz="1800" dirty="0"/>
+              <a:t>("HEJ");</a:t>
+            </a:r>
+          </a:p>
+          <a:p>
+            <a:pPr algn="l"/>
+            <a:r>
+              <a:rPr lang="en-US" sz="1800" dirty="0"/>
+              <a:t/>
+            </a:r>
+            <a:br>
+              <a:rPr lang="en-US" sz="1800" dirty="0"/>
+            </a:br>
+            <a:r>
+              <a:rPr lang="en-US" sz="1800" dirty="0"/>
+              <a:t>        // when</a:t>
+            </a:r>
+          </a:p>
+          <a:p>
+            <a:pPr algn="l"/>
+            <a:r>
+              <a:rPr lang="en-US" sz="1800" dirty="0"/>
+              <a:t>        </a:t>
+            </a:r>
+            <a:r>
+              <a:rPr lang="en-US" sz="1800" dirty="0">
+                <a:solidFill>
+                  <a:schemeClr val="accent5">
+                    <a:lumMod val="75000"/>
+                  </a:schemeClr>
+                </a:solidFill>
+              </a:rPr>
+              <a:t>final</a:t>
+            </a:r>
+            <a:r>
+              <a:rPr lang="en-US" sz="1800" dirty="0"/>
+              <a:t> </a:t>
+            </a:r>
+            <a:r>
+              <a:rPr lang="en-US" sz="1800" dirty="0">
+                <a:solidFill>
+                  <a:schemeClr val="accent6">
+                    <a:lumMod val="75000"/>
+                  </a:schemeClr>
+                </a:solidFill>
+              </a:rPr>
+              <a:t>Collection&lt;String&gt;</a:t>
+            </a:r>
+            <a:r>
+              <a:rPr lang="en-US" sz="1800" dirty="0"/>
+              <a:t> </a:t>
+            </a:r>
+            <a:r>
+              <a:rPr lang="en-US" sz="1800" dirty="0" err="1">
+                <a:solidFill>
+                  <a:schemeClr val="accent1">
+                    <a:lumMod val="60000"/>
+                    <a:lumOff val="40000"/>
+                  </a:schemeClr>
+                </a:solidFill>
+              </a:rPr>
+              <a:t>lowercaselist</a:t>
+            </a:r>
+            <a:r>
+              <a:rPr lang="en-US" sz="1800" dirty="0"/>
+              <a:t> = </a:t>
+            </a:r>
+            <a:r>
+              <a:rPr lang="en-US" sz="1800" dirty="0" err="1">
+                <a:solidFill>
+                  <a:schemeClr val="accent1">
+                    <a:lumMod val="60000"/>
+                    <a:lumOff val="40000"/>
+                  </a:schemeClr>
+                </a:solidFill>
+              </a:rPr>
+              <a:t>lowerCaseConverter</a:t>
+            </a:r>
+            <a:r>
+              <a:rPr lang="en-US" sz="1800" dirty="0" err="1"/>
+              <a:t>.</a:t>
+            </a:r>
+            <a:r>
+              <a:rPr lang="en-US" sz="1800" dirty="0" err="1">
+                <a:solidFill>
+                  <a:schemeClr val="accent4">
+                    <a:lumMod val="60000"/>
+                    <a:lumOff val="40000"/>
+                  </a:schemeClr>
+                </a:solidFill>
+              </a:rPr>
+              <a:t>toLowerCase</a:t>
+            </a:r>
+            <a:r>
+              <a:rPr lang="en-US" sz="1800" dirty="0"/>
+              <a:t>(strings);</a:t>
+            </a:r>
+          </a:p>
+          <a:p>
+            <a:pPr algn="l"/>
+            <a:r>
+              <a:rPr lang="en-US" sz="1800" dirty="0"/>
+              <a:t/>
+            </a:r>
+            <a:br>
+              <a:rPr lang="en-US" sz="1800" dirty="0"/>
+            </a:br>
+            <a:r>
+              <a:rPr lang="en-US" sz="1800" dirty="0"/>
+              <a:t>        // then</a:t>
+            </a:r>
+          </a:p>
+          <a:p>
+            <a:pPr algn="l"/>
+            <a:r>
+              <a:rPr lang="en-US" sz="1800" dirty="0"/>
+              <a:t>        </a:t>
+            </a:r>
+            <a:r>
+              <a:rPr lang="en-US" sz="1800" dirty="0" err="1">
+                <a:solidFill>
+                  <a:schemeClr val="accent4">
+                    <a:lumMod val="60000"/>
+                    <a:lumOff val="40000"/>
+                  </a:schemeClr>
+                </a:solidFill>
+              </a:rPr>
+              <a:t>assertThat</a:t>
+            </a:r>
+            <a:r>
+              <a:rPr lang="en-US" sz="1800" dirty="0"/>
+              <a:t>(</a:t>
+            </a:r>
+            <a:r>
+              <a:rPr lang="en-US" sz="1800" dirty="0" err="1"/>
+              <a:t>lowercaselist</a:t>
+            </a:r>
+            <a:r>
+              <a:rPr lang="en-US" sz="1800" dirty="0"/>
+              <a:t>).</a:t>
+            </a:r>
+            <a:r>
+              <a:rPr lang="en-US" sz="1800" dirty="0" err="1">
+                <a:solidFill>
+                  <a:schemeClr val="accent4">
+                    <a:lumMod val="60000"/>
+                    <a:lumOff val="40000"/>
+                  </a:schemeClr>
+                </a:solidFill>
+              </a:rPr>
+              <a:t>containsExactly</a:t>
+            </a:r>
+            <a:r>
+              <a:rPr lang="en-US" sz="1800" dirty="0"/>
+              <a:t>("</a:t>
+            </a:r>
+            <a:r>
+              <a:rPr lang="en-US" sz="1800" dirty="0" err="1"/>
+              <a:t>hej</a:t>
+            </a:r>
+            <a:r>
+              <a:rPr lang="en-US" sz="1800" dirty="0" smtClean="0"/>
+              <a:t>");</a:t>
+            </a:r>
+          </a:p>
+          <a:p>
+            <a:pPr algn="l"/>
+            <a:r>
+              <a:rPr lang="en-US" sz="1800" dirty="0"/>
+              <a:t> </a:t>
+            </a:r>
+            <a:r>
+              <a:rPr lang="en-US" sz="1800" dirty="0" smtClean="0"/>
+              <a:t>    }</a:t>
+            </a:r>
+            <a:endParaRPr lang="en-US" sz="1800" dirty="0"/>
           </a:p>
           <a:p>
             <a:pPr algn="l"/>
@@ -5713,7 +6378,7 @@
     </p:spTree>
     <p:extLst>
       <p:ext uri="{BB962C8B-B14F-4D97-AF65-F5344CB8AC3E}">
-        <p14:creationId xmlns:p14="http://schemas.microsoft.com/office/powerpoint/2010/main" val="116014750"/>
+        <p14:creationId xmlns:p14="http://schemas.microsoft.com/office/powerpoint/2010/main" val="2296253940"/>
       </p:ext>
     </p:extLst>
   </p:cSld>
@@ -5801,18 +6466,65 @@
           <a:bodyPr/>
           <a:lstStyle/>
           <a:p>
+            <a:pPr marL="342900" indent="-342900" algn="l">
+              <a:buFont typeface="Arial" panose="020B0604020202020204" pitchFamily="34" charset="0"/>
+              <a:buChar char="•"/>
+            </a:pPr>
+            <a:r>
+              <a:rPr lang="sv-SE" dirty="0"/>
+              <a:t>1 förare och många navigatörer</a:t>
+            </a:r>
+          </a:p>
+          <a:p>
+            <a:pPr marL="342900" indent="-342900" algn="l">
+              <a:buFont typeface="Arial" panose="020B0604020202020204" pitchFamily="34" charset="0"/>
+              <a:buChar char="•"/>
+            </a:pPr>
+            <a:r>
+              <a:rPr lang="sv-SE" dirty="0"/>
+              <a:t>Växlar förare ~10 minuter</a:t>
+            </a:r>
+          </a:p>
+          <a:p>
+            <a:pPr marL="342900" indent="-342900" algn="l">
+              <a:buFont typeface="Arial" panose="020B0604020202020204" pitchFamily="34" charset="0"/>
+              <a:buChar char="•"/>
+            </a:pPr>
+            <a:r>
+              <a:rPr lang="sv-SE" dirty="0"/>
+              <a:t>Man får säga pass</a:t>
+            </a:r>
+          </a:p>
+          <a:p>
+            <a:pPr marL="342900" indent="-342900" algn="l">
+              <a:buFont typeface="Arial" panose="020B0604020202020204" pitchFamily="34" charset="0"/>
+              <a:buChar char="•"/>
+            </a:pPr>
+            <a:r>
+              <a:rPr lang="sv-SE" dirty="0"/>
+              <a:t>Man får gå ut och ta pass</a:t>
+            </a:r>
+          </a:p>
+          <a:p>
+            <a:pPr marL="342900" indent="-342900" algn="l">
+              <a:buFont typeface="Arial" panose="020B0604020202020204" pitchFamily="34" charset="0"/>
+              <a:buChar char="•"/>
+            </a:pPr>
+            <a:r>
+              <a:rPr lang="sv-SE" dirty="0"/>
+              <a:t>Kom ihåg turtagande och paus</a:t>
+            </a:r>
+          </a:p>
+          <a:p>
             <a:pPr algn="l"/>
-            <a:r>
-              <a:rPr lang="sv-SE" dirty="0"/>
-              <a:t>Så låt oss prova…</a:t>
-            </a:r>
+            <a:endParaRPr lang="sv-SE" dirty="0"/>
           </a:p>
         </p:txBody>
       </p:sp>
     </p:spTree>
     <p:extLst>
       <p:ext uri="{BB962C8B-B14F-4D97-AF65-F5344CB8AC3E}">
-        <p14:creationId xmlns:p14="http://schemas.microsoft.com/office/powerpoint/2010/main" val="938975316"/>
+        <p14:creationId xmlns:p14="http://schemas.microsoft.com/office/powerpoint/2010/main" val="116014750"/>
       </p:ext>
     </p:extLst>
   </p:cSld>
@@ -5867,10 +6579,9 @@
           </a:bodyPr>
           <a:lstStyle/>
           <a:p>
-            <a:pPr algn="l"/>
             <a:r>
               <a:rPr lang="sv-SE" sz="3600" b="1" dirty="0"/>
-              <a:t>Del 2</a:t>
+              <a:t>Mobbprogrammering</a:t>
             </a:r>
           </a:p>
         </p:txBody>
@@ -5904,7 +6615,7 @@
             <a:pPr algn="l"/>
             <a:r>
               <a:rPr lang="sv-SE" dirty="0"/>
-              <a:t>Verktyg och principer för att underlätta testning</a:t>
+              <a:t>Så låt oss prova…</a:t>
             </a:r>
           </a:p>
         </p:txBody>
@@ -5912,7 +6623,7 @@
     </p:spTree>
     <p:extLst>
       <p:ext uri="{BB962C8B-B14F-4D97-AF65-F5344CB8AC3E}">
-        <p14:creationId xmlns:p14="http://schemas.microsoft.com/office/powerpoint/2010/main" val="2113114059"/>
+        <p14:creationId xmlns:p14="http://schemas.microsoft.com/office/powerpoint/2010/main" val="938975316"/>
       </p:ext>
     </p:extLst>
   </p:cSld>
@@ -5970,7 +6681,7 @@
             <a:pPr algn="l"/>
             <a:r>
               <a:rPr lang="sv-SE" sz="3600" b="1" dirty="0"/>
-              <a:t>Verktyg</a:t>
+              <a:t>Del 2</a:t>
             </a:r>
           </a:p>
         </p:txBody>
@@ -6001,59 +6712,18 @@
           <a:bodyPr/>
           <a:lstStyle/>
           <a:p>
-            <a:pPr marL="342900" indent="-342900" algn="l">
-              <a:buFont typeface="Arial" panose="020B0604020202020204" pitchFamily="34" charset="0"/>
-              <a:buChar char="•"/>
-            </a:pPr>
-            <a:r>
-              <a:rPr lang="sv-SE" dirty="0" err="1"/>
-              <a:t>Testkörare</a:t>
-            </a:r>
-            <a:endParaRPr lang="sv-SE" dirty="0"/>
-          </a:p>
-          <a:p>
-            <a:pPr marL="342900" indent="-342900" algn="l">
-              <a:buFont typeface="Arial" panose="020B0604020202020204" pitchFamily="34" charset="0"/>
-              <a:buChar char="•"/>
-            </a:pPr>
-            <a:r>
-              <a:rPr lang="sv-SE" dirty="0"/>
-              <a:t>Förväntningar/matchningar – </a:t>
-            </a:r>
-            <a:r>
-              <a:rPr lang="sv-SE" dirty="0" err="1"/>
-              <a:t>Assertions</a:t>
-            </a:r>
-            <a:endParaRPr lang="sv-SE" dirty="0"/>
-          </a:p>
-          <a:p>
-            <a:pPr marL="342900" indent="-342900" algn="l">
-              <a:buFont typeface="Arial" panose="020B0604020202020204" pitchFamily="34" charset="0"/>
-              <a:buChar char="•"/>
-            </a:pPr>
-            <a:r>
-              <a:rPr lang="sv-SE" dirty="0"/>
-              <a:t>Attrapper - </a:t>
-            </a:r>
-            <a:r>
-              <a:rPr lang="sv-SE" dirty="0" err="1"/>
-              <a:t>Mock</a:t>
-            </a:r>
-            <a:endParaRPr lang="sv-SE" dirty="0"/>
-          </a:p>
-          <a:p>
-            <a:pPr marL="342900" indent="-342900" algn="l">
-              <a:buFont typeface="Arial" panose="020B0604020202020204" pitchFamily="34" charset="0"/>
-              <a:buChar char="•"/>
-            </a:pPr>
-            <a:endParaRPr lang="sv-SE" dirty="0"/>
+            <a:pPr algn="l"/>
+            <a:r>
+              <a:rPr lang="sv-SE" dirty="0"/>
+              <a:t>Verktyg och principer för att underlätta testning</a:t>
+            </a:r>
           </a:p>
         </p:txBody>
       </p:sp>
     </p:spTree>
     <p:extLst>
       <p:ext uri="{BB962C8B-B14F-4D97-AF65-F5344CB8AC3E}">
-        <p14:creationId xmlns:p14="http://schemas.microsoft.com/office/powerpoint/2010/main" val="1835554135"/>
+        <p14:creationId xmlns:p14="http://schemas.microsoft.com/office/powerpoint/2010/main" val="2113114059"/>
       </p:ext>
     </p:extLst>
   </p:cSld>
@@ -6111,7 +6781,7 @@
             <a:pPr algn="l"/>
             <a:r>
               <a:rPr lang="sv-SE" sz="3600" b="1" dirty="0"/>
-              <a:t>Verktyg – Java</a:t>
+              <a:t>Verktyg</a:t>
             </a:r>
           </a:p>
         </p:txBody>
@@ -6134,14 +6804,12 @@
         </p:nvSpPr>
         <p:spPr>
           <a:xfrm>
-            <a:off x="3175688" y="2060027"/>
-            <a:ext cx="7492312" cy="4194594"/>
+            <a:off x="3175688" y="2060028"/>
+            <a:ext cx="7492312" cy="3197772"/>
           </a:xfrm>
         </p:spPr>
         <p:txBody>
-          <a:bodyPr>
-            <a:normAutofit fontScale="85000" lnSpcReduction="20000"/>
-          </a:bodyPr>
+          <a:bodyPr/>
           <a:lstStyle/>
           <a:p>
             <a:pPr marL="342900" indent="-342900" algn="l">
@@ -6155,93 +6823,14 @@
             <a:endParaRPr lang="sv-SE" dirty="0"/>
           </a:p>
           <a:p>
-            <a:pPr marL="800100" lvl="1" indent="-342900" algn="l">
-              <a:buFont typeface="Arial" panose="020B0604020202020204" pitchFamily="34" charset="0"/>
-              <a:buChar char="•"/>
-            </a:pPr>
-            <a:r>
-              <a:rPr lang="sv-SE" dirty="0" err="1"/>
-              <a:t>JUnit</a:t>
-            </a:r>
-            <a:endParaRPr lang="sv-SE" dirty="0"/>
-          </a:p>
-          <a:p>
-            <a:pPr marL="800100" lvl="1" indent="-342900" algn="l">
-              <a:buFont typeface="Arial" panose="020B0604020202020204" pitchFamily="34" charset="0"/>
-              <a:buChar char="•"/>
-            </a:pPr>
-            <a:r>
-              <a:rPr lang="sv-SE" dirty="0" err="1"/>
-              <a:t>TestNG</a:t>
-            </a:r>
-            <a:endParaRPr lang="sv-SE" dirty="0"/>
-          </a:p>
-          <a:p>
-            <a:pPr marL="800100" lvl="1" indent="-342900" algn="l">
-              <a:buFont typeface="Arial" panose="020B0604020202020204" pitchFamily="34" charset="0"/>
-              <a:buChar char="•"/>
-            </a:pPr>
-            <a:r>
-              <a:rPr lang="sv-SE" dirty="0" err="1"/>
-              <a:t>Spek</a:t>
-            </a:r>
-            <a:r>
-              <a:rPr lang="sv-SE" dirty="0"/>
-              <a:t> (</a:t>
-            </a:r>
-            <a:r>
-              <a:rPr lang="sv-SE" dirty="0" err="1"/>
-              <a:t>Kotlin</a:t>
-            </a:r>
-            <a:r>
-              <a:rPr lang="sv-SE" dirty="0"/>
-              <a:t>)</a:t>
-            </a:r>
-          </a:p>
-          <a:p>
-            <a:pPr marL="800100" lvl="1" indent="-342900" algn="l">
-              <a:buFont typeface="Arial" panose="020B0604020202020204" pitchFamily="34" charset="0"/>
-              <a:buChar char="•"/>
-            </a:pPr>
-            <a:r>
-              <a:rPr lang="sv-SE" dirty="0"/>
-              <a:t>Spock (</a:t>
-            </a:r>
-            <a:r>
-              <a:rPr lang="sv-SE" dirty="0" err="1"/>
-              <a:t>Groovy</a:t>
-            </a:r>
-            <a:r>
-              <a:rPr lang="sv-SE" dirty="0"/>
-              <a:t>)</a:t>
-            </a:r>
-          </a:p>
-          <a:p>
-            <a:pPr marL="800100" lvl="1" indent="-342900" algn="l">
-              <a:buFont typeface="Arial" panose="020B0604020202020204" pitchFamily="34" charset="0"/>
-              <a:buChar char="•"/>
-            </a:pPr>
-            <a:r>
-              <a:rPr lang="sv-SE" dirty="0" err="1"/>
-              <a:t>Cucumber</a:t>
-            </a:r>
-            <a:endParaRPr lang="sv-SE" dirty="0"/>
-          </a:p>
-          <a:p>
-            <a:pPr marL="800100" lvl="1" indent="-342900" algn="l">
-              <a:buFont typeface="Arial" panose="020B0604020202020204" pitchFamily="34" charset="0"/>
-              <a:buChar char="•"/>
-            </a:pPr>
-            <a:r>
-              <a:rPr lang="sv-SE" dirty="0"/>
-              <a:t>Scalatest (Scala)</a:t>
-            </a:r>
-          </a:p>
-          <a:p>
             <a:pPr marL="342900" indent="-342900" algn="l">
               <a:buFont typeface="Arial" panose="020B0604020202020204" pitchFamily="34" charset="0"/>
               <a:buChar char="•"/>
             </a:pPr>
+            <a:r>
+              <a:rPr lang="sv-SE" dirty="0"/>
+              <a:t>Förväntningar/matchningar – </a:t>
+            </a:r>
             <a:r>
               <a:rPr lang="sv-SE" dirty="0" err="1"/>
               <a:t>Assertions</a:t>
@@ -6249,91 +6838,18 @@
             <a:endParaRPr lang="sv-SE" dirty="0"/>
           </a:p>
           <a:p>
-            <a:pPr marL="800100" lvl="1" indent="-342900" algn="l">
-              <a:buFont typeface="Arial" panose="020B0604020202020204" pitchFamily="34" charset="0"/>
-              <a:buChar char="•"/>
-            </a:pPr>
-            <a:r>
-              <a:rPr lang="sv-SE" dirty="0" err="1"/>
-              <a:t>AssertJ</a:t>
-            </a:r>
-            <a:endParaRPr lang="sv-SE" dirty="0"/>
-          </a:p>
-          <a:p>
-            <a:pPr marL="800100" lvl="1" indent="-342900" algn="l">
-              <a:buFont typeface="Arial" panose="020B0604020202020204" pitchFamily="34" charset="0"/>
-              <a:buChar char="•"/>
-            </a:pPr>
-            <a:r>
-              <a:rPr lang="sv-SE" dirty="0" err="1"/>
-              <a:t>Hamcrest</a:t>
-            </a:r>
-            <a:endParaRPr lang="sv-SE" dirty="0"/>
-          </a:p>
-          <a:p>
-            <a:pPr marL="800100" lvl="1" indent="-342900" algn="l">
-              <a:buFont typeface="Arial" panose="020B0604020202020204" pitchFamily="34" charset="0"/>
-              <a:buChar char="•"/>
-            </a:pPr>
-            <a:r>
-              <a:rPr lang="sv-SE" dirty="0" err="1"/>
-              <a:t>JUnit</a:t>
-            </a:r>
-            <a:endParaRPr lang="sv-SE" dirty="0"/>
-          </a:p>
-          <a:p>
             <a:pPr marL="342900" indent="-342900" algn="l">
               <a:buFont typeface="Arial" panose="020B0604020202020204" pitchFamily="34" charset="0"/>
               <a:buChar char="•"/>
             </a:pPr>
+            <a:r>
+              <a:rPr lang="sv-SE" dirty="0"/>
+              <a:t>Attrapper - </a:t>
+            </a:r>
             <a:r>
               <a:rPr lang="sv-SE" dirty="0" err="1"/>
               <a:t>Mock</a:t>
             </a:r>
-            <a:endParaRPr lang="sv-SE" dirty="0"/>
-          </a:p>
-          <a:p>
-            <a:pPr marL="800100" lvl="1" indent="-342900" algn="l">
-              <a:buFont typeface="Arial" panose="020B0604020202020204" pitchFamily="34" charset="0"/>
-              <a:buChar char="•"/>
-            </a:pPr>
-            <a:r>
-              <a:rPr lang="sv-SE" dirty="0" err="1"/>
-              <a:t>Mockito</a:t>
-            </a:r>
-            <a:endParaRPr lang="sv-SE" dirty="0"/>
-          </a:p>
-          <a:p>
-            <a:pPr marL="800100" lvl="1" indent="-342900" algn="l">
-              <a:buFont typeface="Arial" panose="020B0604020202020204" pitchFamily="34" charset="0"/>
-              <a:buChar char="•"/>
-            </a:pPr>
-            <a:r>
-              <a:rPr lang="sv-SE" dirty="0" err="1"/>
-              <a:t>Easymock</a:t>
-            </a:r>
-            <a:endParaRPr lang="sv-SE" dirty="0"/>
-          </a:p>
-          <a:p>
-            <a:pPr marL="800100" lvl="1" indent="-342900" algn="l">
-              <a:buFont typeface="Arial" panose="020B0604020202020204" pitchFamily="34" charset="0"/>
-              <a:buChar char="•"/>
-            </a:pPr>
-            <a:r>
-              <a:rPr lang="sv-SE" dirty="0" err="1"/>
-              <a:t>Powermock</a:t>
-            </a:r>
-            <a:endParaRPr lang="sv-SE" dirty="0"/>
-          </a:p>
-          <a:p>
-            <a:pPr marL="800100" lvl="1" indent="-342900" algn="l">
-              <a:buFont typeface="Arial" panose="020B0604020202020204" pitchFamily="34" charset="0"/>
-              <a:buChar char="•"/>
-            </a:pPr>
-            <a:endParaRPr lang="sv-SE" dirty="0"/>
-          </a:p>
-          <a:p>
-            <a:pPr algn="l"/>
             <a:endParaRPr lang="sv-SE" dirty="0"/>
           </a:p>
           <a:p>
@@ -6348,7 +6864,7 @@
     </p:spTree>
     <p:extLst>
       <p:ext uri="{BB962C8B-B14F-4D97-AF65-F5344CB8AC3E}">
-        <p14:creationId xmlns:p14="http://schemas.microsoft.com/office/powerpoint/2010/main" val="295322603"/>
+        <p14:creationId xmlns:p14="http://schemas.microsoft.com/office/powerpoint/2010/main" val="1835554135"/>
       </p:ext>
     </p:extLst>
   </p:cSld>

</xml_diff>

<commit_message>
Länk till blog av Kevlin Henney
</commit_message>
<xml_diff>
--- a/TDD-Presentation.pptx
+++ b/TDD-Presentation.pptx
@@ -5281,15 +5281,7 @@
             </a:pPr>
             <a:r>
               <a:rPr lang="sv-SE" dirty="0"/>
-              <a:t>Video: </a:t>
-            </a:r>
-            <a:r>
-              <a:rPr lang="sv-SE" dirty="0" err="1"/>
-              <a:t>tifrån</a:t>
-            </a:r>
-            <a:r>
-              <a:rPr lang="sv-SE" dirty="0"/>
-              <a:t> och in - TDD för bättre design och tidigare feedback – Thomas </a:t>
+              <a:t>Video: utifrån och in - TDD för bättre design och tidigare feedback – Thomas </a:t>
             </a:r>
             <a:r>
               <a:rPr lang="sv-SE" dirty="0" err="1"/>
@@ -5428,6 +5420,74 @@
               </a:rPr>
               <a:t>http://www.adlibris.com/se/bok/growing-object-oriented-software-guided-by-tests-9780321503626</a:t>
             </a:r>
+            <a:endParaRPr lang="sv-SE" dirty="0"/>
+          </a:p>
+          <a:p>
+            <a:pPr marL="342900" indent="-342900" algn="l">
+              <a:buFont typeface="Arial" panose="020B0604020202020204" pitchFamily="34" charset="0"/>
+              <a:buChar char="•"/>
+            </a:pPr>
+            <a:r>
+              <a:rPr lang="sv-SE" dirty="0" err="1"/>
+              <a:t>Blog</a:t>
+            </a:r>
+            <a:r>
+              <a:rPr lang="sv-SE" dirty="0"/>
+              <a:t>: Driving on the right </a:t>
+            </a:r>
+            <a:r>
+              <a:rPr lang="sv-SE" dirty="0" err="1"/>
+              <a:t>side</a:t>
+            </a:r>
+            <a:r>
+              <a:rPr lang="sv-SE" dirty="0"/>
+              <a:t> </a:t>
+            </a:r>
+            <a:r>
+              <a:rPr lang="sv-SE" dirty="0" err="1"/>
+              <a:t>of</a:t>
+            </a:r>
+            <a:r>
+              <a:rPr lang="sv-SE" dirty="0"/>
+              <a:t> </a:t>
+            </a:r>
+            <a:r>
+              <a:rPr lang="sv-SE" dirty="0" err="1"/>
+              <a:t>code</a:t>
+            </a:r>
+            <a:r>
+              <a:rPr lang="sv-SE" dirty="0"/>
+              <a:t> – </a:t>
+            </a:r>
+            <a:r>
+              <a:rPr lang="sv-SE" dirty="0" err="1"/>
+              <a:t>Kevlin</a:t>
+            </a:r>
+            <a:r>
+              <a:rPr lang="sv-SE" dirty="0"/>
+              <a:t> </a:t>
+            </a:r>
+            <a:r>
+              <a:rPr lang="sv-SE" dirty="0" err="1"/>
+              <a:t>Henney</a:t>
+            </a:r>
+            <a:r>
+              <a:rPr lang="sv-SE" dirty="0"/>
+              <a:t> </a:t>
+            </a:r>
+            <a:r>
+              <a:rPr lang="sv-SE" dirty="0">
+                <a:hlinkClick r:id="rId6"/>
+              </a:rPr>
+              <a:t>https://www.theregister.com/2007/03/09/test_driven_development/</a:t>
+            </a:r>
+            <a:endParaRPr lang="sv-SE" dirty="0"/>
+          </a:p>
+          <a:p>
+            <a:pPr marL="342900" indent="-342900" algn="l">
+              <a:buFont typeface="Arial" panose="020B0604020202020204" pitchFamily="34" charset="0"/>
+              <a:buChar char="•"/>
+            </a:pPr>
             <a:endParaRPr lang="sv-SE" dirty="0"/>
           </a:p>
           <a:p>

</xml_diff>

<commit_message>
updated presentation for last section
</commit_message>
<xml_diff>
--- a/TDD-Presentation.pptx
+++ b/TDD-Presentation.pptx
@@ -130,6 +130,2644 @@
 </p:presentation>
 </file>
 
+<file path=ppt/diagrams/colors1.xml><?xml version="1.0" encoding="utf-8"?>
+<dgm:colorsDef xmlns:dgm="http://schemas.openxmlformats.org/drawingml/2006/diagram" xmlns:a="http://schemas.openxmlformats.org/drawingml/2006/main" uniqueId="urn:microsoft.com/office/officeart/2005/8/colors/accent3_5">
+  <dgm:title val=""/>
+  <dgm:desc val=""/>
+  <dgm:catLst>
+    <dgm:cat type="accent3" pri="11500"/>
+  </dgm:catLst>
+  <dgm:styleLbl name="node0">
+    <dgm:fillClrLst meth="cycle">
+      <a:schemeClr val="accent3">
+        <a:alpha val="80000"/>
+      </a:schemeClr>
+    </dgm:fillClrLst>
+    <dgm:linClrLst meth="repeat">
+      <a:schemeClr val="lt1"/>
+    </dgm:linClrLst>
+    <dgm:effectClrLst/>
+    <dgm:txLinClrLst/>
+    <dgm:txFillClrLst/>
+    <dgm:txEffectClrLst/>
+  </dgm:styleLbl>
+  <dgm:styleLbl name="node1">
+    <dgm:fillClrLst>
+      <a:schemeClr val="accent3">
+        <a:alpha val="90000"/>
+      </a:schemeClr>
+      <a:schemeClr val="accent3">
+        <a:alpha val="50000"/>
+      </a:schemeClr>
+    </dgm:fillClrLst>
+    <dgm:linClrLst meth="repeat">
+      <a:schemeClr val="lt1"/>
+    </dgm:linClrLst>
+    <dgm:effectClrLst/>
+    <dgm:txLinClrLst/>
+    <dgm:txFillClrLst/>
+    <dgm:txEffectClrLst/>
+  </dgm:styleLbl>
+  <dgm:styleLbl name="alignNode1">
+    <dgm:fillClrLst>
+      <a:schemeClr val="accent3">
+        <a:alpha val="90000"/>
+      </a:schemeClr>
+      <a:schemeClr val="accent3">
+        <a:alpha val="50000"/>
+      </a:schemeClr>
+    </dgm:fillClrLst>
+    <dgm:linClrLst>
+      <a:schemeClr val="accent3">
+        <a:alpha val="90000"/>
+      </a:schemeClr>
+      <a:schemeClr val="accent3">
+        <a:alpha val="50000"/>
+      </a:schemeClr>
+    </dgm:linClrLst>
+    <dgm:effectClrLst/>
+    <dgm:txLinClrLst/>
+    <dgm:txFillClrLst/>
+    <dgm:txEffectClrLst/>
+  </dgm:styleLbl>
+  <dgm:styleLbl name="lnNode1">
+    <dgm:fillClrLst>
+      <a:schemeClr val="accent3">
+        <a:shade val="90000"/>
+      </a:schemeClr>
+      <a:schemeClr val="accent3">
+        <a:alpha val="50000"/>
+        <a:tint val="50000"/>
+      </a:schemeClr>
+    </dgm:fillClrLst>
+    <dgm:linClrLst meth="repeat">
+      <a:schemeClr val="lt1"/>
+    </dgm:linClrLst>
+    <dgm:effectClrLst/>
+    <dgm:txLinClrLst/>
+    <dgm:txFillClrLst/>
+    <dgm:txEffectClrLst/>
+  </dgm:styleLbl>
+  <dgm:styleLbl name="vennNode1">
+    <dgm:fillClrLst>
+      <a:schemeClr val="accent3">
+        <a:shade val="80000"/>
+        <a:alpha val="50000"/>
+      </a:schemeClr>
+      <a:schemeClr val="accent3">
+        <a:alpha val="80000"/>
+      </a:schemeClr>
+    </dgm:fillClrLst>
+    <dgm:linClrLst meth="repeat">
+      <a:schemeClr val="lt1"/>
+    </dgm:linClrLst>
+    <dgm:effectClrLst/>
+    <dgm:txLinClrLst/>
+    <dgm:txFillClrLst/>
+    <dgm:txEffectClrLst/>
+  </dgm:styleLbl>
+  <dgm:styleLbl name="node2">
+    <dgm:fillClrLst>
+      <a:schemeClr val="accent3">
+        <a:alpha val="70000"/>
+      </a:schemeClr>
+    </dgm:fillClrLst>
+    <dgm:linClrLst meth="repeat">
+      <a:schemeClr val="lt1"/>
+    </dgm:linClrLst>
+    <dgm:effectClrLst/>
+    <dgm:txLinClrLst/>
+    <dgm:txFillClrLst/>
+    <dgm:txEffectClrLst/>
+  </dgm:styleLbl>
+  <dgm:styleLbl name="node3">
+    <dgm:fillClrLst>
+      <a:schemeClr val="accent3">
+        <a:alpha val="50000"/>
+      </a:schemeClr>
+    </dgm:fillClrLst>
+    <dgm:linClrLst meth="repeat">
+      <a:schemeClr val="lt1"/>
+    </dgm:linClrLst>
+    <dgm:effectClrLst/>
+    <dgm:txLinClrLst/>
+    <dgm:txFillClrLst/>
+    <dgm:txEffectClrLst/>
+  </dgm:styleLbl>
+  <dgm:styleLbl name="node4">
+    <dgm:fillClrLst>
+      <a:schemeClr val="accent3">
+        <a:alpha val="30000"/>
+      </a:schemeClr>
+    </dgm:fillClrLst>
+    <dgm:linClrLst meth="repeat">
+      <a:schemeClr val="lt1"/>
+    </dgm:linClrLst>
+    <dgm:effectClrLst/>
+    <dgm:txLinClrLst/>
+    <dgm:txFillClrLst/>
+    <dgm:txEffectClrLst/>
+  </dgm:styleLbl>
+  <dgm:styleLbl name="fgImgPlace1">
+    <dgm:fillClrLst>
+      <a:schemeClr val="accent3">
+        <a:tint val="50000"/>
+        <a:alpha val="90000"/>
+      </a:schemeClr>
+      <a:schemeClr val="accent3">
+        <a:tint val="20000"/>
+        <a:alpha val="50000"/>
+      </a:schemeClr>
+    </dgm:fillClrLst>
+    <dgm:linClrLst meth="repeat">
+      <a:schemeClr val="lt1"/>
+    </dgm:linClrLst>
+    <dgm:effectClrLst/>
+    <dgm:txLinClrLst/>
+    <dgm:txFillClrLst meth="repeat">
+      <a:schemeClr val="lt1"/>
+    </dgm:txFillClrLst>
+    <dgm:txEffectClrLst/>
+  </dgm:styleLbl>
+  <dgm:styleLbl name="alignImgPlace1">
+    <dgm:fillClrLst>
+      <a:schemeClr val="accent3">
+        <a:tint val="50000"/>
+      </a:schemeClr>
+      <a:schemeClr val="accent3">
+        <a:tint val="20000"/>
+      </a:schemeClr>
+    </dgm:fillClrLst>
+    <dgm:linClrLst meth="repeat">
+      <a:schemeClr val="lt1"/>
+    </dgm:linClrLst>
+    <dgm:effectClrLst/>
+    <dgm:txLinClrLst/>
+    <dgm:txFillClrLst meth="repeat">
+      <a:schemeClr val="lt1"/>
+    </dgm:txFillClrLst>
+    <dgm:txEffectClrLst/>
+  </dgm:styleLbl>
+  <dgm:styleLbl name="bgImgPlace1">
+    <dgm:fillClrLst>
+      <a:schemeClr val="accent3">
+        <a:tint val="50000"/>
+      </a:schemeClr>
+      <a:schemeClr val="accent3">
+        <a:tint val="20000"/>
+      </a:schemeClr>
+    </dgm:fillClrLst>
+    <dgm:linClrLst meth="repeat">
+      <a:schemeClr val="lt1"/>
+    </dgm:linClrLst>
+    <dgm:effectClrLst/>
+    <dgm:txLinClrLst/>
+    <dgm:txFillClrLst meth="repeat">
+      <a:schemeClr val="lt1"/>
+    </dgm:txFillClrLst>
+    <dgm:txEffectClrLst/>
+  </dgm:styleLbl>
+  <dgm:styleLbl name="sibTrans2D1">
+    <dgm:fillClrLst>
+      <a:schemeClr val="accent3">
+        <a:shade val="90000"/>
+      </a:schemeClr>
+      <a:schemeClr val="accent3">
+        <a:tint val="50000"/>
+      </a:schemeClr>
+    </dgm:fillClrLst>
+    <dgm:linClrLst>
+      <a:schemeClr val="accent3">
+        <a:shade val="90000"/>
+      </a:schemeClr>
+      <a:schemeClr val="accent3">
+        <a:tint val="50000"/>
+      </a:schemeClr>
+    </dgm:linClrLst>
+    <dgm:effectClrLst/>
+    <dgm:txLinClrLst/>
+    <dgm:txFillClrLst/>
+    <dgm:txEffectClrLst/>
+  </dgm:styleLbl>
+  <dgm:styleLbl name="fgSibTrans2D1">
+    <dgm:fillClrLst>
+      <a:schemeClr val="accent3">
+        <a:shade val="90000"/>
+      </a:schemeClr>
+      <a:schemeClr val="accent3">
+        <a:tint val="50000"/>
+      </a:schemeClr>
+    </dgm:fillClrLst>
+    <dgm:linClrLst>
+      <a:schemeClr val="accent3">
+        <a:shade val="90000"/>
+      </a:schemeClr>
+      <a:schemeClr val="accent3">
+        <a:tint val="50000"/>
+      </a:schemeClr>
+    </dgm:linClrLst>
+    <dgm:effectClrLst/>
+    <dgm:txLinClrLst/>
+    <dgm:txFillClrLst/>
+    <dgm:txEffectClrLst/>
+  </dgm:styleLbl>
+  <dgm:styleLbl name="bgSibTrans2D1">
+    <dgm:fillClrLst>
+      <a:schemeClr val="accent3">
+        <a:shade val="90000"/>
+      </a:schemeClr>
+      <a:schemeClr val="accent3">
+        <a:tint val="50000"/>
+      </a:schemeClr>
+    </dgm:fillClrLst>
+    <dgm:linClrLst>
+      <a:schemeClr val="accent3">
+        <a:shade val="90000"/>
+      </a:schemeClr>
+      <a:schemeClr val="accent3">
+        <a:tint val="50000"/>
+      </a:schemeClr>
+    </dgm:linClrLst>
+    <dgm:effectClrLst/>
+    <dgm:txLinClrLst/>
+    <dgm:txFillClrLst/>
+    <dgm:txEffectClrLst/>
+  </dgm:styleLbl>
+  <dgm:styleLbl name="sibTrans1D1">
+    <dgm:fillClrLst>
+      <a:schemeClr val="accent3">
+        <a:shade val="90000"/>
+      </a:schemeClr>
+      <a:schemeClr val="accent3">
+        <a:tint val="50000"/>
+      </a:schemeClr>
+    </dgm:fillClrLst>
+    <dgm:linClrLst>
+      <a:schemeClr val="accent3">
+        <a:shade val="90000"/>
+      </a:schemeClr>
+      <a:schemeClr val="accent3">
+        <a:tint val="50000"/>
+      </a:schemeClr>
+    </dgm:linClrLst>
+    <dgm:effectClrLst/>
+    <dgm:txLinClrLst/>
+    <dgm:txFillClrLst meth="repeat">
+      <a:schemeClr val="tx1"/>
+    </dgm:txFillClrLst>
+    <dgm:txEffectClrLst/>
+  </dgm:styleLbl>
+  <dgm:styleLbl name="callout">
+    <dgm:fillClrLst meth="repeat">
+      <a:schemeClr val="accent3"/>
+    </dgm:fillClrLst>
+    <dgm:linClrLst meth="repeat">
+      <a:schemeClr val="accent3"/>
+    </dgm:linClrLst>
+    <dgm:effectClrLst/>
+    <dgm:txLinClrLst/>
+    <dgm:txFillClrLst meth="repeat">
+      <a:schemeClr val="tx1"/>
+    </dgm:txFillClrLst>
+    <dgm:txEffectClrLst/>
+  </dgm:styleLbl>
+  <dgm:styleLbl name="asst0">
+    <dgm:fillClrLst meth="repeat">
+      <a:schemeClr val="accent3">
+        <a:alpha val="90000"/>
+      </a:schemeClr>
+    </dgm:fillClrLst>
+    <dgm:linClrLst meth="repeat">
+      <a:schemeClr val="lt1"/>
+    </dgm:linClrLst>
+    <dgm:effectClrLst/>
+    <dgm:txLinClrLst/>
+    <dgm:txFillClrLst/>
+    <dgm:txEffectClrLst/>
+  </dgm:styleLbl>
+  <dgm:styleLbl name="asst1">
+    <dgm:fillClrLst meth="repeat">
+      <a:schemeClr val="accent3">
+        <a:alpha val="90000"/>
+      </a:schemeClr>
+    </dgm:fillClrLst>
+    <dgm:linClrLst meth="repeat">
+      <a:schemeClr val="lt1"/>
+    </dgm:linClrLst>
+    <dgm:effectClrLst/>
+    <dgm:txLinClrLst/>
+    <dgm:txFillClrLst/>
+    <dgm:txEffectClrLst/>
+  </dgm:styleLbl>
+  <dgm:styleLbl name="asst2">
+    <dgm:fillClrLst>
+      <a:schemeClr val="accent3">
+        <a:alpha val="90000"/>
+      </a:schemeClr>
+    </dgm:fillClrLst>
+    <dgm:linClrLst meth="repeat">
+      <a:schemeClr val="lt1"/>
+    </dgm:linClrLst>
+    <dgm:effectClrLst/>
+    <dgm:txLinClrLst/>
+    <dgm:txFillClrLst/>
+    <dgm:txEffectClrLst/>
+  </dgm:styleLbl>
+  <dgm:styleLbl name="asst3">
+    <dgm:fillClrLst>
+      <a:schemeClr val="accent3">
+        <a:alpha val="70000"/>
+      </a:schemeClr>
+    </dgm:fillClrLst>
+    <dgm:linClrLst meth="repeat">
+      <a:schemeClr val="lt1"/>
+    </dgm:linClrLst>
+    <dgm:effectClrLst/>
+    <dgm:txLinClrLst/>
+    <dgm:txFillClrLst/>
+    <dgm:txEffectClrLst/>
+  </dgm:styleLbl>
+  <dgm:styleLbl name="asst4">
+    <dgm:fillClrLst>
+      <a:schemeClr val="accent3">
+        <a:alpha val="50000"/>
+      </a:schemeClr>
+    </dgm:fillClrLst>
+    <dgm:linClrLst meth="repeat">
+      <a:schemeClr val="lt1"/>
+    </dgm:linClrLst>
+    <dgm:effectClrLst/>
+    <dgm:txLinClrLst/>
+    <dgm:txFillClrLst/>
+    <dgm:txEffectClrLst/>
+  </dgm:styleLbl>
+  <dgm:styleLbl name="parChTrans2D1">
+    <dgm:fillClrLst meth="repeat">
+      <a:schemeClr val="accent3">
+        <a:shade val="80000"/>
+      </a:schemeClr>
+    </dgm:fillClrLst>
+    <dgm:linClrLst meth="repeat">
+      <a:schemeClr val="accent3">
+        <a:shade val="80000"/>
+      </a:schemeClr>
+    </dgm:linClrLst>
+    <dgm:effectClrLst/>
+    <dgm:txLinClrLst/>
+    <dgm:txFillClrLst/>
+    <dgm:txEffectClrLst/>
+  </dgm:styleLbl>
+  <dgm:styleLbl name="parChTrans2D2">
+    <dgm:fillClrLst meth="repeat">
+      <a:schemeClr val="accent3">
+        <a:tint val="90000"/>
+      </a:schemeClr>
+    </dgm:fillClrLst>
+    <dgm:linClrLst meth="repeat">
+      <a:schemeClr val="accent3">
+        <a:tint val="90000"/>
+      </a:schemeClr>
+    </dgm:linClrLst>
+    <dgm:effectClrLst/>
+    <dgm:txLinClrLst/>
+    <dgm:txFillClrLst/>
+    <dgm:txEffectClrLst/>
+  </dgm:styleLbl>
+  <dgm:styleLbl name="parChTrans2D3">
+    <dgm:fillClrLst meth="repeat">
+      <a:schemeClr val="accent3">
+        <a:tint val="70000"/>
+      </a:schemeClr>
+    </dgm:fillClrLst>
+    <dgm:linClrLst meth="repeat">
+      <a:schemeClr val="accent3">
+        <a:tint val="70000"/>
+      </a:schemeClr>
+    </dgm:linClrLst>
+    <dgm:effectClrLst/>
+    <dgm:txLinClrLst/>
+    <dgm:txFillClrLst/>
+    <dgm:txEffectClrLst/>
+  </dgm:styleLbl>
+  <dgm:styleLbl name="parChTrans2D4">
+    <dgm:fillClrLst meth="repeat">
+      <a:schemeClr val="accent3">
+        <a:tint val="50000"/>
+      </a:schemeClr>
+    </dgm:fillClrLst>
+    <dgm:linClrLst meth="repeat">
+      <a:schemeClr val="accent3">
+        <a:tint val="50000"/>
+      </a:schemeClr>
+    </dgm:linClrLst>
+    <dgm:effectClrLst/>
+    <dgm:txLinClrLst/>
+    <dgm:txFillClrLst meth="repeat">
+      <a:schemeClr val="dk1"/>
+    </dgm:txFillClrLst>
+    <dgm:txEffectClrLst/>
+  </dgm:styleLbl>
+  <dgm:styleLbl name="parChTrans1D1">
+    <dgm:fillClrLst meth="repeat">
+      <a:schemeClr val="accent3">
+        <a:shade val="80000"/>
+      </a:schemeClr>
+    </dgm:fillClrLst>
+    <dgm:linClrLst meth="repeat">
+      <a:schemeClr val="accent3">
+        <a:shade val="80000"/>
+      </a:schemeClr>
+    </dgm:linClrLst>
+    <dgm:effectClrLst/>
+    <dgm:txLinClrLst/>
+    <dgm:txFillClrLst meth="repeat">
+      <a:schemeClr val="tx1"/>
+    </dgm:txFillClrLst>
+    <dgm:txEffectClrLst/>
+  </dgm:styleLbl>
+  <dgm:styleLbl name="parChTrans1D2">
+    <dgm:fillClrLst meth="repeat">
+      <a:schemeClr val="accent3">
+        <a:tint val="90000"/>
+      </a:schemeClr>
+    </dgm:fillClrLst>
+    <dgm:linClrLst meth="repeat">
+      <a:schemeClr val="accent3">
+        <a:tint val="90000"/>
+      </a:schemeClr>
+    </dgm:linClrLst>
+    <dgm:effectClrLst/>
+    <dgm:txLinClrLst/>
+    <dgm:txFillClrLst meth="repeat">
+      <a:schemeClr val="tx1"/>
+    </dgm:txFillClrLst>
+    <dgm:txEffectClrLst/>
+  </dgm:styleLbl>
+  <dgm:styleLbl name="parChTrans1D3">
+    <dgm:fillClrLst meth="repeat">
+      <a:schemeClr val="accent3">
+        <a:tint val="70000"/>
+      </a:schemeClr>
+    </dgm:fillClrLst>
+    <dgm:linClrLst meth="repeat">
+      <a:schemeClr val="accent3">
+        <a:tint val="70000"/>
+      </a:schemeClr>
+    </dgm:linClrLst>
+    <dgm:effectClrLst/>
+    <dgm:txLinClrLst/>
+    <dgm:txFillClrLst meth="repeat">
+      <a:schemeClr val="tx1"/>
+    </dgm:txFillClrLst>
+    <dgm:txEffectClrLst/>
+  </dgm:styleLbl>
+  <dgm:styleLbl name="parChTrans1D4">
+    <dgm:fillClrLst meth="repeat">
+      <a:schemeClr val="accent3">
+        <a:tint val="50000"/>
+      </a:schemeClr>
+    </dgm:fillClrLst>
+    <dgm:linClrLst meth="repeat">
+      <a:schemeClr val="accent3">
+        <a:tint val="50000"/>
+      </a:schemeClr>
+    </dgm:linClrLst>
+    <dgm:effectClrLst/>
+    <dgm:txLinClrLst/>
+    <dgm:txFillClrLst meth="repeat">
+      <a:schemeClr val="tx1"/>
+    </dgm:txFillClrLst>
+    <dgm:txEffectClrLst/>
+  </dgm:styleLbl>
+  <dgm:styleLbl name="fgAcc1">
+    <dgm:fillClrLst meth="repeat">
+      <a:schemeClr val="lt1">
+        <a:alpha val="90000"/>
+      </a:schemeClr>
+    </dgm:fillClrLst>
+    <dgm:linClrLst>
+      <a:schemeClr val="accent3">
+        <a:alpha val="90000"/>
+      </a:schemeClr>
+      <a:schemeClr val="accent3">
+        <a:alpha val="50000"/>
+      </a:schemeClr>
+    </dgm:linClrLst>
+    <dgm:effectClrLst/>
+    <dgm:txLinClrLst/>
+    <dgm:txFillClrLst meth="repeat">
+      <a:schemeClr val="dk1"/>
+    </dgm:txFillClrLst>
+    <dgm:txEffectClrLst/>
+  </dgm:styleLbl>
+  <dgm:styleLbl name="conFgAcc1">
+    <dgm:fillClrLst meth="repeat">
+      <a:schemeClr val="lt1">
+        <a:alpha val="90000"/>
+      </a:schemeClr>
+    </dgm:fillClrLst>
+    <dgm:linClrLst>
+      <a:schemeClr val="accent3">
+        <a:alpha val="90000"/>
+      </a:schemeClr>
+      <a:schemeClr val="accent3">
+        <a:alpha val="50000"/>
+      </a:schemeClr>
+    </dgm:linClrLst>
+    <dgm:effectClrLst/>
+    <dgm:txLinClrLst/>
+    <dgm:txFillClrLst meth="repeat">
+      <a:schemeClr val="dk1"/>
+    </dgm:txFillClrLst>
+    <dgm:txEffectClrLst/>
+  </dgm:styleLbl>
+  <dgm:styleLbl name="alignAcc1">
+    <dgm:fillClrLst meth="repeat">
+      <a:schemeClr val="lt1">
+        <a:alpha val="90000"/>
+      </a:schemeClr>
+    </dgm:fillClrLst>
+    <dgm:linClrLst>
+      <a:schemeClr val="accent3">
+        <a:alpha val="90000"/>
+      </a:schemeClr>
+      <a:schemeClr val="accent3">
+        <a:alpha val="50000"/>
+      </a:schemeClr>
+    </dgm:linClrLst>
+    <dgm:effectClrLst/>
+    <dgm:txLinClrLst/>
+    <dgm:txFillClrLst meth="repeat">
+      <a:schemeClr val="dk1"/>
+    </dgm:txFillClrLst>
+    <dgm:txEffectClrLst/>
+  </dgm:styleLbl>
+  <dgm:styleLbl name="trAlignAcc1">
+    <dgm:fillClrLst meth="repeat">
+      <a:schemeClr val="lt1">
+        <a:alpha val="40000"/>
+      </a:schemeClr>
+    </dgm:fillClrLst>
+    <dgm:linClrLst>
+      <a:schemeClr val="accent3">
+        <a:alpha val="90000"/>
+      </a:schemeClr>
+      <a:schemeClr val="accent3">
+        <a:alpha val="50000"/>
+      </a:schemeClr>
+    </dgm:linClrLst>
+    <dgm:effectClrLst/>
+    <dgm:txLinClrLst/>
+    <dgm:txFillClrLst meth="repeat">
+      <a:schemeClr val="dk1"/>
+    </dgm:txFillClrLst>
+    <dgm:txEffectClrLst/>
+  </dgm:styleLbl>
+  <dgm:styleLbl name="bgAcc1">
+    <dgm:fillClrLst meth="repeat">
+      <a:schemeClr val="lt1">
+        <a:alpha val="90000"/>
+      </a:schemeClr>
+    </dgm:fillClrLst>
+    <dgm:linClrLst>
+      <a:schemeClr val="accent3">
+        <a:alpha val="90000"/>
+      </a:schemeClr>
+      <a:schemeClr val="accent3">
+        <a:alpha val="50000"/>
+      </a:schemeClr>
+    </dgm:linClrLst>
+    <dgm:effectClrLst/>
+    <dgm:txLinClrLst/>
+    <dgm:txFillClrLst meth="repeat">
+      <a:schemeClr val="dk1"/>
+    </dgm:txFillClrLst>
+    <dgm:txEffectClrLst/>
+  </dgm:styleLbl>
+  <dgm:styleLbl name="solidFgAcc1">
+    <dgm:fillClrLst meth="repeat">
+      <a:schemeClr val="lt1"/>
+    </dgm:fillClrLst>
+    <dgm:linClrLst>
+      <a:schemeClr val="accent3">
+        <a:alpha val="90000"/>
+      </a:schemeClr>
+      <a:schemeClr val="accent3">
+        <a:alpha val="50000"/>
+      </a:schemeClr>
+    </dgm:linClrLst>
+    <dgm:effectClrLst/>
+    <dgm:txLinClrLst/>
+    <dgm:txFillClrLst meth="repeat">
+      <a:schemeClr val="dk1"/>
+    </dgm:txFillClrLst>
+    <dgm:txEffectClrLst/>
+  </dgm:styleLbl>
+  <dgm:styleLbl name="solidAlignAcc1">
+    <dgm:fillClrLst meth="repeat">
+      <a:schemeClr val="lt1"/>
+    </dgm:fillClrLst>
+    <dgm:linClrLst meth="repeat">
+      <a:schemeClr val="accent3"/>
+    </dgm:linClrLst>
+    <dgm:effectClrLst/>
+    <dgm:txLinClrLst/>
+    <dgm:txFillClrLst meth="repeat">
+      <a:schemeClr val="dk1"/>
+    </dgm:txFillClrLst>
+    <dgm:txEffectClrLst/>
+  </dgm:styleLbl>
+  <dgm:styleLbl name="solidBgAcc1">
+    <dgm:fillClrLst meth="repeat">
+      <a:schemeClr val="lt1"/>
+    </dgm:fillClrLst>
+    <dgm:linClrLst meth="repeat">
+      <a:schemeClr val="accent3"/>
+    </dgm:linClrLst>
+    <dgm:effectClrLst/>
+    <dgm:txLinClrLst/>
+    <dgm:txFillClrLst meth="repeat">
+      <a:schemeClr val="dk1"/>
+    </dgm:txFillClrLst>
+    <dgm:txEffectClrLst/>
+  </dgm:styleLbl>
+  <dgm:styleLbl name="fgAccFollowNode1">
+    <dgm:fillClrLst>
+      <a:schemeClr val="accent3">
+        <a:alpha val="90000"/>
+        <a:tint val="40000"/>
+      </a:schemeClr>
+      <a:schemeClr val="accent3">
+        <a:alpha val="50000"/>
+        <a:tint val="40000"/>
+      </a:schemeClr>
+    </dgm:fillClrLst>
+    <dgm:linClrLst meth="repeat">
+      <a:schemeClr val="accent3">
+        <a:alpha val="90000"/>
+        <a:tint val="40000"/>
+      </a:schemeClr>
+    </dgm:linClrLst>
+    <dgm:effectClrLst/>
+    <dgm:txLinClrLst/>
+    <dgm:txFillClrLst meth="repeat">
+      <a:schemeClr val="dk1"/>
+    </dgm:txFillClrLst>
+    <dgm:txEffectClrLst/>
+  </dgm:styleLbl>
+  <dgm:styleLbl name="alignAccFollowNode1">
+    <dgm:fillClrLst meth="repeat">
+      <a:schemeClr val="accent3">
+        <a:alpha val="90000"/>
+        <a:tint val="40000"/>
+      </a:schemeClr>
+    </dgm:fillClrLst>
+    <dgm:linClrLst meth="repeat">
+      <a:schemeClr val="accent3">
+        <a:alpha val="90000"/>
+        <a:tint val="40000"/>
+      </a:schemeClr>
+    </dgm:linClrLst>
+    <dgm:effectClrLst/>
+    <dgm:txLinClrLst/>
+    <dgm:txFillClrLst meth="repeat">
+      <a:schemeClr val="dk1"/>
+    </dgm:txFillClrLst>
+    <dgm:txEffectClrLst/>
+  </dgm:styleLbl>
+  <dgm:styleLbl name="bgAccFollowNode1">
+    <dgm:fillClrLst meth="repeat">
+      <a:schemeClr val="accent3">
+        <a:alpha val="90000"/>
+        <a:tint val="40000"/>
+      </a:schemeClr>
+    </dgm:fillClrLst>
+    <dgm:linClrLst meth="repeat">
+      <a:schemeClr val="lt1"/>
+    </dgm:linClrLst>
+    <dgm:effectClrLst/>
+    <dgm:txLinClrLst/>
+    <dgm:txFillClrLst meth="repeat">
+      <a:schemeClr val="dk1"/>
+    </dgm:txFillClrLst>
+    <dgm:txEffectClrLst/>
+  </dgm:styleLbl>
+  <dgm:styleLbl name="fgAcc0">
+    <dgm:fillClrLst meth="repeat">
+      <a:schemeClr val="lt1">
+        <a:alpha val="90000"/>
+      </a:schemeClr>
+    </dgm:fillClrLst>
+    <dgm:linClrLst meth="repeat">
+      <a:schemeClr val="accent3">
+        <a:shade val="80000"/>
+      </a:schemeClr>
+    </dgm:linClrLst>
+    <dgm:effectClrLst/>
+    <dgm:txLinClrLst/>
+    <dgm:txFillClrLst meth="repeat">
+      <a:schemeClr val="dk1"/>
+    </dgm:txFillClrLst>
+    <dgm:txEffectClrLst/>
+  </dgm:styleLbl>
+  <dgm:styleLbl name="fgAcc2">
+    <dgm:fillClrLst meth="repeat">
+      <a:schemeClr val="lt1">
+        <a:alpha val="90000"/>
+      </a:schemeClr>
+    </dgm:fillClrLst>
+    <dgm:linClrLst meth="repeat">
+      <a:schemeClr val="accent3">
+        <a:tint val="90000"/>
+      </a:schemeClr>
+    </dgm:linClrLst>
+    <dgm:effectClrLst/>
+    <dgm:txLinClrLst/>
+    <dgm:txFillClrLst meth="repeat">
+      <a:schemeClr val="dk1"/>
+    </dgm:txFillClrLst>
+    <dgm:txEffectClrLst/>
+  </dgm:styleLbl>
+  <dgm:styleLbl name="fgAcc3">
+    <dgm:fillClrLst meth="repeat">
+      <a:schemeClr val="lt1">
+        <a:alpha val="90000"/>
+      </a:schemeClr>
+    </dgm:fillClrLst>
+    <dgm:linClrLst meth="repeat">
+      <a:schemeClr val="accent3">
+        <a:tint val="70000"/>
+      </a:schemeClr>
+    </dgm:linClrLst>
+    <dgm:effectClrLst/>
+    <dgm:txLinClrLst/>
+    <dgm:txFillClrLst meth="repeat">
+      <a:schemeClr val="dk1"/>
+    </dgm:txFillClrLst>
+    <dgm:txEffectClrLst/>
+  </dgm:styleLbl>
+  <dgm:styleLbl name="fgAcc4">
+    <dgm:fillClrLst meth="repeat">
+      <a:schemeClr val="lt1">
+        <a:alpha val="90000"/>
+      </a:schemeClr>
+    </dgm:fillClrLst>
+    <dgm:linClrLst meth="repeat">
+      <a:schemeClr val="accent3">
+        <a:tint val="50000"/>
+      </a:schemeClr>
+    </dgm:linClrLst>
+    <dgm:effectClrLst/>
+    <dgm:txLinClrLst/>
+    <dgm:txFillClrLst meth="repeat">
+      <a:schemeClr val="dk1"/>
+    </dgm:txFillClrLst>
+    <dgm:txEffectClrLst/>
+  </dgm:styleLbl>
+  <dgm:styleLbl name="bgShp">
+    <dgm:fillClrLst meth="repeat">
+      <a:schemeClr val="accent3">
+        <a:tint val="40000"/>
+      </a:schemeClr>
+    </dgm:fillClrLst>
+    <dgm:linClrLst meth="repeat">
+      <a:schemeClr val="dk1"/>
+    </dgm:linClrLst>
+    <dgm:effectClrLst/>
+    <dgm:txLinClrLst/>
+    <dgm:txFillClrLst meth="repeat">
+      <a:schemeClr val="dk1"/>
+    </dgm:txFillClrLst>
+    <dgm:txEffectClrLst/>
+  </dgm:styleLbl>
+  <dgm:styleLbl name="dkBgShp">
+    <dgm:fillClrLst meth="repeat">
+      <a:schemeClr val="accent3">
+        <a:shade val="90000"/>
+      </a:schemeClr>
+    </dgm:fillClrLst>
+    <dgm:linClrLst meth="repeat">
+      <a:schemeClr val="dk1"/>
+    </dgm:linClrLst>
+    <dgm:effectClrLst/>
+    <dgm:txLinClrLst/>
+    <dgm:txFillClrLst meth="repeat">
+      <a:schemeClr val="lt1"/>
+    </dgm:txFillClrLst>
+    <dgm:txEffectClrLst/>
+  </dgm:styleLbl>
+  <dgm:styleLbl name="trBgShp">
+    <dgm:fillClrLst meth="repeat">
+      <a:schemeClr val="accent3">
+        <a:tint val="50000"/>
+        <a:alpha val="40000"/>
+      </a:schemeClr>
+    </dgm:fillClrLst>
+    <dgm:linClrLst meth="repeat">
+      <a:schemeClr val="accent3"/>
+    </dgm:linClrLst>
+    <dgm:effectClrLst/>
+    <dgm:txLinClrLst/>
+    <dgm:txFillClrLst meth="repeat">
+      <a:schemeClr val="lt1"/>
+    </dgm:txFillClrLst>
+    <dgm:txEffectClrLst/>
+  </dgm:styleLbl>
+  <dgm:styleLbl name="fgShp">
+    <dgm:fillClrLst meth="repeat">
+      <a:schemeClr val="accent3">
+        <a:tint val="40000"/>
+      </a:schemeClr>
+    </dgm:fillClrLst>
+    <dgm:linClrLst meth="repeat">
+      <a:schemeClr val="lt1"/>
+    </dgm:linClrLst>
+    <dgm:effectClrLst/>
+    <dgm:txLinClrLst/>
+    <dgm:txFillClrLst meth="repeat">
+      <a:schemeClr val="dk1"/>
+    </dgm:txFillClrLst>
+    <dgm:txEffectClrLst/>
+  </dgm:styleLbl>
+  <dgm:styleLbl name="revTx">
+    <dgm:fillClrLst meth="repeat">
+      <a:schemeClr val="lt1">
+        <a:alpha val="0"/>
+      </a:schemeClr>
+    </dgm:fillClrLst>
+    <dgm:linClrLst meth="repeat">
+      <a:schemeClr val="dk1">
+        <a:alpha val="0"/>
+      </a:schemeClr>
+    </dgm:linClrLst>
+    <dgm:effectClrLst/>
+    <dgm:txLinClrLst/>
+    <dgm:txFillClrLst meth="repeat">
+      <a:schemeClr val="tx1"/>
+    </dgm:txFillClrLst>
+    <dgm:txEffectClrLst/>
+  </dgm:styleLbl>
+</dgm:colorsDef>
+</file>
+
+<file path=ppt/diagrams/data1.xml><?xml version="1.0" encoding="utf-8"?>
+<dgm:dataModel xmlns:dgm="http://schemas.openxmlformats.org/drawingml/2006/diagram" xmlns:a="http://schemas.openxmlformats.org/drawingml/2006/main">
+  <dgm:ptLst>
+    <dgm:pt modelId="{8A171E47-741F-934F-88A1-DA3AE35A3186}" type="doc">
+      <dgm:prSet loTypeId="urn:microsoft.com/office/officeart/2005/8/layout/pyramid1" loCatId="" qsTypeId="urn:microsoft.com/office/officeart/2005/8/quickstyle/simple1" qsCatId="simple" csTypeId="urn:microsoft.com/office/officeart/2005/8/colors/accent3_5" csCatId="accent3" phldr="1"/>
+      <dgm:spPr/>
+    </dgm:pt>
+    <dgm:pt modelId="{912D8B81-DED7-934B-950B-18C8F90C1CE5}">
+      <dgm:prSet phldrT="[Text]" custT="1">
+        <dgm:style>
+          <a:lnRef idx="2">
+            <a:schemeClr val="dk1"/>
+          </a:lnRef>
+          <a:fillRef idx="1">
+            <a:schemeClr val="lt1"/>
+          </a:fillRef>
+          <a:effectRef idx="0">
+            <a:schemeClr val="dk1"/>
+          </a:effectRef>
+          <a:fontRef idx="minor">
+            <a:schemeClr val="dk1"/>
+          </a:fontRef>
+        </dgm:style>
+      </dgm:prSet>
+      <dgm:spPr/>
+      <dgm:t>
+        <a:bodyPr/>
+        <a:lstStyle/>
+        <a:p>
+          <a:r>
+            <a:rPr lang="en-GB" sz="2800" dirty="0"/>
+            <a:t>UI</a:t>
+          </a:r>
+        </a:p>
+      </dgm:t>
+    </dgm:pt>
+    <dgm:pt modelId="{704D6668-9F26-7646-9277-FBE6A09CA0CD}" type="parTrans" cxnId="{5D5D568C-89A2-644D-954C-0D1D01657EBB}">
+      <dgm:prSet/>
+      <dgm:spPr/>
+      <dgm:t>
+        <a:bodyPr/>
+        <a:lstStyle/>
+        <a:p>
+          <a:endParaRPr lang="en-GB"/>
+        </a:p>
+      </dgm:t>
+    </dgm:pt>
+    <dgm:pt modelId="{68C0A7A1-B285-7547-8E16-190ECEB7D691}" type="sibTrans" cxnId="{5D5D568C-89A2-644D-954C-0D1D01657EBB}">
+      <dgm:prSet/>
+      <dgm:spPr/>
+      <dgm:t>
+        <a:bodyPr/>
+        <a:lstStyle/>
+        <a:p>
+          <a:endParaRPr lang="en-GB"/>
+        </a:p>
+      </dgm:t>
+    </dgm:pt>
+    <dgm:pt modelId="{9A9BC8E3-19CD-E14D-BE9F-43E941DC581D}">
+      <dgm:prSet phldrT="[Text]" custT="1">
+        <dgm:style>
+          <a:lnRef idx="2">
+            <a:schemeClr val="dk1"/>
+          </a:lnRef>
+          <a:fillRef idx="1">
+            <a:schemeClr val="lt1"/>
+          </a:fillRef>
+          <a:effectRef idx="0">
+            <a:schemeClr val="dk1"/>
+          </a:effectRef>
+          <a:fontRef idx="minor">
+            <a:schemeClr val="dk1"/>
+          </a:fontRef>
+        </dgm:style>
+      </dgm:prSet>
+      <dgm:spPr/>
+      <dgm:t>
+        <a:bodyPr/>
+        <a:lstStyle/>
+        <a:p>
+          <a:r>
+            <a:rPr lang="en-GB" sz="2800" dirty="0"/>
+            <a:t>Service</a:t>
+          </a:r>
+        </a:p>
+      </dgm:t>
+    </dgm:pt>
+    <dgm:pt modelId="{177276FB-F3AB-5D4D-8AFD-B367AD8642FC}" type="parTrans" cxnId="{94C1ADCF-20FA-2746-B239-B245C836B7EF}">
+      <dgm:prSet/>
+      <dgm:spPr/>
+      <dgm:t>
+        <a:bodyPr/>
+        <a:lstStyle/>
+        <a:p>
+          <a:endParaRPr lang="en-GB"/>
+        </a:p>
+      </dgm:t>
+    </dgm:pt>
+    <dgm:pt modelId="{CB80AE3B-2F2B-9142-B181-CD0C672FDE0D}" type="sibTrans" cxnId="{94C1ADCF-20FA-2746-B239-B245C836B7EF}">
+      <dgm:prSet/>
+      <dgm:spPr/>
+      <dgm:t>
+        <a:bodyPr/>
+        <a:lstStyle/>
+        <a:p>
+          <a:endParaRPr lang="en-GB"/>
+        </a:p>
+      </dgm:t>
+    </dgm:pt>
+    <dgm:pt modelId="{6496B46B-A121-4F4C-8A37-60F4060FAD8A}">
+      <dgm:prSet phldrT="[Text]" custT="1">
+        <dgm:style>
+          <a:lnRef idx="2">
+            <a:schemeClr val="dk1"/>
+          </a:lnRef>
+          <a:fillRef idx="1">
+            <a:schemeClr val="lt1"/>
+          </a:fillRef>
+          <a:effectRef idx="0">
+            <a:schemeClr val="dk1"/>
+          </a:effectRef>
+          <a:fontRef idx="minor">
+            <a:schemeClr val="dk1"/>
+          </a:fontRef>
+        </dgm:style>
+      </dgm:prSet>
+      <dgm:spPr/>
+      <dgm:t>
+        <a:bodyPr/>
+        <a:lstStyle/>
+        <a:p>
+          <a:r>
+            <a:rPr lang="en-GB" sz="2800" dirty="0" err="1"/>
+            <a:t>Enhet</a:t>
+          </a:r>
+          <a:endParaRPr lang="en-GB" sz="2800" dirty="0"/>
+        </a:p>
+      </dgm:t>
+    </dgm:pt>
+    <dgm:pt modelId="{7AAFBFF5-8D06-D04E-9254-2483B541FFB0}" type="parTrans" cxnId="{9CA29238-F1ED-9348-88DE-FA68D45C268B}">
+      <dgm:prSet/>
+      <dgm:spPr/>
+      <dgm:t>
+        <a:bodyPr/>
+        <a:lstStyle/>
+        <a:p>
+          <a:endParaRPr lang="en-GB"/>
+        </a:p>
+      </dgm:t>
+    </dgm:pt>
+    <dgm:pt modelId="{982309B0-59C5-0D41-8163-283737B0CEE7}" type="sibTrans" cxnId="{9CA29238-F1ED-9348-88DE-FA68D45C268B}">
+      <dgm:prSet/>
+      <dgm:spPr/>
+      <dgm:t>
+        <a:bodyPr/>
+        <a:lstStyle/>
+        <a:p>
+          <a:endParaRPr lang="en-GB"/>
+        </a:p>
+      </dgm:t>
+    </dgm:pt>
+    <dgm:pt modelId="{21FDE3E3-5FBE-9B47-8B34-853AE81BA41F}" type="pres">
+      <dgm:prSet presAssocID="{8A171E47-741F-934F-88A1-DA3AE35A3186}" presName="Name0" presStyleCnt="0">
+        <dgm:presLayoutVars>
+          <dgm:dir/>
+          <dgm:animLvl val="lvl"/>
+          <dgm:resizeHandles val="exact"/>
+        </dgm:presLayoutVars>
+      </dgm:prSet>
+      <dgm:spPr/>
+    </dgm:pt>
+    <dgm:pt modelId="{D61D4E00-1692-0C48-97C3-D1265629FAD1}" type="pres">
+      <dgm:prSet presAssocID="{912D8B81-DED7-934B-950B-18C8F90C1CE5}" presName="Name8" presStyleCnt="0"/>
+      <dgm:spPr/>
+    </dgm:pt>
+    <dgm:pt modelId="{A66B7632-BFF2-9C4F-972D-DD2B6E2A5109}" type="pres">
+      <dgm:prSet presAssocID="{912D8B81-DED7-934B-950B-18C8F90C1CE5}" presName="level" presStyleLbl="node1" presStyleIdx="0" presStyleCnt="3">
+        <dgm:presLayoutVars>
+          <dgm:chMax val="1"/>
+          <dgm:bulletEnabled val="1"/>
+        </dgm:presLayoutVars>
+      </dgm:prSet>
+      <dgm:spPr/>
+    </dgm:pt>
+    <dgm:pt modelId="{8D0F8891-6A12-F94F-9841-F8574B9B99A2}" type="pres">
+      <dgm:prSet presAssocID="{912D8B81-DED7-934B-950B-18C8F90C1CE5}" presName="levelTx" presStyleLbl="revTx" presStyleIdx="0" presStyleCnt="0">
+        <dgm:presLayoutVars>
+          <dgm:chMax val="1"/>
+          <dgm:bulletEnabled val="1"/>
+        </dgm:presLayoutVars>
+      </dgm:prSet>
+      <dgm:spPr/>
+    </dgm:pt>
+    <dgm:pt modelId="{56DB06F6-7B77-004E-8D96-2B8C44BCEB10}" type="pres">
+      <dgm:prSet presAssocID="{9A9BC8E3-19CD-E14D-BE9F-43E941DC581D}" presName="Name8" presStyleCnt="0"/>
+      <dgm:spPr/>
+    </dgm:pt>
+    <dgm:pt modelId="{F52E8C35-6269-FF46-88E0-AC4A42EF8244}" type="pres">
+      <dgm:prSet presAssocID="{9A9BC8E3-19CD-E14D-BE9F-43E941DC581D}" presName="level" presStyleLbl="node1" presStyleIdx="1" presStyleCnt="3">
+        <dgm:presLayoutVars>
+          <dgm:chMax val="1"/>
+          <dgm:bulletEnabled val="1"/>
+        </dgm:presLayoutVars>
+      </dgm:prSet>
+      <dgm:spPr/>
+    </dgm:pt>
+    <dgm:pt modelId="{702AF150-6C15-2541-9DA5-19FFE46E7602}" type="pres">
+      <dgm:prSet presAssocID="{9A9BC8E3-19CD-E14D-BE9F-43E941DC581D}" presName="levelTx" presStyleLbl="revTx" presStyleIdx="0" presStyleCnt="0">
+        <dgm:presLayoutVars>
+          <dgm:chMax val="1"/>
+          <dgm:bulletEnabled val="1"/>
+        </dgm:presLayoutVars>
+      </dgm:prSet>
+      <dgm:spPr/>
+    </dgm:pt>
+    <dgm:pt modelId="{884591FA-F9D7-CC4D-9294-EC76C6F9FAFB}" type="pres">
+      <dgm:prSet presAssocID="{6496B46B-A121-4F4C-8A37-60F4060FAD8A}" presName="Name8" presStyleCnt="0"/>
+      <dgm:spPr/>
+    </dgm:pt>
+    <dgm:pt modelId="{233F223F-3E26-5842-A93F-235A94128F82}" type="pres">
+      <dgm:prSet presAssocID="{6496B46B-A121-4F4C-8A37-60F4060FAD8A}" presName="level" presStyleLbl="node1" presStyleIdx="2" presStyleCnt="3">
+        <dgm:presLayoutVars>
+          <dgm:chMax val="1"/>
+          <dgm:bulletEnabled val="1"/>
+        </dgm:presLayoutVars>
+      </dgm:prSet>
+      <dgm:spPr/>
+    </dgm:pt>
+    <dgm:pt modelId="{5FC7BDAB-F891-DD4F-A7BA-4AE11A665379}" type="pres">
+      <dgm:prSet presAssocID="{6496B46B-A121-4F4C-8A37-60F4060FAD8A}" presName="levelTx" presStyleLbl="revTx" presStyleIdx="0" presStyleCnt="0">
+        <dgm:presLayoutVars>
+          <dgm:chMax val="1"/>
+          <dgm:bulletEnabled val="1"/>
+        </dgm:presLayoutVars>
+      </dgm:prSet>
+      <dgm:spPr/>
+    </dgm:pt>
+  </dgm:ptLst>
+  <dgm:cxnLst>
+    <dgm:cxn modelId="{0998EE0F-B81A-804C-989A-7D27CDD184BC}" type="presOf" srcId="{912D8B81-DED7-934B-950B-18C8F90C1CE5}" destId="{8D0F8891-6A12-F94F-9841-F8574B9B99A2}" srcOrd="1" destOrd="0" presId="urn:microsoft.com/office/officeart/2005/8/layout/pyramid1"/>
+    <dgm:cxn modelId="{23060D2D-382D-E140-9AA2-EC89DC4DF29F}" type="presOf" srcId="{8A171E47-741F-934F-88A1-DA3AE35A3186}" destId="{21FDE3E3-5FBE-9B47-8B34-853AE81BA41F}" srcOrd="0" destOrd="0" presId="urn:microsoft.com/office/officeart/2005/8/layout/pyramid1"/>
+    <dgm:cxn modelId="{9CA29238-F1ED-9348-88DE-FA68D45C268B}" srcId="{8A171E47-741F-934F-88A1-DA3AE35A3186}" destId="{6496B46B-A121-4F4C-8A37-60F4060FAD8A}" srcOrd="2" destOrd="0" parTransId="{7AAFBFF5-8D06-D04E-9254-2483B541FFB0}" sibTransId="{982309B0-59C5-0D41-8163-283737B0CEE7}"/>
+    <dgm:cxn modelId="{B589254D-A195-C247-A439-26995E7B014E}" type="presOf" srcId="{912D8B81-DED7-934B-950B-18C8F90C1CE5}" destId="{A66B7632-BFF2-9C4F-972D-DD2B6E2A5109}" srcOrd="0" destOrd="0" presId="urn:microsoft.com/office/officeart/2005/8/layout/pyramid1"/>
+    <dgm:cxn modelId="{5F5EC450-E403-E44F-8746-1B521763F815}" type="presOf" srcId="{9A9BC8E3-19CD-E14D-BE9F-43E941DC581D}" destId="{702AF150-6C15-2541-9DA5-19FFE46E7602}" srcOrd="1" destOrd="0" presId="urn:microsoft.com/office/officeart/2005/8/layout/pyramid1"/>
+    <dgm:cxn modelId="{5D5D568C-89A2-644D-954C-0D1D01657EBB}" srcId="{8A171E47-741F-934F-88A1-DA3AE35A3186}" destId="{912D8B81-DED7-934B-950B-18C8F90C1CE5}" srcOrd="0" destOrd="0" parTransId="{704D6668-9F26-7646-9277-FBE6A09CA0CD}" sibTransId="{68C0A7A1-B285-7547-8E16-190ECEB7D691}"/>
+    <dgm:cxn modelId="{2DDE90B8-0BEE-D14F-99B1-781ADD96A760}" type="presOf" srcId="{6496B46B-A121-4F4C-8A37-60F4060FAD8A}" destId="{5FC7BDAB-F891-DD4F-A7BA-4AE11A665379}" srcOrd="1" destOrd="0" presId="urn:microsoft.com/office/officeart/2005/8/layout/pyramid1"/>
+    <dgm:cxn modelId="{A8F6B4BB-E9E4-9348-881E-342773E56241}" type="presOf" srcId="{9A9BC8E3-19CD-E14D-BE9F-43E941DC581D}" destId="{F52E8C35-6269-FF46-88E0-AC4A42EF8244}" srcOrd="0" destOrd="0" presId="urn:microsoft.com/office/officeart/2005/8/layout/pyramid1"/>
+    <dgm:cxn modelId="{94C1ADCF-20FA-2746-B239-B245C836B7EF}" srcId="{8A171E47-741F-934F-88A1-DA3AE35A3186}" destId="{9A9BC8E3-19CD-E14D-BE9F-43E941DC581D}" srcOrd="1" destOrd="0" parTransId="{177276FB-F3AB-5D4D-8AFD-B367AD8642FC}" sibTransId="{CB80AE3B-2F2B-9142-B181-CD0C672FDE0D}"/>
+    <dgm:cxn modelId="{F39E40E3-8878-A547-9BFD-2B218C522951}" type="presOf" srcId="{6496B46B-A121-4F4C-8A37-60F4060FAD8A}" destId="{233F223F-3E26-5842-A93F-235A94128F82}" srcOrd="0" destOrd="0" presId="urn:microsoft.com/office/officeart/2005/8/layout/pyramid1"/>
+    <dgm:cxn modelId="{2194C3FF-D801-AE42-BEA7-213336EACB61}" type="presParOf" srcId="{21FDE3E3-5FBE-9B47-8B34-853AE81BA41F}" destId="{D61D4E00-1692-0C48-97C3-D1265629FAD1}" srcOrd="0" destOrd="0" presId="urn:microsoft.com/office/officeart/2005/8/layout/pyramid1"/>
+    <dgm:cxn modelId="{76CDA19F-05FC-8145-A51D-93C2720BEBD3}" type="presParOf" srcId="{D61D4E00-1692-0C48-97C3-D1265629FAD1}" destId="{A66B7632-BFF2-9C4F-972D-DD2B6E2A5109}" srcOrd="0" destOrd="0" presId="urn:microsoft.com/office/officeart/2005/8/layout/pyramid1"/>
+    <dgm:cxn modelId="{733333DB-D0E5-DF43-9E56-A46650D2420C}" type="presParOf" srcId="{D61D4E00-1692-0C48-97C3-D1265629FAD1}" destId="{8D0F8891-6A12-F94F-9841-F8574B9B99A2}" srcOrd="1" destOrd="0" presId="urn:microsoft.com/office/officeart/2005/8/layout/pyramid1"/>
+    <dgm:cxn modelId="{2D266930-113A-B04C-87EE-1011B6595E5F}" type="presParOf" srcId="{21FDE3E3-5FBE-9B47-8B34-853AE81BA41F}" destId="{56DB06F6-7B77-004E-8D96-2B8C44BCEB10}" srcOrd="1" destOrd="0" presId="urn:microsoft.com/office/officeart/2005/8/layout/pyramid1"/>
+    <dgm:cxn modelId="{B2E93270-5676-7D45-9586-C7EF7A99B018}" type="presParOf" srcId="{56DB06F6-7B77-004E-8D96-2B8C44BCEB10}" destId="{F52E8C35-6269-FF46-88E0-AC4A42EF8244}" srcOrd="0" destOrd="0" presId="urn:microsoft.com/office/officeart/2005/8/layout/pyramid1"/>
+    <dgm:cxn modelId="{CAC69359-D491-8E4F-81B1-BAE9668DA16F}" type="presParOf" srcId="{56DB06F6-7B77-004E-8D96-2B8C44BCEB10}" destId="{702AF150-6C15-2541-9DA5-19FFE46E7602}" srcOrd="1" destOrd="0" presId="urn:microsoft.com/office/officeart/2005/8/layout/pyramid1"/>
+    <dgm:cxn modelId="{7AD81800-50B2-0541-8CA1-0758E8ECC0BF}" type="presParOf" srcId="{21FDE3E3-5FBE-9B47-8B34-853AE81BA41F}" destId="{884591FA-F9D7-CC4D-9294-EC76C6F9FAFB}" srcOrd="2" destOrd="0" presId="urn:microsoft.com/office/officeart/2005/8/layout/pyramid1"/>
+    <dgm:cxn modelId="{AE4557AB-3AE3-F241-BB28-C45186AAD42F}" type="presParOf" srcId="{884591FA-F9D7-CC4D-9294-EC76C6F9FAFB}" destId="{233F223F-3E26-5842-A93F-235A94128F82}" srcOrd="0" destOrd="0" presId="urn:microsoft.com/office/officeart/2005/8/layout/pyramid1"/>
+    <dgm:cxn modelId="{0FE375E7-1D22-A548-93D9-A41BD50C49E9}" type="presParOf" srcId="{884591FA-F9D7-CC4D-9294-EC76C6F9FAFB}" destId="{5FC7BDAB-F891-DD4F-A7BA-4AE11A665379}" srcOrd="1" destOrd="0" presId="urn:microsoft.com/office/officeart/2005/8/layout/pyramid1"/>
+  </dgm:cxnLst>
+  <dgm:bg/>
+  <dgm:whole/>
+  <dgm:extLst>
+    <a:ext uri="http://schemas.microsoft.com/office/drawing/2008/diagram">
+      <dsp:dataModelExt xmlns:dsp="http://schemas.microsoft.com/office/drawing/2008/diagram" relId="rId6" minVer="http://schemas.openxmlformats.org/drawingml/2006/diagram"/>
+    </a:ext>
+  </dgm:extLst>
+</dgm:dataModel>
+</file>
+
+<file path=ppt/diagrams/drawing1.xml><?xml version="1.0" encoding="utf-8"?>
+<dsp:drawing xmlns:dgm="http://schemas.openxmlformats.org/drawingml/2006/diagram" xmlns:dsp="http://schemas.microsoft.com/office/drawing/2008/diagram" xmlns:a="http://schemas.openxmlformats.org/drawingml/2006/main">
+  <dsp:spTree>
+    <dsp:nvGrpSpPr>
+      <dsp:cNvPr id="0" name=""/>
+      <dsp:cNvGrpSpPr/>
+    </dsp:nvGrpSpPr>
+    <dsp:grpSpPr/>
+    <dsp:sp modelId="{A66B7632-BFF2-9C4F-972D-DD2B6E2A5109}">
+      <dsp:nvSpPr>
+        <dsp:cNvPr id="0" name=""/>
+        <dsp:cNvSpPr/>
+      </dsp:nvSpPr>
+      <dsp:spPr>
+        <a:xfrm>
+          <a:off x="961995" y="0"/>
+          <a:ext cx="961996" cy="728149"/>
+        </a:xfrm>
+        <a:prstGeom prst="trapezoid">
+          <a:avLst>
+            <a:gd name="adj" fmla="val 66058"/>
+          </a:avLst>
+        </a:prstGeom>
+        <a:solidFill>
+          <a:schemeClr val="lt1"/>
+        </a:solidFill>
+        <a:ln w="12700" cap="flat" cmpd="sng" algn="ctr">
+          <a:solidFill>
+            <a:schemeClr val="dk1"/>
+          </a:solidFill>
+          <a:prstDash val="solid"/>
+          <a:miter lim="800000"/>
+        </a:ln>
+        <a:effectLst/>
+      </dsp:spPr>
+      <dsp:style>
+        <a:lnRef idx="2">
+          <a:schemeClr val="dk1"/>
+        </a:lnRef>
+        <a:fillRef idx="1">
+          <a:schemeClr val="lt1"/>
+        </a:fillRef>
+        <a:effectRef idx="0">
+          <a:schemeClr val="dk1"/>
+        </a:effectRef>
+        <a:fontRef idx="minor">
+          <a:schemeClr val="dk1"/>
+        </a:fontRef>
+      </dsp:style>
+      <dsp:txBody>
+        <a:bodyPr spcFirstLastPara="0" vert="horz" wrap="square" lIns="35560" tIns="35560" rIns="35560" bIns="35560" numCol="1" spcCol="1270" anchor="ctr" anchorCtr="0">
+          <a:noAutofit/>
+        </a:bodyPr>
+        <a:lstStyle/>
+        <a:p>
+          <a:pPr marL="0" lvl="0" indent="0" algn="ctr" defTabSz="1244600">
+            <a:lnSpc>
+              <a:spcPct val="90000"/>
+            </a:lnSpc>
+            <a:spcBef>
+              <a:spcPct val="0"/>
+            </a:spcBef>
+            <a:spcAft>
+              <a:spcPct val="35000"/>
+            </a:spcAft>
+            <a:buNone/>
+          </a:pPr>
+          <a:r>
+            <a:rPr lang="en-GB" sz="2800" kern="1200" dirty="0"/>
+            <a:t>UI</a:t>
+          </a:r>
+        </a:p>
+      </dsp:txBody>
+      <dsp:txXfrm>
+        <a:off x="961995" y="0"/>
+        <a:ext cx="961996" cy="728149"/>
+      </dsp:txXfrm>
+    </dsp:sp>
+    <dsp:sp modelId="{F52E8C35-6269-FF46-88E0-AC4A42EF8244}">
+      <dsp:nvSpPr>
+        <dsp:cNvPr id="0" name=""/>
+        <dsp:cNvSpPr/>
+      </dsp:nvSpPr>
+      <dsp:spPr>
+        <a:xfrm>
+          <a:off x="480997" y="728149"/>
+          <a:ext cx="1923992" cy="728149"/>
+        </a:xfrm>
+        <a:prstGeom prst="trapezoid">
+          <a:avLst>
+            <a:gd name="adj" fmla="val 66058"/>
+          </a:avLst>
+        </a:prstGeom>
+        <a:solidFill>
+          <a:schemeClr val="lt1"/>
+        </a:solidFill>
+        <a:ln w="12700" cap="flat" cmpd="sng" algn="ctr">
+          <a:solidFill>
+            <a:schemeClr val="dk1"/>
+          </a:solidFill>
+          <a:prstDash val="solid"/>
+          <a:miter lim="800000"/>
+        </a:ln>
+        <a:effectLst/>
+      </dsp:spPr>
+      <dsp:style>
+        <a:lnRef idx="2">
+          <a:schemeClr val="dk1"/>
+        </a:lnRef>
+        <a:fillRef idx="1">
+          <a:schemeClr val="lt1"/>
+        </a:fillRef>
+        <a:effectRef idx="0">
+          <a:schemeClr val="dk1"/>
+        </a:effectRef>
+        <a:fontRef idx="minor">
+          <a:schemeClr val="dk1"/>
+        </a:fontRef>
+      </dsp:style>
+      <dsp:txBody>
+        <a:bodyPr spcFirstLastPara="0" vert="horz" wrap="square" lIns="35560" tIns="35560" rIns="35560" bIns="35560" numCol="1" spcCol="1270" anchor="ctr" anchorCtr="0">
+          <a:noAutofit/>
+        </a:bodyPr>
+        <a:lstStyle/>
+        <a:p>
+          <a:pPr marL="0" lvl="0" indent="0" algn="ctr" defTabSz="1244600">
+            <a:lnSpc>
+              <a:spcPct val="90000"/>
+            </a:lnSpc>
+            <a:spcBef>
+              <a:spcPct val="0"/>
+            </a:spcBef>
+            <a:spcAft>
+              <a:spcPct val="35000"/>
+            </a:spcAft>
+            <a:buNone/>
+          </a:pPr>
+          <a:r>
+            <a:rPr lang="en-GB" sz="2800" kern="1200" dirty="0"/>
+            <a:t>Service</a:t>
+          </a:r>
+        </a:p>
+      </dsp:txBody>
+      <dsp:txXfrm>
+        <a:off x="817696" y="728149"/>
+        <a:ext cx="1250594" cy="728149"/>
+      </dsp:txXfrm>
+    </dsp:sp>
+    <dsp:sp modelId="{233F223F-3E26-5842-A93F-235A94128F82}">
+      <dsp:nvSpPr>
+        <dsp:cNvPr id="0" name=""/>
+        <dsp:cNvSpPr/>
+      </dsp:nvSpPr>
+      <dsp:spPr>
+        <a:xfrm>
+          <a:off x="0" y="1456298"/>
+          <a:ext cx="2885987" cy="728149"/>
+        </a:xfrm>
+        <a:prstGeom prst="trapezoid">
+          <a:avLst>
+            <a:gd name="adj" fmla="val 66058"/>
+          </a:avLst>
+        </a:prstGeom>
+        <a:solidFill>
+          <a:schemeClr val="lt1"/>
+        </a:solidFill>
+        <a:ln w="12700" cap="flat" cmpd="sng" algn="ctr">
+          <a:solidFill>
+            <a:schemeClr val="dk1"/>
+          </a:solidFill>
+          <a:prstDash val="solid"/>
+          <a:miter lim="800000"/>
+        </a:ln>
+        <a:effectLst/>
+      </dsp:spPr>
+      <dsp:style>
+        <a:lnRef idx="2">
+          <a:schemeClr val="dk1"/>
+        </a:lnRef>
+        <a:fillRef idx="1">
+          <a:schemeClr val="lt1"/>
+        </a:fillRef>
+        <a:effectRef idx="0">
+          <a:schemeClr val="dk1"/>
+        </a:effectRef>
+        <a:fontRef idx="minor">
+          <a:schemeClr val="dk1"/>
+        </a:fontRef>
+      </dsp:style>
+      <dsp:txBody>
+        <a:bodyPr spcFirstLastPara="0" vert="horz" wrap="square" lIns="35560" tIns="35560" rIns="35560" bIns="35560" numCol="1" spcCol="1270" anchor="ctr" anchorCtr="0">
+          <a:noAutofit/>
+        </a:bodyPr>
+        <a:lstStyle/>
+        <a:p>
+          <a:pPr marL="0" lvl="0" indent="0" algn="ctr" defTabSz="1244600">
+            <a:lnSpc>
+              <a:spcPct val="90000"/>
+            </a:lnSpc>
+            <a:spcBef>
+              <a:spcPct val="0"/>
+            </a:spcBef>
+            <a:spcAft>
+              <a:spcPct val="35000"/>
+            </a:spcAft>
+            <a:buNone/>
+          </a:pPr>
+          <a:r>
+            <a:rPr lang="en-GB" sz="2800" kern="1200" dirty="0" err="1"/>
+            <a:t>Enhet</a:t>
+          </a:r>
+          <a:endParaRPr lang="en-GB" sz="2800" kern="1200" dirty="0"/>
+        </a:p>
+      </dsp:txBody>
+      <dsp:txXfrm>
+        <a:off x="505047" y="1456298"/>
+        <a:ext cx="1875892" cy="728149"/>
+      </dsp:txXfrm>
+    </dsp:sp>
+  </dsp:spTree>
+</dsp:drawing>
+</file>
+
+<file path=ppt/diagrams/layout1.xml><?xml version="1.0" encoding="utf-8"?>
+<dgm:layoutDef xmlns:dgm="http://schemas.openxmlformats.org/drawingml/2006/diagram" xmlns:a="http://schemas.openxmlformats.org/drawingml/2006/main" uniqueId="urn:microsoft.com/office/officeart/2005/8/layout/pyramid1">
+  <dgm:title val=""/>
+  <dgm:desc val=""/>
+  <dgm:catLst>
+    <dgm:cat type="pyramid" pri="1000"/>
+  </dgm:catLst>
+  <dgm:sampData useDef="1">
+    <dgm:dataModel>
+      <dgm:ptLst/>
+      <dgm:bg/>
+      <dgm:whole/>
+    </dgm:dataModel>
+  </dgm:sampData>
+  <dgm:styleData>
+    <dgm:dataModel>
+      <dgm:ptLst>
+        <dgm:pt modelId="0" type="doc"/>
+        <dgm:pt modelId="1"/>
+        <dgm:pt modelId="2"/>
+      </dgm:ptLst>
+      <dgm:cxnLst>
+        <dgm:cxn modelId="3" srcId="0" destId="1" srcOrd="0" destOrd="0"/>
+        <dgm:cxn modelId="4" srcId="0" destId="2" srcOrd="1" destOrd="0"/>
+      </dgm:cxnLst>
+      <dgm:bg/>
+      <dgm:whole/>
+    </dgm:dataModel>
+  </dgm:styleData>
+  <dgm:clrData>
+    <dgm:dataModel>
+      <dgm:ptLst>
+        <dgm:pt modelId="0" type="doc"/>
+        <dgm:pt modelId="1"/>
+        <dgm:pt modelId="2"/>
+        <dgm:pt modelId="3"/>
+        <dgm:pt modelId="4"/>
+      </dgm:ptLst>
+      <dgm:cxnLst>
+        <dgm:cxn modelId="5" srcId="0" destId="1" srcOrd="0" destOrd="0"/>
+        <dgm:cxn modelId="6" srcId="0" destId="2" srcOrd="1" destOrd="0"/>
+        <dgm:cxn modelId="7" srcId="0" destId="3" srcOrd="2" destOrd="0"/>
+        <dgm:cxn modelId="8" srcId="0" destId="4" srcOrd="3" destOrd="0"/>
+      </dgm:cxnLst>
+      <dgm:bg/>
+      <dgm:whole/>
+    </dgm:dataModel>
+  </dgm:clrData>
+  <dgm:layoutNode name="Name0">
+    <dgm:varLst>
+      <dgm:dir/>
+      <dgm:animLvl val="lvl"/>
+      <dgm:resizeHandles val="exact"/>
+    </dgm:varLst>
+    <dgm:choose name="Name1">
+      <dgm:if name="Name2" func="var" arg="dir" op="equ" val="norm">
+        <dgm:alg type="pyra">
+          <dgm:param type="linDir" val="fromB"/>
+          <dgm:param type="txDir" val="fromT"/>
+          <dgm:param type="pyraAcctPos" val="aft"/>
+          <dgm:param type="pyraAcctTxMar" val="step"/>
+          <dgm:param type="pyraAcctBkgdNode" val="acctBkgd"/>
+          <dgm:param type="pyraAcctTxNode" val="acctTx"/>
+          <dgm:param type="pyraLvlNode" val="level"/>
+        </dgm:alg>
+      </dgm:if>
+      <dgm:else name="Name3">
+        <dgm:alg type="pyra">
+          <dgm:param type="linDir" val="fromB"/>
+          <dgm:param type="txDir" val="fromT"/>
+          <dgm:param type="pyraAcctPos" val="bef"/>
+          <dgm:param type="pyraAcctTxMar" val="step"/>
+          <dgm:param type="pyraAcctBkgdNode" val="acctBkgd"/>
+          <dgm:param type="pyraAcctTxNode" val="acctTx"/>
+          <dgm:param type="pyraLvlNode" val="level"/>
+        </dgm:alg>
+      </dgm:else>
+    </dgm:choose>
+    <dgm:shape xmlns:r="http://schemas.openxmlformats.org/officeDocument/2006/relationships" r:blip="">
+      <dgm:adjLst/>
+    </dgm:shape>
+    <dgm:presOf/>
+    <dgm:choose name="Name4">
+      <dgm:if name="Name5" axis="root des" ptType="all node" func="maxDepth" op="gte" val="2">
+        <dgm:constrLst>
+          <dgm:constr type="primFontSz" for="des" forName="levelTx" op="equ"/>
+          <dgm:constr type="secFontSz" for="des" forName="acctTx" op="equ"/>
+          <dgm:constr type="pyraAcctRatio" val="0.32"/>
+        </dgm:constrLst>
+      </dgm:if>
+      <dgm:else name="Name6">
+        <dgm:constrLst>
+          <dgm:constr type="primFontSz" for="des" forName="levelTx" op="equ"/>
+          <dgm:constr type="secFontSz" for="des" forName="acctTx" op="equ"/>
+          <dgm:constr type="pyraAcctRatio"/>
+        </dgm:constrLst>
+      </dgm:else>
+    </dgm:choose>
+    <dgm:ruleLst/>
+    <dgm:forEach name="Name7" axis="ch" ptType="node">
+      <dgm:layoutNode name="Name8">
+        <dgm:alg type="composite">
+          <dgm:param type="horzAlign" val="none"/>
+        </dgm:alg>
+        <dgm:shape xmlns:r="http://schemas.openxmlformats.org/officeDocument/2006/relationships" r:blip="">
+          <dgm:adjLst/>
+        </dgm:shape>
+        <dgm:presOf/>
+        <dgm:choose name="Name9">
+          <dgm:if name="Name10" axis="self" ptType="node" func="pos" op="equ" val="1">
+            <dgm:constrLst>
+              <dgm:constr type="ctrX" for="ch" forName="acctBkgd" val="1"/>
+              <dgm:constr type="ctrY" for="ch" forName="acctBkgd" val="1"/>
+              <dgm:constr type="w" for="ch" forName="acctBkgd" val="1"/>
+              <dgm:constr type="h" for="ch" forName="acctBkgd" val="1"/>
+              <dgm:constr type="ctrX" for="ch" forName="acctTx" val="1"/>
+              <dgm:constr type="ctrY" for="ch" forName="acctTx" val="1"/>
+              <dgm:constr type="w" for="ch" forName="acctTx" val="1"/>
+              <dgm:constr type="h" for="ch" forName="acctTx" val="1"/>
+              <dgm:constr type="ctrX" for="ch" forName="level" val="1"/>
+              <dgm:constr type="ctrY" for="ch" forName="level" val="1"/>
+              <dgm:constr type="w" for="ch" forName="level" val="1"/>
+              <dgm:constr type="h" for="ch" forName="level" val="1"/>
+              <dgm:constr type="ctrX" for="ch" forName="levelTx" refType="ctrX" refFor="ch" refForName="level"/>
+              <dgm:constr type="ctrY" for="ch" forName="levelTx" refType="ctrY" refFor="ch" refForName="level"/>
+              <dgm:constr type="w" for="ch" forName="levelTx" refType="w" refFor="ch" refForName="level"/>
+              <dgm:constr type="h" for="ch" forName="levelTx" refType="h" refFor="ch" refForName="level"/>
+            </dgm:constrLst>
+          </dgm:if>
+          <dgm:else name="Name11">
+            <dgm:constrLst>
+              <dgm:constr type="ctrX" for="ch" forName="acctBkgd" val="1"/>
+              <dgm:constr type="ctrY" for="ch" forName="acctBkgd" val="1"/>
+              <dgm:constr type="w" for="ch" forName="acctBkgd" val="1"/>
+              <dgm:constr type="h" for="ch" forName="acctBkgd" val="1"/>
+              <dgm:constr type="ctrX" for="ch" forName="acctTx" val="1"/>
+              <dgm:constr type="ctrY" for="ch" forName="acctTx" val="1"/>
+              <dgm:constr type="w" for="ch" forName="acctTx" val="1"/>
+              <dgm:constr type="h" for="ch" forName="acctTx" val="1"/>
+              <dgm:constr type="ctrX" for="ch" forName="level" val="1"/>
+              <dgm:constr type="ctrY" for="ch" forName="level" val="1"/>
+              <dgm:constr type="w" for="ch" forName="level" val="1"/>
+              <dgm:constr type="h" for="ch" forName="level" val="1"/>
+              <dgm:constr type="ctrX" for="ch" forName="levelTx" refType="ctrX" refFor="ch" refForName="level"/>
+              <dgm:constr type="ctrY" for="ch" forName="levelTx" refType="ctrY" refFor="ch" refForName="level"/>
+              <dgm:constr type="w" for="ch" forName="levelTx" refType="w" refFor="ch" refForName="level" fact="0.65"/>
+              <dgm:constr type="h" for="ch" forName="levelTx" refType="h" refFor="ch" refForName="level"/>
+            </dgm:constrLst>
+          </dgm:else>
+        </dgm:choose>
+        <dgm:ruleLst/>
+        <dgm:choose name="Name12">
+          <dgm:if name="Name13" axis="ch" ptType="node" func="cnt" op="gte" val="1">
+            <dgm:layoutNode name="acctBkgd" styleLbl="alignAcc1">
+              <dgm:alg type="sp"/>
+              <dgm:shape xmlns:r="http://schemas.openxmlformats.org/officeDocument/2006/relationships" type="nonIsoscelesTrapezoid" r:blip="">
+                <dgm:adjLst/>
+              </dgm:shape>
+              <dgm:presOf axis="des" ptType="node"/>
+              <dgm:constrLst/>
+              <dgm:ruleLst/>
+            </dgm:layoutNode>
+            <dgm:layoutNode name="acctTx" styleLbl="alignAcc1">
+              <dgm:varLst>
+                <dgm:bulletEnabled val="1"/>
+              </dgm:varLst>
+              <dgm:alg type="tx">
+                <dgm:param type="stBulletLvl" val="1"/>
+                <dgm:param type="txAnchorVertCh" val="mid"/>
+              </dgm:alg>
+              <dgm:shape xmlns:r="http://schemas.openxmlformats.org/officeDocument/2006/relationships" type="nonIsoscelesTrapezoid" r:blip="" hideGeom="1">
+                <dgm:adjLst/>
+              </dgm:shape>
+              <dgm:presOf axis="des" ptType="node"/>
+              <dgm:constrLst>
+                <dgm:constr type="secFontSz" val="65"/>
+                <dgm:constr type="primFontSz" refType="secFontSz"/>
+                <dgm:constr type="tMarg" refType="secFontSz" fact="0.3"/>
+                <dgm:constr type="bMarg" refType="secFontSz" fact="0.3"/>
+                <dgm:constr type="lMarg" refType="secFontSz" fact="0.3"/>
+                <dgm:constr type="rMarg" refType="secFontSz" fact="0.3"/>
+              </dgm:constrLst>
+              <dgm:ruleLst>
+                <dgm:rule type="secFontSz" val="5" fact="NaN" max="NaN"/>
+              </dgm:ruleLst>
+            </dgm:layoutNode>
+          </dgm:if>
+          <dgm:else name="Name14"/>
+        </dgm:choose>
+        <dgm:layoutNode name="level">
+          <dgm:varLst>
+            <dgm:chMax val="1"/>
+            <dgm:bulletEnabled val="1"/>
+          </dgm:varLst>
+          <dgm:alg type="sp"/>
+          <dgm:shape xmlns:r="http://schemas.openxmlformats.org/officeDocument/2006/relationships" type="trapezoid" r:blip="">
+            <dgm:adjLst/>
+          </dgm:shape>
+          <dgm:presOf axis="self"/>
+          <dgm:constrLst>
+            <dgm:constr type="h" val="500"/>
+            <dgm:constr type="w" val="1"/>
+          </dgm:constrLst>
+          <dgm:ruleLst/>
+        </dgm:layoutNode>
+        <dgm:layoutNode name="levelTx" styleLbl="revTx">
+          <dgm:varLst>
+            <dgm:chMax val="1"/>
+            <dgm:bulletEnabled val="1"/>
+          </dgm:varLst>
+          <dgm:alg type="tx"/>
+          <dgm:shape xmlns:r="http://schemas.openxmlformats.org/officeDocument/2006/relationships" type="rect" r:blip="" hideGeom="1">
+            <dgm:adjLst/>
+          </dgm:shape>
+          <dgm:presOf axis="self"/>
+          <dgm:constrLst>
+            <dgm:constr type="tMarg" refType="primFontSz" fact="0.1"/>
+            <dgm:constr type="bMarg" refType="primFontSz" fact="0.1"/>
+            <dgm:constr type="lMarg" refType="primFontSz" fact="0.1"/>
+            <dgm:constr type="rMarg" refType="primFontSz" fact="0.1"/>
+            <dgm:constr type="primFontSz" val="65"/>
+          </dgm:constrLst>
+          <dgm:ruleLst>
+            <dgm:rule type="primFontSz" val="5" fact="NaN" max="NaN"/>
+          </dgm:ruleLst>
+        </dgm:layoutNode>
+      </dgm:layoutNode>
+    </dgm:forEach>
+  </dgm:layoutNode>
+</dgm:layoutDef>
+</file>
+
+<file path=ppt/diagrams/quickStyle1.xml><?xml version="1.0" encoding="utf-8"?>
+<dgm:styleDef xmlns:dgm="http://schemas.openxmlformats.org/drawingml/2006/diagram" xmlns:a="http://schemas.openxmlformats.org/drawingml/2006/main" uniqueId="urn:microsoft.com/office/officeart/2005/8/quickstyle/simple1">
+  <dgm:title val=""/>
+  <dgm:desc val=""/>
+  <dgm:catLst>
+    <dgm:cat type="simple" pri="10100"/>
+  </dgm:catLst>
+  <dgm:scene3d>
+    <a:camera prst="orthographicFront"/>
+    <a:lightRig rig="threePt" dir="t"/>
+  </dgm:scene3d>
+  <dgm:styleLbl name="node0">
+    <dgm:scene3d>
+      <a:camera prst="orthographicFront"/>
+      <a:lightRig rig="threePt" dir="t"/>
+    </dgm:scene3d>
+    <dgm:sp3d/>
+    <dgm:txPr/>
+    <dgm:style>
+      <a:lnRef idx="2">
+        <a:scrgbClr r="0" g="0" b="0"/>
+      </a:lnRef>
+      <a:fillRef idx="1">
+        <a:scrgbClr r="0" g="0" b="0"/>
+      </a:fillRef>
+      <a:effectRef idx="0">
+        <a:scrgbClr r="0" g="0" b="0"/>
+      </a:effectRef>
+      <a:fontRef idx="minor">
+        <a:schemeClr val="lt1"/>
+      </a:fontRef>
+    </dgm:style>
+  </dgm:styleLbl>
+  <dgm:styleLbl name="lnNode1">
+    <dgm:scene3d>
+      <a:camera prst="orthographicFront"/>
+      <a:lightRig rig="threePt" dir="t"/>
+    </dgm:scene3d>
+    <dgm:sp3d/>
+    <dgm:txPr/>
+    <dgm:style>
+      <a:lnRef idx="2">
+        <a:scrgbClr r="0" g="0" b="0"/>
+      </a:lnRef>
+      <a:fillRef idx="1">
+        <a:scrgbClr r="0" g="0" b="0"/>
+      </a:fillRef>
+      <a:effectRef idx="0">
+        <a:scrgbClr r="0" g="0" b="0"/>
+      </a:effectRef>
+      <a:fontRef idx="minor">
+        <a:schemeClr val="lt1"/>
+      </a:fontRef>
+    </dgm:style>
+  </dgm:styleLbl>
+  <dgm:styleLbl name="vennNode1">
+    <dgm:scene3d>
+      <a:camera prst="orthographicFront"/>
+      <a:lightRig rig="threePt" dir="t"/>
+    </dgm:scene3d>
+    <dgm:sp3d/>
+    <dgm:txPr/>
+    <dgm:style>
+      <a:lnRef idx="2">
+        <a:scrgbClr r="0" g="0" b="0"/>
+      </a:lnRef>
+      <a:fillRef idx="1">
+        <a:scrgbClr r="0" g="0" b="0"/>
+      </a:fillRef>
+      <a:effectRef idx="0">
+        <a:scrgbClr r="0" g="0" b="0"/>
+      </a:effectRef>
+      <a:fontRef idx="minor">
+        <a:schemeClr val="tx1"/>
+      </a:fontRef>
+    </dgm:style>
+  </dgm:styleLbl>
+  <dgm:styleLbl name="alignNode1">
+    <dgm:scene3d>
+      <a:camera prst="orthographicFront"/>
+      <a:lightRig rig="threePt" dir="t"/>
+    </dgm:scene3d>
+    <dgm:sp3d/>
+    <dgm:txPr/>
+    <dgm:style>
+      <a:lnRef idx="2">
+        <a:scrgbClr r="0" g="0" b="0"/>
+      </a:lnRef>
+      <a:fillRef idx="1">
+        <a:scrgbClr r="0" g="0" b="0"/>
+      </a:fillRef>
+      <a:effectRef idx="0">
+        <a:scrgbClr r="0" g="0" b="0"/>
+      </a:effectRef>
+      <a:fontRef idx="minor">
+        <a:schemeClr val="lt1"/>
+      </a:fontRef>
+    </dgm:style>
+  </dgm:styleLbl>
+  <dgm:styleLbl name="node1">
+    <dgm:scene3d>
+      <a:camera prst="orthographicFront"/>
+      <a:lightRig rig="threePt" dir="t"/>
+    </dgm:scene3d>
+    <dgm:sp3d/>
+    <dgm:txPr/>
+    <dgm:style>
+      <a:lnRef idx="2">
+        <a:scrgbClr r="0" g="0" b="0"/>
+      </a:lnRef>
+      <a:fillRef idx="1">
+        <a:scrgbClr r="0" g="0" b="0"/>
+      </a:fillRef>
+      <a:effectRef idx="0">
+        <a:scrgbClr r="0" g="0" b="0"/>
+      </a:effectRef>
+      <a:fontRef idx="minor">
+        <a:schemeClr val="lt1"/>
+      </a:fontRef>
+    </dgm:style>
+  </dgm:styleLbl>
+  <dgm:styleLbl name="node2">
+    <dgm:scene3d>
+      <a:camera prst="orthographicFront"/>
+      <a:lightRig rig="threePt" dir="t"/>
+    </dgm:scene3d>
+    <dgm:sp3d/>
+    <dgm:txPr/>
+    <dgm:style>
+      <a:lnRef idx="2">
+        <a:scrgbClr r="0" g="0" b="0"/>
+      </a:lnRef>
+      <a:fillRef idx="1">
+        <a:scrgbClr r="0" g="0" b="0"/>
+      </a:fillRef>
+      <a:effectRef idx="0">
+        <a:scrgbClr r="0" g="0" b="0"/>
+      </a:effectRef>
+      <a:fontRef idx="minor">
+        <a:schemeClr val="lt1"/>
+      </a:fontRef>
+    </dgm:style>
+  </dgm:styleLbl>
+  <dgm:styleLbl name="node3">
+    <dgm:scene3d>
+      <a:camera prst="orthographicFront"/>
+      <a:lightRig rig="threePt" dir="t"/>
+    </dgm:scene3d>
+    <dgm:sp3d/>
+    <dgm:txPr/>
+    <dgm:style>
+      <a:lnRef idx="2">
+        <a:scrgbClr r="0" g="0" b="0"/>
+      </a:lnRef>
+      <a:fillRef idx="1">
+        <a:scrgbClr r="0" g="0" b="0"/>
+      </a:fillRef>
+      <a:effectRef idx="0">
+        <a:scrgbClr r="0" g="0" b="0"/>
+      </a:effectRef>
+      <a:fontRef idx="minor">
+        <a:schemeClr val="lt1"/>
+      </a:fontRef>
+    </dgm:style>
+  </dgm:styleLbl>
+  <dgm:styleLbl name="node4">
+    <dgm:scene3d>
+      <a:camera prst="orthographicFront"/>
+      <a:lightRig rig="threePt" dir="t"/>
+    </dgm:scene3d>
+    <dgm:sp3d/>
+    <dgm:txPr/>
+    <dgm:style>
+      <a:lnRef idx="2">
+        <a:scrgbClr r="0" g="0" b="0"/>
+      </a:lnRef>
+      <a:fillRef idx="1">
+        <a:scrgbClr r="0" g="0" b="0"/>
+      </a:fillRef>
+      <a:effectRef idx="0">
+        <a:scrgbClr r="0" g="0" b="0"/>
+      </a:effectRef>
+      <a:fontRef idx="minor">
+        <a:schemeClr val="lt1"/>
+      </a:fontRef>
+    </dgm:style>
+  </dgm:styleLbl>
+  <dgm:styleLbl name="fgImgPlace1">
+    <dgm:scene3d>
+      <a:camera prst="orthographicFront"/>
+      <a:lightRig rig="threePt" dir="t"/>
+    </dgm:scene3d>
+    <dgm:sp3d/>
+    <dgm:txPr/>
+    <dgm:style>
+      <a:lnRef idx="2">
+        <a:scrgbClr r="0" g="0" b="0"/>
+      </a:lnRef>
+      <a:fillRef idx="1">
+        <a:scrgbClr r="0" g="0" b="0"/>
+      </a:fillRef>
+      <a:effectRef idx="0">
+        <a:scrgbClr r="0" g="0" b="0"/>
+      </a:effectRef>
+      <a:fontRef idx="minor"/>
+    </dgm:style>
+  </dgm:styleLbl>
+  <dgm:styleLbl name="alignImgPlace1">
+    <dgm:scene3d>
+      <a:camera prst="orthographicFront"/>
+      <a:lightRig rig="threePt" dir="t"/>
+    </dgm:scene3d>
+    <dgm:sp3d/>
+    <dgm:txPr/>
+    <dgm:style>
+      <a:lnRef idx="2">
+        <a:scrgbClr r="0" g="0" b="0"/>
+      </a:lnRef>
+      <a:fillRef idx="1">
+        <a:scrgbClr r="0" g="0" b="0"/>
+      </a:fillRef>
+      <a:effectRef idx="0">
+        <a:scrgbClr r="0" g="0" b="0"/>
+      </a:effectRef>
+      <a:fontRef idx="minor"/>
+    </dgm:style>
+  </dgm:styleLbl>
+  <dgm:styleLbl name="bgImgPlace1">
+    <dgm:scene3d>
+      <a:camera prst="orthographicFront"/>
+      <a:lightRig rig="threePt" dir="t"/>
+    </dgm:scene3d>
+    <dgm:sp3d/>
+    <dgm:txPr/>
+    <dgm:style>
+      <a:lnRef idx="2">
+        <a:scrgbClr r="0" g="0" b="0"/>
+      </a:lnRef>
+      <a:fillRef idx="1">
+        <a:scrgbClr r="0" g="0" b="0"/>
+      </a:fillRef>
+      <a:effectRef idx="0">
+        <a:scrgbClr r="0" g="0" b="0"/>
+      </a:effectRef>
+      <a:fontRef idx="minor"/>
+    </dgm:style>
+  </dgm:styleLbl>
+  <dgm:styleLbl name="sibTrans2D1">
+    <dgm:scene3d>
+      <a:camera prst="orthographicFront"/>
+      <a:lightRig rig="threePt" dir="t"/>
+    </dgm:scene3d>
+    <dgm:sp3d/>
+    <dgm:txPr/>
+    <dgm:style>
+      <a:lnRef idx="0">
+        <a:scrgbClr r="0" g="0" b="0"/>
+      </a:lnRef>
+      <a:fillRef idx="1">
+        <a:scrgbClr r="0" g="0" b="0"/>
+      </a:fillRef>
+      <a:effectRef idx="0">
+        <a:scrgbClr r="0" g="0" b="0"/>
+      </a:effectRef>
+      <a:fontRef idx="minor">
+        <a:schemeClr val="lt1"/>
+      </a:fontRef>
+    </dgm:style>
+  </dgm:styleLbl>
+  <dgm:styleLbl name="fgSibTrans2D1">
+    <dgm:scene3d>
+      <a:camera prst="orthographicFront"/>
+      <a:lightRig rig="threePt" dir="t"/>
+    </dgm:scene3d>
+    <dgm:sp3d/>
+    <dgm:txPr/>
+    <dgm:style>
+      <a:lnRef idx="0">
+        <a:scrgbClr r="0" g="0" b="0"/>
+      </a:lnRef>
+      <a:fillRef idx="1">
+        <a:scrgbClr r="0" g="0" b="0"/>
+      </a:fillRef>
+      <a:effectRef idx="0">
+        <a:scrgbClr r="0" g="0" b="0"/>
+      </a:effectRef>
+      <a:fontRef idx="minor">
+        <a:schemeClr val="lt1"/>
+      </a:fontRef>
+    </dgm:style>
+  </dgm:styleLbl>
+  <dgm:styleLbl name="bgSibTrans2D1">
+    <dgm:scene3d>
+      <a:camera prst="orthographicFront"/>
+      <a:lightRig rig="threePt" dir="t"/>
+    </dgm:scene3d>
+    <dgm:sp3d/>
+    <dgm:txPr/>
+    <dgm:style>
+      <a:lnRef idx="0">
+        <a:scrgbClr r="0" g="0" b="0"/>
+      </a:lnRef>
+      <a:fillRef idx="1">
+        <a:scrgbClr r="0" g="0" b="0"/>
+      </a:fillRef>
+      <a:effectRef idx="0">
+        <a:scrgbClr r="0" g="0" b="0"/>
+      </a:effectRef>
+      <a:fontRef idx="minor">
+        <a:schemeClr val="lt1"/>
+      </a:fontRef>
+    </dgm:style>
+  </dgm:styleLbl>
+  <dgm:styleLbl name="sibTrans1D1">
+    <dgm:scene3d>
+      <a:camera prst="orthographicFront"/>
+      <a:lightRig rig="threePt" dir="t"/>
+    </dgm:scene3d>
+    <dgm:sp3d/>
+    <dgm:txPr/>
+    <dgm:style>
+      <a:lnRef idx="1">
+        <a:scrgbClr r="0" g="0" b="0"/>
+      </a:lnRef>
+      <a:fillRef idx="0">
+        <a:scrgbClr r="0" g="0" b="0"/>
+      </a:fillRef>
+      <a:effectRef idx="0">
+        <a:scrgbClr r="0" g="0" b="0"/>
+      </a:effectRef>
+      <a:fontRef idx="minor"/>
+    </dgm:style>
+  </dgm:styleLbl>
+  <dgm:styleLbl name="callout">
+    <dgm:scene3d>
+      <a:camera prst="orthographicFront"/>
+      <a:lightRig rig="threePt" dir="t"/>
+    </dgm:scene3d>
+    <dgm:sp3d/>
+    <dgm:txPr/>
+    <dgm:style>
+      <a:lnRef idx="2">
+        <a:scrgbClr r="0" g="0" b="0"/>
+      </a:lnRef>
+      <a:fillRef idx="1">
+        <a:scrgbClr r="0" g="0" b="0"/>
+      </a:fillRef>
+      <a:effectRef idx="0">
+        <a:scrgbClr r="0" g="0" b="0"/>
+      </a:effectRef>
+      <a:fontRef idx="minor"/>
+    </dgm:style>
+  </dgm:styleLbl>
+  <dgm:styleLbl name="asst0">
+    <dgm:scene3d>
+      <a:camera prst="orthographicFront"/>
+      <a:lightRig rig="threePt" dir="t"/>
+    </dgm:scene3d>
+    <dgm:sp3d/>
+    <dgm:txPr/>
+    <dgm:style>
+      <a:lnRef idx="2">
+        <a:scrgbClr r="0" g="0" b="0"/>
+      </a:lnRef>
+      <a:fillRef idx="1">
+        <a:scrgbClr r="0" g="0" b="0"/>
+      </a:fillRef>
+      <a:effectRef idx="0">
+        <a:scrgbClr r="0" g="0" b="0"/>
+      </a:effectRef>
+      <a:fontRef idx="minor">
+        <a:schemeClr val="lt1"/>
+      </a:fontRef>
+    </dgm:style>
+  </dgm:styleLbl>
+  <dgm:styleLbl name="asst1">
+    <dgm:scene3d>
+      <a:camera prst="orthographicFront"/>
+      <a:lightRig rig="threePt" dir="t"/>
+    </dgm:scene3d>
+    <dgm:sp3d/>
+    <dgm:txPr/>
+    <dgm:style>
+      <a:lnRef idx="2">
+        <a:scrgbClr r="0" g="0" b="0"/>
+      </a:lnRef>
+      <a:fillRef idx="1">
+        <a:scrgbClr r="0" g="0" b="0"/>
+      </a:fillRef>
+      <a:effectRef idx="0">
+        <a:scrgbClr r="0" g="0" b="0"/>
+      </a:effectRef>
+      <a:fontRef idx="minor">
+        <a:schemeClr val="lt1"/>
+      </a:fontRef>
+    </dgm:style>
+  </dgm:styleLbl>
+  <dgm:styleLbl name="asst2">
+    <dgm:scene3d>
+      <a:camera prst="orthographicFront"/>
+      <a:lightRig rig="threePt" dir="t"/>
+    </dgm:scene3d>
+    <dgm:sp3d/>
+    <dgm:txPr/>
+    <dgm:style>
+      <a:lnRef idx="2">
+        <a:scrgbClr r="0" g="0" b="0"/>
+      </a:lnRef>
+      <a:fillRef idx="1">
+        <a:scrgbClr r="0" g="0" b="0"/>
+      </a:fillRef>
+      <a:effectRef idx="0">
+        <a:scrgbClr r="0" g="0" b="0"/>
+      </a:effectRef>
+      <a:fontRef idx="minor">
+        <a:schemeClr val="lt1"/>
+      </a:fontRef>
+    </dgm:style>
+  </dgm:styleLbl>
+  <dgm:styleLbl name="asst3">
+    <dgm:scene3d>
+      <a:camera prst="orthographicFront"/>
+      <a:lightRig rig="threePt" dir="t"/>
+    </dgm:scene3d>
+    <dgm:sp3d/>
+    <dgm:txPr/>
+    <dgm:style>
+      <a:lnRef idx="2">
+        <a:scrgbClr r="0" g="0" b="0"/>
+      </a:lnRef>
+      <a:fillRef idx="1">
+        <a:scrgbClr r="0" g="0" b="0"/>
+      </a:fillRef>
+      <a:effectRef idx="0">
+        <a:scrgbClr r="0" g="0" b="0"/>
+      </a:effectRef>
+      <a:fontRef idx="minor">
+        <a:schemeClr val="lt1"/>
+      </a:fontRef>
+    </dgm:style>
+  </dgm:styleLbl>
+  <dgm:styleLbl name="asst4">
+    <dgm:scene3d>
+      <a:camera prst="orthographicFront"/>
+      <a:lightRig rig="threePt" dir="t"/>
+    </dgm:scene3d>
+    <dgm:sp3d/>
+    <dgm:txPr/>
+    <dgm:style>
+      <a:lnRef idx="2">
+        <a:scrgbClr r="0" g="0" b="0"/>
+      </a:lnRef>
+      <a:fillRef idx="1">
+        <a:scrgbClr r="0" g="0" b="0"/>
+      </a:fillRef>
+      <a:effectRef idx="0">
+        <a:scrgbClr r="0" g="0" b="0"/>
+      </a:effectRef>
+      <a:fontRef idx="minor">
+        <a:schemeClr val="lt1"/>
+      </a:fontRef>
+    </dgm:style>
+  </dgm:styleLbl>
+  <dgm:styleLbl name="parChTrans2D1">
+    <dgm:scene3d>
+      <a:camera prst="orthographicFront"/>
+      <a:lightRig rig="threePt" dir="t"/>
+    </dgm:scene3d>
+    <dgm:sp3d/>
+    <dgm:txPr/>
+    <dgm:style>
+      <a:lnRef idx="2">
+        <a:scrgbClr r="0" g="0" b="0"/>
+      </a:lnRef>
+      <a:fillRef idx="1">
+        <a:scrgbClr r="0" g="0" b="0"/>
+      </a:fillRef>
+      <a:effectRef idx="0">
+        <a:scrgbClr r="0" g="0" b="0"/>
+      </a:effectRef>
+      <a:fontRef idx="minor">
+        <a:schemeClr val="lt1"/>
+      </a:fontRef>
+    </dgm:style>
+  </dgm:styleLbl>
+  <dgm:styleLbl name="parChTrans2D2">
+    <dgm:scene3d>
+      <a:camera prst="orthographicFront"/>
+      <a:lightRig rig="threePt" dir="t"/>
+    </dgm:scene3d>
+    <dgm:sp3d/>
+    <dgm:txPr/>
+    <dgm:style>
+      <a:lnRef idx="2">
+        <a:scrgbClr r="0" g="0" b="0"/>
+      </a:lnRef>
+      <a:fillRef idx="1">
+        <a:scrgbClr r="0" g="0" b="0"/>
+      </a:fillRef>
+      <a:effectRef idx="0">
+        <a:scrgbClr r="0" g="0" b="0"/>
+      </a:effectRef>
+      <a:fontRef idx="minor">
+        <a:schemeClr val="lt1"/>
+      </a:fontRef>
+    </dgm:style>
+  </dgm:styleLbl>
+  <dgm:styleLbl name="parChTrans2D3">
+    <dgm:scene3d>
+      <a:camera prst="orthographicFront"/>
+      <a:lightRig rig="threePt" dir="t"/>
+    </dgm:scene3d>
+    <dgm:sp3d/>
+    <dgm:txPr/>
+    <dgm:style>
+      <a:lnRef idx="2">
+        <a:scrgbClr r="0" g="0" b="0"/>
+      </a:lnRef>
+      <a:fillRef idx="1">
+        <a:scrgbClr r="0" g="0" b="0"/>
+      </a:fillRef>
+      <a:effectRef idx="0">
+        <a:scrgbClr r="0" g="0" b="0"/>
+      </a:effectRef>
+      <a:fontRef idx="minor">
+        <a:schemeClr val="lt1"/>
+      </a:fontRef>
+    </dgm:style>
+  </dgm:styleLbl>
+  <dgm:styleLbl name="parChTrans2D4">
+    <dgm:scene3d>
+      <a:camera prst="orthographicFront"/>
+      <a:lightRig rig="threePt" dir="t"/>
+    </dgm:scene3d>
+    <dgm:sp3d/>
+    <dgm:txPr/>
+    <dgm:style>
+      <a:lnRef idx="2">
+        <a:scrgbClr r="0" g="0" b="0"/>
+      </a:lnRef>
+      <a:fillRef idx="1">
+        <a:scrgbClr r="0" g="0" b="0"/>
+      </a:fillRef>
+      <a:effectRef idx="0">
+        <a:scrgbClr r="0" g="0" b="0"/>
+      </a:effectRef>
+      <a:fontRef idx="minor">
+        <a:schemeClr val="lt1"/>
+      </a:fontRef>
+    </dgm:style>
+  </dgm:styleLbl>
+  <dgm:styleLbl name="parChTrans1D1">
+    <dgm:scene3d>
+      <a:camera prst="orthographicFront"/>
+      <a:lightRig rig="threePt" dir="t"/>
+    </dgm:scene3d>
+    <dgm:sp3d/>
+    <dgm:txPr/>
+    <dgm:style>
+      <a:lnRef idx="2">
+        <a:scrgbClr r="0" g="0" b="0"/>
+      </a:lnRef>
+      <a:fillRef idx="0">
+        <a:scrgbClr r="0" g="0" b="0"/>
+      </a:fillRef>
+      <a:effectRef idx="0">
+        <a:scrgbClr r="0" g="0" b="0"/>
+      </a:effectRef>
+      <a:fontRef idx="minor"/>
+    </dgm:style>
+  </dgm:styleLbl>
+  <dgm:styleLbl name="parChTrans1D2">
+    <dgm:scene3d>
+      <a:camera prst="orthographicFront"/>
+      <a:lightRig rig="threePt" dir="t"/>
+    </dgm:scene3d>
+    <dgm:sp3d/>
+    <dgm:txPr/>
+    <dgm:style>
+      <a:lnRef idx="2">
+        <a:scrgbClr r="0" g="0" b="0"/>
+      </a:lnRef>
+      <a:fillRef idx="0">
+        <a:scrgbClr r="0" g="0" b="0"/>
+      </a:fillRef>
+      <a:effectRef idx="0">
+        <a:scrgbClr r="0" g="0" b="0"/>
+      </a:effectRef>
+      <a:fontRef idx="minor"/>
+    </dgm:style>
+  </dgm:styleLbl>
+  <dgm:styleLbl name="parChTrans1D3">
+    <dgm:scene3d>
+      <a:camera prst="orthographicFront"/>
+      <a:lightRig rig="threePt" dir="t"/>
+    </dgm:scene3d>
+    <dgm:sp3d/>
+    <dgm:txPr/>
+    <dgm:style>
+      <a:lnRef idx="2">
+        <a:scrgbClr r="0" g="0" b="0"/>
+      </a:lnRef>
+      <a:fillRef idx="0">
+        <a:scrgbClr r="0" g="0" b="0"/>
+      </a:fillRef>
+      <a:effectRef idx="0">
+        <a:scrgbClr r="0" g="0" b="0"/>
+      </a:effectRef>
+      <a:fontRef idx="minor"/>
+    </dgm:style>
+  </dgm:styleLbl>
+  <dgm:styleLbl name="parChTrans1D4">
+    <dgm:scene3d>
+      <a:camera prst="orthographicFront"/>
+      <a:lightRig rig="threePt" dir="t"/>
+    </dgm:scene3d>
+    <dgm:sp3d/>
+    <dgm:txPr/>
+    <dgm:style>
+      <a:lnRef idx="2">
+        <a:scrgbClr r="0" g="0" b="0"/>
+      </a:lnRef>
+      <a:fillRef idx="0">
+        <a:scrgbClr r="0" g="0" b="0"/>
+      </a:fillRef>
+      <a:effectRef idx="0">
+        <a:scrgbClr r="0" g="0" b="0"/>
+      </a:effectRef>
+      <a:fontRef idx="minor"/>
+    </dgm:style>
+  </dgm:styleLbl>
+  <dgm:styleLbl name="fgAcc1">
+    <dgm:scene3d>
+      <a:camera prst="orthographicFront"/>
+      <a:lightRig rig="threePt" dir="t"/>
+    </dgm:scene3d>
+    <dgm:sp3d/>
+    <dgm:txPr/>
+    <dgm:style>
+      <a:lnRef idx="2">
+        <a:scrgbClr r="0" g="0" b="0"/>
+      </a:lnRef>
+      <a:fillRef idx="1">
+        <a:scrgbClr r="0" g="0" b="0"/>
+      </a:fillRef>
+      <a:effectRef idx="0">
+        <a:scrgbClr r="0" g="0" b="0"/>
+      </a:effectRef>
+      <a:fontRef idx="minor"/>
+    </dgm:style>
+  </dgm:styleLbl>
+  <dgm:styleLbl name="conFgAcc1">
+    <dgm:scene3d>
+      <a:camera prst="orthographicFront"/>
+      <a:lightRig rig="threePt" dir="t"/>
+    </dgm:scene3d>
+    <dgm:sp3d/>
+    <dgm:txPr/>
+    <dgm:style>
+      <a:lnRef idx="2">
+        <a:scrgbClr r="0" g="0" b="0"/>
+      </a:lnRef>
+      <a:fillRef idx="1">
+        <a:scrgbClr r="0" g="0" b="0"/>
+      </a:fillRef>
+      <a:effectRef idx="0">
+        <a:scrgbClr r="0" g="0" b="0"/>
+      </a:effectRef>
+      <a:fontRef idx="minor"/>
+    </dgm:style>
+  </dgm:styleLbl>
+  <dgm:styleLbl name="alignAcc1">
+    <dgm:scene3d>
+      <a:camera prst="orthographicFront"/>
+      <a:lightRig rig="threePt" dir="t"/>
+    </dgm:scene3d>
+    <dgm:sp3d/>
+    <dgm:txPr/>
+    <dgm:style>
+      <a:lnRef idx="2">
+        <a:scrgbClr r="0" g="0" b="0"/>
+      </a:lnRef>
+      <a:fillRef idx="1">
+        <a:scrgbClr r="0" g="0" b="0"/>
+      </a:fillRef>
+      <a:effectRef idx="0">
+        <a:scrgbClr r="0" g="0" b="0"/>
+      </a:effectRef>
+      <a:fontRef idx="minor"/>
+    </dgm:style>
+  </dgm:styleLbl>
+  <dgm:styleLbl name="trAlignAcc1">
+    <dgm:scene3d>
+      <a:camera prst="orthographicFront"/>
+      <a:lightRig rig="threePt" dir="t"/>
+    </dgm:scene3d>
+    <dgm:sp3d/>
+    <dgm:txPr/>
+    <dgm:style>
+      <a:lnRef idx="1">
+        <a:scrgbClr r="0" g="0" b="0"/>
+      </a:lnRef>
+      <a:fillRef idx="1">
+        <a:scrgbClr r="0" g="0" b="0"/>
+      </a:fillRef>
+      <a:effectRef idx="0">
+        <a:scrgbClr r="0" g="0" b="0"/>
+      </a:effectRef>
+      <a:fontRef idx="minor"/>
+    </dgm:style>
+  </dgm:styleLbl>
+  <dgm:styleLbl name="bgAcc1">
+    <dgm:scene3d>
+      <a:camera prst="orthographicFront"/>
+      <a:lightRig rig="threePt" dir="t"/>
+    </dgm:scene3d>
+    <dgm:sp3d/>
+    <dgm:txPr/>
+    <dgm:style>
+      <a:lnRef idx="2">
+        <a:scrgbClr r="0" g="0" b="0"/>
+      </a:lnRef>
+      <a:fillRef idx="1">
+        <a:scrgbClr r="0" g="0" b="0"/>
+      </a:fillRef>
+      <a:effectRef idx="0">
+        <a:scrgbClr r="0" g="0" b="0"/>
+      </a:effectRef>
+      <a:fontRef idx="minor"/>
+    </dgm:style>
+  </dgm:styleLbl>
+  <dgm:styleLbl name="solidFgAcc1">
+    <dgm:scene3d>
+      <a:camera prst="orthographicFront"/>
+      <a:lightRig rig="threePt" dir="t"/>
+    </dgm:scene3d>
+    <dgm:sp3d/>
+    <dgm:txPr/>
+    <dgm:style>
+      <a:lnRef idx="2">
+        <a:scrgbClr r="0" g="0" b="0"/>
+      </a:lnRef>
+      <a:fillRef idx="1">
+        <a:scrgbClr r="0" g="0" b="0"/>
+      </a:fillRef>
+      <a:effectRef idx="0">
+        <a:scrgbClr r="0" g="0" b="0"/>
+      </a:effectRef>
+      <a:fontRef idx="minor"/>
+    </dgm:style>
+  </dgm:styleLbl>
+  <dgm:styleLbl name="solidAlignAcc1">
+    <dgm:scene3d>
+      <a:camera prst="orthographicFront"/>
+      <a:lightRig rig="threePt" dir="t"/>
+    </dgm:scene3d>
+    <dgm:sp3d/>
+    <dgm:txPr/>
+    <dgm:style>
+      <a:lnRef idx="2">
+        <a:scrgbClr r="0" g="0" b="0"/>
+      </a:lnRef>
+      <a:fillRef idx="1">
+        <a:scrgbClr r="0" g="0" b="0"/>
+      </a:fillRef>
+      <a:effectRef idx="0">
+        <a:scrgbClr r="0" g="0" b="0"/>
+      </a:effectRef>
+      <a:fontRef idx="minor"/>
+    </dgm:style>
+  </dgm:styleLbl>
+  <dgm:styleLbl name="solidBgAcc1">
+    <dgm:scene3d>
+      <a:camera prst="orthographicFront"/>
+      <a:lightRig rig="threePt" dir="t"/>
+    </dgm:scene3d>
+    <dgm:sp3d/>
+    <dgm:txPr/>
+    <dgm:style>
+      <a:lnRef idx="2">
+        <a:scrgbClr r="0" g="0" b="0"/>
+      </a:lnRef>
+      <a:fillRef idx="1">
+        <a:scrgbClr r="0" g="0" b="0"/>
+      </a:fillRef>
+      <a:effectRef idx="0">
+        <a:scrgbClr r="0" g="0" b="0"/>
+      </a:effectRef>
+      <a:fontRef idx="minor"/>
+    </dgm:style>
+  </dgm:styleLbl>
+  <dgm:styleLbl name="fgAccFollowNode1">
+    <dgm:scene3d>
+      <a:camera prst="orthographicFront"/>
+      <a:lightRig rig="threePt" dir="t"/>
+    </dgm:scene3d>
+    <dgm:sp3d/>
+    <dgm:txPr/>
+    <dgm:style>
+      <a:lnRef idx="2">
+        <a:scrgbClr r="0" g="0" b="0"/>
+      </a:lnRef>
+      <a:fillRef idx="1">
+        <a:scrgbClr r="0" g="0" b="0"/>
+      </a:fillRef>
+      <a:effectRef idx="0">
+        <a:scrgbClr r="0" g="0" b="0"/>
+      </a:effectRef>
+      <a:fontRef idx="minor"/>
+    </dgm:style>
+  </dgm:styleLbl>
+  <dgm:styleLbl name="alignAccFollowNode1">
+    <dgm:scene3d>
+      <a:camera prst="orthographicFront"/>
+      <a:lightRig rig="threePt" dir="t"/>
+    </dgm:scene3d>
+    <dgm:sp3d/>
+    <dgm:txPr/>
+    <dgm:style>
+      <a:lnRef idx="2">
+        <a:scrgbClr r="0" g="0" b="0"/>
+      </a:lnRef>
+      <a:fillRef idx="1">
+        <a:scrgbClr r="0" g="0" b="0"/>
+      </a:fillRef>
+      <a:effectRef idx="0">
+        <a:scrgbClr r="0" g="0" b="0"/>
+      </a:effectRef>
+      <a:fontRef idx="minor"/>
+    </dgm:style>
+  </dgm:styleLbl>
+  <dgm:styleLbl name="bgAccFollowNode1">
+    <dgm:scene3d>
+      <a:camera prst="orthographicFront"/>
+      <a:lightRig rig="threePt" dir="t"/>
+    </dgm:scene3d>
+    <dgm:sp3d/>
+    <dgm:txPr/>
+    <dgm:style>
+      <a:lnRef idx="2">
+        <a:scrgbClr r="0" g="0" b="0"/>
+      </a:lnRef>
+      <a:fillRef idx="1">
+        <a:scrgbClr r="0" g="0" b="0"/>
+      </a:fillRef>
+      <a:effectRef idx="0">
+        <a:scrgbClr r="0" g="0" b="0"/>
+      </a:effectRef>
+      <a:fontRef idx="minor"/>
+    </dgm:style>
+  </dgm:styleLbl>
+  <dgm:styleLbl name="fgAcc0">
+    <dgm:scene3d>
+      <a:camera prst="orthographicFront"/>
+      <a:lightRig rig="threePt" dir="t"/>
+    </dgm:scene3d>
+    <dgm:sp3d/>
+    <dgm:txPr/>
+    <dgm:style>
+      <a:lnRef idx="2">
+        <a:scrgbClr r="0" g="0" b="0"/>
+      </a:lnRef>
+      <a:fillRef idx="1">
+        <a:scrgbClr r="0" g="0" b="0"/>
+      </a:fillRef>
+      <a:effectRef idx="0">
+        <a:scrgbClr r="0" g="0" b="0"/>
+      </a:effectRef>
+      <a:fontRef idx="minor"/>
+    </dgm:style>
+  </dgm:styleLbl>
+  <dgm:styleLbl name="fgAcc2">
+    <dgm:scene3d>
+      <a:camera prst="orthographicFront"/>
+      <a:lightRig rig="threePt" dir="t"/>
+    </dgm:scene3d>
+    <dgm:sp3d/>
+    <dgm:txPr/>
+    <dgm:style>
+      <a:lnRef idx="2">
+        <a:scrgbClr r="0" g="0" b="0"/>
+      </a:lnRef>
+      <a:fillRef idx="1">
+        <a:scrgbClr r="0" g="0" b="0"/>
+      </a:fillRef>
+      <a:effectRef idx="0">
+        <a:scrgbClr r="0" g="0" b="0"/>
+      </a:effectRef>
+      <a:fontRef idx="minor"/>
+    </dgm:style>
+  </dgm:styleLbl>
+  <dgm:styleLbl name="fgAcc3">
+    <dgm:scene3d>
+      <a:camera prst="orthographicFront"/>
+      <a:lightRig rig="threePt" dir="t"/>
+    </dgm:scene3d>
+    <dgm:sp3d/>
+    <dgm:txPr/>
+    <dgm:style>
+      <a:lnRef idx="2">
+        <a:scrgbClr r="0" g="0" b="0"/>
+      </a:lnRef>
+      <a:fillRef idx="1">
+        <a:scrgbClr r="0" g="0" b="0"/>
+      </a:fillRef>
+      <a:effectRef idx="0">
+        <a:scrgbClr r="0" g="0" b="0"/>
+      </a:effectRef>
+      <a:fontRef idx="minor"/>
+    </dgm:style>
+  </dgm:styleLbl>
+  <dgm:styleLbl name="fgAcc4">
+    <dgm:scene3d>
+      <a:camera prst="orthographicFront"/>
+      <a:lightRig rig="threePt" dir="t"/>
+    </dgm:scene3d>
+    <dgm:sp3d/>
+    <dgm:txPr/>
+    <dgm:style>
+      <a:lnRef idx="2">
+        <a:scrgbClr r="0" g="0" b="0"/>
+      </a:lnRef>
+      <a:fillRef idx="1">
+        <a:scrgbClr r="0" g="0" b="0"/>
+      </a:fillRef>
+      <a:effectRef idx="0">
+        <a:scrgbClr r="0" g="0" b="0"/>
+      </a:effectRef>
+      <a:fontRef idx="minor"/>
+    </dgm:style>
+  </dgm:styleLbl>
+  <dgm:styleLbl name="bgShp">
+    <dgm:scene3d>
+      <a:camera prst="orthographicFront"/>
+      <a:lightRig rig="threePt" dir="t"/>
+    </dgm:scene3d>
+    <dgm:sp3d/>
+    <dgm:txPr/>
+    <dgm:style>
+      <a:lnRef idx="0">
+        <a:scrgbClr r="0" g="0" b="0"/>
+      </a:lnRef>
+      <a:fillRef idx="1">
+        <a:scrgbClr r="0" g="0" b="0"/>
+      </a:fillRef>
+      <a:effectRef idx="0">
+        <a:scrgbClr r="0" g="0" b="0"/>
+      </a:effectRef>
+      <a:fontRef idx="minor"/>
+    </dgm:style>
+  </dgm:styleLbl>
+  <dgm:styleLbl name="dkBgShp">
+    <dgm:scene3d>
+      <a:camera prst="orthographicFront"/>
+      <a:lightRig rig="threePt" dir="t"/>
+    </dgm:scene3d>
+    <dgm:sp3d/>
+    <dgm:txPr/>
+    <dgm:style>
+      <a:lnRef idx="0">
+        <a:scrgbClr r="0" g="0" b="0"/>
+      </a:lnRef>
+      <a:fillRef idx="1">
+        <a:scrgbClr r="0" g="0" b="0"/>
+      </a:fillRef>
+      <a:effectRef idx="0">
+        <a:scrgbClr r="0" g="0" b="0"/>
+      </a:effectRef>
+      <a:fontRef idx="minor"/>
+    </dgm:style>
+  </dgm:styleLbl>
+  <dgm:styleLbl name="trBgShp">
+    <dgm:scene3d>
+      <a:camera prst="orthographicFront"/>
+      <a:lightRig rig="threePt" dir="t"/>
+    </dgm:scene3d>
+    <dgm:sp3d/>
+    <dgm:txPr/>
+    <dgm:style>
+      <a:lnRef idx="0">
+        <a:scrgbClr r="0" g="0" b="0"/>
+      </a:lnRef>
+      <a:fillRef idx="1">
+        <a:scrgbClr r="0" g="0" b="0"/>
+      </a:fillRef>
+      <a:effectRef idx="0">
+        <a:scrgbClr r="0" g="0" b="0"/>
+      </a:effectRef>
+      <a:fontRef idx="minor"/>
+    </dgm:style>
+  </dgm:styleLbl>
+  <dgm:styleLbl name="fgShp">
+    <dgm:scene3d>
+      <a:camera prst="orthographicFront"/>
+      <a:lightRig rig="threePt" dir="t"/>
+    </dgm:scene3d>
+    <dgm:sp3d/>
+    <dgm:txPr/>
+    <dgm:style>
+      <a:lnRef idx="2">
+        <a:scrgbClr r="0" g="0" b="0"/>
+      </a:lnRef>
+      <a:fillRef idx="1">
+        <a:scrgbClr r="0" g="0" b="0"/>
+      </a:fillRef>
+      <a:effectRef idx="0">
+        <a:scrgbClr r="0" g="0" b="0"/>
+      </a:effectRef>
+      <a:fontRef idx="minor"/>
+    </dgm:style>
+  </dgm:styleLbl>
+  <dgm:styleLbl name="revTx">
+    <dgm:scene3d>
+      <a:camera prst="orthographicFront"/>
+      <a:lightRig rig="threePt" dir="t"/>
+    </dgm:scene3d>
+    <dgm:sp3d/>
+    <dgm:txPr/>
+    <dgm:style>
+      <a:lnRef idx="0">
+        <a:scrgbClr r="0" g="0" b="0"/>
+      </a:lnRef>
+      <a:fillRef idx="0">
+        <a:scrgbClr r="0" g="0" b="0"/>
+      </a:fillRef>
+      <a:effectRef idx="0">
+        <a:scrgbClr r="0" g="0" b="0"/>
+      </a:effectRef>
+      <a:fontRef idx="minor"/>
+    </dgm:style>
+  </dgm:styleLbl>
+</dgm:styleDef>
+</file>
+
 <file path=ppt/slideLayouts/slideLayout1.xml><?xml version="1.0" encoding="utf-8"?>
 <p:sldLayout xmlns:a="http://schemas.openxmlformats.org/drawingml/2006/main" xmlns:r="http://schemas.openxmlformats.org/officeDocument/2006/relationships" xmlns:p="http://schemas.openxmlformats.org/presentationml/2006/main" type="title" preserve="1">
   <p:cSld name="Title Slide">
@@ -279,7 +2917,7 @@
           <a:p>
             <a:fld id="{4103C207-1B24-E341-B490-8E9928603720}" type="datetimeFigureOut">
               <a:rPr lang="sv-SE" smtClean="0"/>
-              <a:t>2020-09-07</a:t>
+              <a:t>2020-09-09</a:t>
             </a:fld>
             <a:endParaRPr lang="sv-SE"/>
           </a:p>
@@ -479,7 +3117,7 @@
           <a:p>
             <a:fld id="{4103C207-1B24-E341-B490-8E9928603720}" type="datetimeFigureOut">
               <a:rPr lang="sv-SE" smtClean="0"/>
-              <a:t>2020-09-07</a:t>
+              <a:t>2020-09-09</a:t>
             </a:fld>
             <a:endParaRPr lang="sv-SE"/>
           </a:p>
@@ -689,7 +3327,7 @@
           <a:p>
             <a:fld id="{4103C207-1B24-E341-B490-8E9928603720}" type="datetimeFigureOut">
               <a:rPr lang="sv-SE" smtClean="0"/>
-              <a:t>2020-09-07</a:t>
+              <a:t>2020-09-09</a:t>
             </a:fld>
             <a:endParaRPr lang="sv-SE"/>
           </a:p>
@@ -889,7 +3527,7 @@
           <a:p>
             <a:fld id="{4103C207-1B24-E341-B490-8E9928603720}" type="datetimeFigureOut">
               <a:rPr lang="sv-SE" smtClean="0"/>
-              <a:t>2020-09-07</a:t>
+              <a:t>2020-09-09</a:t>
             </a:fld>
             <a:endParaRPr lang="sv-SE"/>
           </a:p>
@@ -1165,7 +3803,7 @@
           <a:p>
             <a:fld id="{4103C207-1B24-E341-B490-8E9928603720}" type="datetimeFigureOut">
               <a:rPr lang="sv-SE" smtClean="0"/>
-              <a:t>2020-09-07</a:t>
+              <a:t>2020-09-09</a:t>
             </a:fld>
             <a:endParaRPr lang="sv-SE"/>
           </a:p>
@@ -1433,7 +4071,7 @@
           <a:p>
             <a:fld id="{4103C207-1B24-E341-B490-8E9928603720}" type="datetimeFigureOut">
               <a:rPr lang="sv-SE" smtClean="0"/>
-              <a:t>2020-09-07</a:t>
+              <a:t>2020-09-09</a:t>
             </a:fld>
             <a:endParaRPr lang="sv-SE"/>
           </a:p>
@@ -1848,7 +4486,7 @@
           <a:p>
             <a:fld id="{4103C207-1B24-E341-B490-8E9928603720}" type="datetimeFigureOut">
               <a:rPr lang="sv-SE" smtClean="0"/>
-              <a:t>2020-09-07</a:t>
+              <a:t>2020-09-09</a:t>
             </a:fld>
             <a:endParaRPr lang="sv-SE"/>
           </a:p>
@@ -1990,7 +4628,7 @@
           <a:p>
             <a:fld id="{4103C207-1B24-E341-B490-8E9928603720}" type="datetimeFigureOut">
               <a:rPr lang="sv-SE" smtClean="0"/>
-              <a:t>2020-09-07</a:t>
+              <a:t>2020-09-09</a:t>
             </a:fld>
             <a:endParaRPr lang="sv-SE"/>
           </a:p>
@@ -2103,7 +4741,7 @@
           <a:p>
             <a:fld id="{4103C207-1B24-E341-B490-8E9928603720}" type="datetimeFigureOut">
               <a:rPr lang="sv-SE" smtClean="0"/>
-              <a:t>2020-09-07</a:t>
+              <a:t>2020-09-09</a:t>
             </a:fld>
             <a:endParaRPr lang="sv-SE"/>
           </a:p>
@@ -2416,7 +5054,7 @@
           <a:p>
             <a:fld id="{4103C207-1B24-E341-B490-8E9928603720}" type="datetimeFigureOut">
               <a:rPr lang="sv-SE" smtClean="0"/>
-              <a:t>2020-09-07</a:t>
+              <a:t>2020-09-09</a:t>
             </a:fld>
             <a:endParaRPr lang="sv-SE"/>
           </a:p>
@@ -2705,7 +5343,7 @@
           <a:p>
             <a:fld id="{4103C207-1B24-E341-B490-8E9928603720}" type="datetimeFigureOut">
               <a:rPr lang="sv-SE" smtClean="0"/>
-              <a:t>2020-09-07</a:t>
+              <a:t>2020-09-09</a:t>
             </a:fld>
             <a:endParaRPr lang="sv-SE"/>
           </a:p>
@@ -2948,7 +5586,7 @@
           <a:p>
             <a:fld id="{4103C207-1B24-E341-B490-8E9928603720}" type="datetimeFigureOut">
               <a:rPr lang="sv-SE" smtClean="0"/>
-              <a:t>2020-09-07</a:t>
+              <a:t>2020-09-09</a:t>
             </a:fld>
             <a:endParaRPr lang="sv-SE"/>
           </a:p>
@@ -4712,7 +7350,7 @@
         </p:nvSpPr>
         <p:spPr>
           <a:xfrm>
-            <a:off x="620110" y="603379"/>
+            <a:off x="473817" y="376872"/>
             <a:ext cx="2333297" cy="1614304"/>
           </a:xfrm>
         </p:spPr>
@@ -4840,6 +7478,169 @@
           <a:p>
             <a:pPr algn="l"/>
             <a:endParaRPr lang="sv-SE" dirty="0"/>
+          </a:p>
+        </p:txBody>
+      </p:sp>
+      <p:cxnSp>
+        <p:nvCxnSpPr>
+          <p:cNvPr id="7" name="Straight Arrow Connector 6">
+            <a:extLst>
+              <a:ext uri="{FF2B5EF4-FFF2-40B4-BE49-F238E27FC236}">
+                <a16:creationId xmlns:a16="http://schemas.microsoft.com/office/drawing/2014/main" id="{669BB7AF-4A0A-4A43-9CEA-6C7FCB799D1A}"/>
+              </a:ext>
+            </a:extLst>
+          </p:cNvPr>
+          <p:cNvCxnSpPr/>
+          <p:nvPr/>
+        </p:nvCxnSpPr>
+        <p:spPr>
+          <a:xfrm>
+            <a:off x="11082637" y="3429000"/>
+            <a:ext cx="0" cy="1921476"/>
+          </a:xfrm>
+          <a:prstGeom prst="straightConnector1">
+            <a:avLst/>
+          </a:prstGeom>
+          <a:ln w="22225">
+            <a:headEnd type="triangle"/>
+            <a:tailEnd type="triangle"/>
+          </a:ln>
+        </p:spPr>
+        <p:style>
+          <a:lnRef idx="1">
+            <a:schemeClr val="accent1"/>
+          </a:lnRef>
+          <a:fillRef idx="0">
+            <a:schemeClr val="accent1"/>
+          </a:fillRef>
+          <a:effectRef idx="0">
+            <a:schemeClr val="accent1"/>
+          </a:effectRef>
+          <a:fontRef idx="minor">
+            <a:schemeClr val="tx1"/>
+          </a:fontRef>
+        </p:style>
+      </p:cxnSp>
+      <p:graphicFrame>
+        <p:nvGraphicFramePr>
+          <p:cNvPr id="8" name="Diagram 7">
+            <a:extLst>
+              <a:ext uri="{FF2B5EF4-FFF2-40B4-BE49-F238E27FC236}">
+                <a16:creationId xmlns:a16="http://schemas.microsoft.com/office/drawing/2014/main" id="{797F79B3-E09D-EF42-9603-A90BB748FC4A}"/>
+              </a:ext>
+            </a:extLst>
+          </p:cNvPr>
+          <p:cNvGraphicFramePr/>
+          <p:nvPr>
+            <p:extLst>
+              <p:ext uri="{D42A27DB-BD31-4B8C-83A1-F6EECF244321}">
+                <p14:modId xmlns:p14="http://schemas.microsoft.com/office/powerpoint/2010/main" val="3125755064"/>
+              </p:ext>
+            </p:extLst>
+          </p:nvPr>
+        </p:nvGraphicFramePr>
+        <p:xfrm>
+          <a:off x="7525196" y="3252525"/>
+          <a:ext cx="2885988" cy="2184448"/>
+        </p:xfrm>
+        <a:graphic>
+          <a:graphicData uri="http://schemas.openxmlformats.org/drawingml/2006/diagram">
+            <dgm:relIds xmlns:dgm="http://schemas.openxmlformats.org/drawingml/2006/diagram" xmlns:r="http://schemas.openxmlformats.org/officeDocument/2006/relationships" r:dm="rId2" r:lo="rId3" r:qs="rId4" r:cs="rId5"/>
+          </a:graphicData>
+        </a:graphic>
+      </p:graphicFrame>
+      <p:sp>
+        <p:nvSpPr>
+          <p:cNvPr id="9" name="TextBox 8">
+            <a:extLst>
+              <a:ext uri="{FF2B5EF4-FFF2-40B4-BE49-F238E27FC236}">
+                <a16:creationId xmlns:a16="http://schemas.microsoft.com/office/drawing/2014/main" id="{17F75BB9-A705-DC42-84E0-318D65D277BE}"/>
+              </a:ext>
+            </a:extLst>
+          </p:cNvPr>
+          <p:cNvSpPr txBox="1"/>
+          <p:nvPr/>
+        </p:nvSpPr>
+        <p:spPr>
+          <a:xfrm>
+            <a:off x="10152384" y="2732691"/>
+            <a:ext cx="1777987" cy="646331"/>
+          </a:xfrm>
+          <a:prstGeom prst="rect">
+            <a:avLst/>
+          </a:prstGeom>
+          <a:noFill/>
+        </p:spPr>
+        <p:txBody>
+          <a:bodyPr wrap="none" rtlCol="0">
+            <a:spAutoFit/>
+          </a:bodyPr>
+          <a:lstStyle/>
+          <a:p>
+            <a:r>
+              <a:rPr lang="sv-SE" dirty="0" err="1"/>
+              <a:t>More</a:t>
+            </a:r>
+            <a:r>
+              <a:rPr lang="sv-SE" dirty="0"/>
+              <a:t> integration</a:t>
+            </a:r>
+          </a:p>
+          <a:p>
+            <a:pPr algn="ctr"/>
+            <a:r>
+              <a:rPr lang="sv-SE" dirty="0"/>
+              <a:t>(</a:t>
+            </a:r>
+            <a:r>
+              <a:rPr lang="sv-SE" dirty="0" err="1"/>
+              <a:t>Slower</a:t>
+            </a:r>
+            <a:r>
+              <a:rPr lang="sv-SE" dirty="0"/>
+              <a:t>)</a:t>
+            </a:r>
+          </a:p>
+        </p:txBody>
+      </p:sp>
+      <p:sp>
+        <p:nvSpPr>
+          <p:cNvPr id="11" name="TextBox 10">
+            <a:extLst>
+              <a:ext uri="{FF2B5EF4-FFF2-40B4-BE49-F238E27FC236}">
+                <a16:creationId xmlns:a16="http://schemas.microsoft.com/office/drawing/2014/main" id="{5576754D-C95A-8F49-B71F-1DB458A15C90}"/>
+              </a:ext>
+            </a:extLst>
+          </p:cNvPr>
+          <p:cNvSpPr txBox="1"/>
+          <p:nvPr/>
+        </p:nvSpPr>
+        <p:spPr>
+          <a:xfrm>
+            <a:off x="10692623" y="5508334"/>
+            <a:ext cx="988860" cy="646331"/>
+          </a:xfrm>
+          <a:prstGeom prst="rect">
+            <a:avLst/>
+          </a:prstGeom>
+          <a:noFill/>
+        </p:spPr>
+        <p:txBody>
+          <a:bodyPr wrap="none" rtlCol="0">
+            <a:spAutoFit/>
+          </a:bodyPr>
+          <a:lstStyle/>
+          <a:p>
+            <a:r>
+              <a:rPr lang="sv-SE" dirty="0"/>
+              <a:t>Isolation</a:t>
+            </a:r>
+          </a:p>
+          <a:p>
+            <a:r>
+              <a:rPr lang="sv-SE" dirty="0"/>
+              <a:t>(Faster)</a:t>
+            </a:r>
           </a:p>
         </p:txBody>
       </p:sp>
@@ -4857,7 +7658,7 @@
 </file>
 
 <file path=ppt/slides/slide17.xml><?xml version="1.0" encoding="utf-8"?>
-<p:sld xmlns:a="http://schemas.openxmlformats.org/drawingml/2006/main" xmlns:r="http://schemas.openxmlformats.org/officeDocument/2006/relationships" xmlns:p="http://schemas.openxmlformats.org/presentationml/2006/main">
+<p:sld xmlns:a="http://schemas.openxmlformats.org/drawingml/2006/main" xmlns:r="http://schemas.openxmlformats.org/officeDocument/2006/relationships" xmlns:p="http://schemas.openxmlformats.org/presentationml/2006/main" show="0">
   <p:cSld>
     <p:spTree>
       <p:nvGrpSpPr>

</xml_diff>

<commit_message>
Improved HealthCheckerTest, modified URL in presentation
</commit_message>
<xml_diff>
--- a/TDD-Presentation.pptx
+++ b/TDD-Presentation.pptx
@@ -2917,7 +2917,7 @@
           <a:p>
             <a:fld id="{4103C207-1B24-E341-B490-8E9928603720}" type="datetimeFigureOut">
               <a:rPr lang="sv-SE" smtClean="0"/>
-              <a:t>2020-09-09</a:t>
+              <a:t>2020-09-10</a:t>
             </a:fld>
             <a:endParaRPr lang="sv-SE"/>
           </a:p>
@@ -3117,7 +3117,7 @@
           <a:p>
             <a:fld id="{4103C207-1B24-E341-B490-8E9928603720}" type="datetimeFigureOut">
               <a:rPr lang="sv-SE" smtClean="0"/>
-              <a:t>2020-09-09</a:t>
+              <a:t>2020-09-10</a:t>
             </a:fld>
             <a:endParaRPr lang="sv-SE"/>
           </a:p>
@@ -3327,7 +3327,7 @@
           <a:p>
             <a:fld id="{4103C207-1B24-E341-B490-8E9928603720}" type="datetimeFigureOut">
               <a:rPr lang="sv-SE" smtClean="0"/>
-              <a:t>2020-09-09</a:t>
+              <a:t>2020-09-10</a:t>
             </a:fld>
             <a:endParaRPr lang="sv-SE"/>
           </a:p>
@@ -3527,7 +3527,7 @@
           <a:p>
             <a:fld id="{4103C207-1B24-E341-B490-8E9928603720}" type="datetimeFigureOut">
               <a:rPr lang="sv-SE" smtClean="0"/>
-              <a:t>2020-09-09</a:t>
+              <a:t>2020-09-10</a:t>
             </a:fld>
             <a:endParaRPr lang="sv-SE"/>
           </a:p>
@@ -3803,7 +3803,7 @@
           <a:p>
             <a:fld id="{4103C207-1B24-E341-B490-8E9928603720}" type="datetimeFigureOut">
               <a:rPr lang="sv-SE" smtClean="0"/>
-              <a:t>2020-09-09</a:t>
+              <a:t>2020-09-10</a:t>
             </a:fld>
             <a:endParaRPr lang="sv-SE"/>
           </a:p>
@@ -4071,7 +4071,7 @@
           <a:p>
             <a:fld id="{4103C207-1B24-E341-B490-8E9928603720}" type="datetimeFigureOut">
               <a:rPr lang="sv-SE" smtClean="0"/>
-              <a:t>2020-09-09</a:t>
+              <a:t>2020-09-10</a:t>
             </a:fld>
             <a:endParaRPr lang="sv-SE"/>
           </a:p>
@@ -4486,7 +4486,7 @@
           <a:p>
             <a:fld id="{4103C207-1B24-E341-B490-8E9928603720}" type="datetimeFigureOut">
               <a:rPr lang="sv-SE" smtClean="0"/>
-              <a:t>2020-09-09</a:t>
+              <a:t>2020-09-10</a:t>
             </a:fld>
             <a:endParaRPr lang="sv-SE"/>
           </a:p>
@@ -4628,7 +4628,7 @@
           <a:p>
             <a:fld id="{4103C207-1B24-E341-B490-8E9928603720}" type="datetimeFigureOut">
               <a:rPr lang="sv-SE" smtClean="0"/>
-              <a:t>2020-09-09</a:t>
+              <a:t>2020-09-10</a:t>
             </a:fld>
             <a:endParaRPr lang="sv-SE"/>
           </a:p>
@@ -4741,7 +4741,7 @@
           <a:p>
             <a:fld id="{4103C207-1B24-E341-B490-8E9928603720}" type="datetimeFigureOut">
               <a:rPr lang="sv-SE" smtClean="0"/>
-              <a:t>2020-09-09</a:t>
+              <a:t>2020-09-10</a:t>
             </a:fld>
             <a:endParaRPr lang="sv-SE"/>
           </a:p>
@@ -5054,7 +5054,7 @@
           <a:p>
             <a:fld id="{4103C207-1B24-E341-B490-8E9928603720}" type="datetimeFigureOut">
               <a:rPr lang="sv-SE" smtClean="0"/>
-              <a:t>2020-09-09</a:t>
+              <a:t>2020-09-10</a:t>
             </a:fld>
             <a:endParaRPr lang="sv-SE"/>
           </a:p>
@@ -5343,7 +5343,7 @@
           <a:p>
             <a:fld id="{4103C207-1B24-E341-B490-8E9928603720}" type="datetimeFigureOut">
               <a:rPr lang="sv-SE" smtClean="0"/>
-              <a:t>2020-09-09</a:t>
+              <a:t>2020-09-10</a:t>
             </a:fld>
             <a:endParaRPr lang="sv-SE"/>
           </a:p>
@@ -5586,7 +5586,7 @@
           <a:p>
             <a:fld id="{4103C207-1B24-E341-B490-8E9928603720}" type="datetimeFigureOut">
               <a:rPr lang="sv-SE" smtClean="0"/>
-              <a:t>2020-09-09</a:t>
+              <a:t>2020-09-10</a:t>
             </a:fld>
             <a:endParaRPr lang="sv-SE"/>
           </a:p>
@@ -7008,22 +7008,10 @@
               <a:t>URI.create</a:t>
             </a:r>
             <a:r>
-              <a:rPr lang="sv-SE" sz="1600" dirty="0">
+              <a:rPr lang="sv-SE" sz="1600">
                 <a:latin typeface="Consolas" panose="020B0609020204030204" pitchFamily="49" charset="0"/>
               </a:rPr>
-              <a:t>("/</a:t>
-            </a:r>
-            <a:r>
-              <a:rPr lang="sv-SE" sz="1600" dirty="0" err="1">
-                <a:latin typeface="Consolas" panose="020B0609020204030204" pitchFamily="49" charset="0"/>
-              </a:rPr>
-              <a:t>healthcheck</a:t>
-            </a:r>
-            <a:r>
-              <a:rPr lang="sv-SE" sz="1600" dirty="0">
-                <a:latin typeface="Consolas" panose="020B0609020204030204" pitchFamily="49" charset="0"/>
-              </a:rPr>
-              <a:t>"));</a:t>
+              <a:t>(”http://testurl"));</a:t>
             </a:r>
             <a:endParaRPr lang="sv-SE" sz="1600" dirty="0"/>
           </a:p>

</xml_diff>

<commit_message>
Updated list of testing tools
</commit_message>
<xml_diff>
--- a/TDD-Presentation.pptx
+++ b/TDD-Presentation.pptx
@@ -2917,7 +2917,7 @@
           <a:p>
             <a:fld id="{4103C207-1B24-E341-B490-8E9928603720}" type="datetimeFigureOut">
               <a:rPr lang="sv-SE" smtClean="0"/>
-              <a:t>2020-09-10</a:t>
+              <a:t>2021-02-01</a:t>
             </a:fld>
             <a:endParaRPr lang="sv-SE"/>
           </a:p>
@@ -3117,7 +3117,7 @@
           <a:p>
             <a:fld id="{4103C207-1B24-E341-B490-8E9928603720}" type="datetimeFigureOut">
               <a:rPr lang="sv-SE" smtClean="0"/>
-              <a:t>2020-09-10</a:t>
+              <a:t>2021-02-01</a:t>
             </a:fld>
             <a:endParaRPr lang="sv-SE"/>
           </a:p>
@@ -3327,7 +3327,7 @@
           <a:p>
             <a:fld id="{4103C207-1B24-E341-B490-8E9928603720}" type="datetimeFigureOut">
               <a:rPr lang="sv-SE" smtClean="0"/>
-              <a:t>2020-09-10</a:t>
+              <a:t>2021-02-01</a:t>
             </a:fld>
             <a:endParaRPr lang="sv-SE"/>
           </a:p>
@@ -3527,7 +3527,7 @@
           <a:p>
             <a:fld id="{4103C207-1B24-E341-B490-8E9928603720}" type="datetimeFigureOut">
               <a:rPr lang="sv-SE" smtClean="0"/>
-              <a:t>2020-09-10</a:t>
+              <a:t>2021-02-01</a:t>
             </a:fld>
             <a:endParaRPr lang="sv-SE"/>
           </a:p>
@@ -3803,7 +3803,7 @@
           <a:p>
             <a:fld id="{4103C207-1B24-E341-B490-8E9928603720}" type="datetimeFigureOut">
               <a:rPr lang="sv-SE" smtClean="0"/>
-              <a:t>2020-09-10</a:t>
+              <a:t>2021-02-01</a:t>
             </a:fld>
             <a:endParaRPr lang="sv-SE"/>
           </a:p>
@@ -4071,7 +4071,7 @@
           <a:p>
             <a:fld id="{4103C207-1B24-E341-B490-8E9928603720}" type="datetimeFigureOut">
               <a:rPr lang="sv-SE" smtClean="0"/>
-              <a:t>2020-09-10</a:t>
+              <a:t>2021-02-01</a:t>
             </a:fld>
             <a:endParaRPr lang="sv-SE"/>
           </a:p>
@@ -4486,7 +4486,7 @@
           <a:p>
             <a:fld id="{4103C207-1B24-E341-B490-8E9928603720}" type="datetimeFigureOut">
               <a:rPr lang="sv-SE" smtClean="0"/>
-              <a:t>2020-09-10</a:t>
+              <a:t>2021-02-01</a:t>
             </a:fld>
             <a:endParaRPr lang="sv-SE"/>
           </a:p>
@@ -4628,7 +4628,7 @@
           <a:p>
             <a:fld id="{4103C207-1B24-E341-B490-8E9928603720}" type="datetimeFigureOut">
               <a:rPr lang="sv-SE" smtClean="0"/>
-              <a:t>2020-09-10</a:t>
+              <a:t>2021-02-01</a:t>
             </a:fld>
             <a:endParaRPr lang="sv-SE"/>
           </a:p>
@@ -4741,7 +4741,7 @@
           <a:p>
             <a:fld id="{4103C207-1B24-E341-B490-8E9928603720}" type="datetimeFigureOut">
               <a:rPr lang="sv-SE" smtClean="0"/>
-              <a:t>2020-09-10</a:t>
+              <a:t>2021-02-01</a:t>
             </a:fld>
             <a:endParaRPr lang="sv-SE"/>
           </a:p>
@@ -5054,7 +5054,7 @@
           <a:p>
             <a:fld id="{4103C207-1B24-E341-B490-8E9928603720}" type="datetimeFigureOut">
               <a:rPr lang="sv-SE" smtClean="0"/>
-              <a:t>2020-09-10</a:t>
+              <a:t>2021-02-01</a:t>
             </a:fld>
             <a:endParaRPr lang="sv-SE"/>
           </a:p>
@@ -5343,7 +5343,7 @@
           <a:p>
             <a:fld id="{4103C207-1B24-E341-B490-8E9928603720}" type="datetimeFigureOut">
               <a:rPr lang="sv-SE" smtClean="0"/>
-              <a:t>2020-09-10</a:t>
+              <a:t>2021-02-01</a:t>
             </a:fld>
             <a:endParaRPr lang="sv-SE"/>
           </a:p>
@@ -5586,7 +5586,7 @@
           <a:p>
             <a:fld id="{4103C207-1B24-E341-B490-8E9928603720}" type="datetimeFigureOut">
               <a:rPr lang="sv-SE" smtClean="0"/>
-              <a:t>2020-09-10</a:t>
+              <a:t>2021-02-01</a:t>
             </a:fld>
             <a:endParaRPr lang="sv-SE"/>
           </a:p>
@@ -6201,7 +6201,10 @@
               <a:rPr lang="sv-SE" dirty="0" err="1"/>
               <a:t>JUnit</a:t>
             </a:r>
-            <a:endParaRPr lang="sv-SE" dirty="0"/>
+            <a:r>
+              <a:rPr lang="sv-SE" dirty="0"/>
+              <a:t>	</a:t>
+            </a:r>
           </a:p>
           <a:p>
             <a:pPr marL="800100" lvl="1" indent="-342900" algn="l">
@@ -6260,10 +6263,9 @@
               <a:buChar char="•"/>
             </a:pPr>
             <a:r>
-              <a:rPr lang="sv-SE" dirty="0" err="1"/>
-              <a:t>Cucumber</a:t>
-            </a:r>
-            <a:endParaRPr lang="sv-SE" dirty="0"/>
+              <a:rPr lang="sv-SE" dirty="0"/>
+              <a:t>Scalatest (Scala)</a:t>
+            </a:r>
           </a:p>
           <a:p>
             <a:pPr marL="800100" lvl="1" indent="-342900" algn="l">
@@ -6271,8 +6273,34 @@
               <a:buChar char="•"/>
             </a:pPr>
             <a:r>
-              <a:rPr lang="sv-SE" dirty="0"/>
-              <a:t>Scalatest (Scala)</a:t>
+              <a:rPr lang="sv-SE" dirty="0" err="1"/>
+              <a:t>Cucumber</a:t>
+            </a:r>
+            <a:r>
+              <a:rPr lang="sv-SE" dirty="0"/>
+              <a:t>, </a:t>
+            </a:r>
+            <a:r>
+              <a:rPr lang="sv-SE" dirty="0" err="1"/>
+              <a:t>JBehave</a:t>
+            </a:r>
+            <a:r>
+              <a:rPr lang="sv-SE" dirty="0"/>
+              <a:t> (BDD)</a:t>
+            </a:r>
+          </a:p>
+          <a:p>
+            <a:pPr marL="800100" lvl="1" indent="-342900" algn="l">
+              <a:buFont typeface="Arial" panose="020B0604020202020204" pitchFamily="34" charset="0"/>
+              <a:buChar char="•"/>
+            </a:pPr>
+            <a:r>
+              <a:rPr lang="sv-SE" dirty="0" err="1"/>
+              <a:t>Selenium</a:t>
+            </a:r>
+            <a:r>
+              <a:rPr lang="sv-SE" dirty="0"/>
+              <a:t> (Web)</a:t>
             </a:r>
           </a:p>
           <a:p>
@@ -6361,13 +6389,6 @@
               <a:rPr lang="sv-SE" dirty="0" err="1"/>
               <a:t>Powermock</a:t>
             </a:r>
-            <a:endParaRPr lang="sv-SE" dirty="0"/>
-          </a:p>
-          <a:p>
-            <a:pPr marL="800100" lvl="1" indent="-342900" algn="l">
-              <a:buFont typeface="Arial" panose="020B0604020202020204" pitchFamily="34" charset="0"/>
-              <a:buChar char="•"/>
-            </a:pPr>
             <a:endParaRPr lang="sv-SE" dirty="0"/>
           </a:p>
           <a:p>
@@ -6501,7 +6522,10 @@
               <a:rPr lang="sv-SE" dirty="0" err="1"/>
               <a:t>MochaJS</a:t>
             </a:r>
-            <a:endParaRPr lang="sv-SE" dirty="0"/>
+            <a:r>
+              <a:rPr lang="sv-SE" dirty="0"/>
+              <a:t> (node.js)</a:t>
+            </a:r>
           </a:p>
           <a:p>
             <a:pPr marL="800100" lvl="1" indent="-342900" algn="l">
@@ -6510,7 +6534,15 @@
             </a:pPr>
             <a:r>
               <a:rPr lang="sv-SE" dirty="0"/>
-              <a:t>JEST</a:t>
+              <a:t>JEST (Facebook, </a:t>
+            </a:r>
+            <a:r>
+              <a:rPr lang="sv-SE" dirty="0" err="1"/>
+              <a:t>react</a:t>
+            </a:r>
+            <a:r>
+              <a:rPr lang="sv-SE" dirty="0"/>
+              <a:t>)</a:t>
             </a:r>
           </a:p>
           <a:p>
@@ -6520,7 +6552,7 @@
             </a:pPr>
             <a:r>
               <a:rPr lang="sv-SE" dirty="0"/>
-              <a:t>Jasmine</a:t>
+              <a:t>Jasmine (BDD-stöd)</a:t>
             </a:r>
           </a:p>
           <a:p>

</xml_diff>